<commit_message>
isie sunum. results and conclusions.
</commit_message>
<xml_diff>
--- a/ISIE 2017/sunum/ISIE2017_OralPres_Mesut_Uğur.pptx
+++ b/ISIE 2017/sunum/ISIE2017_OralPres_Mesut_Uğur.pptx
@@ -223,7 +223,7 @@
           <a:p>
             <a:fld id="{D1C008C1-D970-43BD-9678-58985B84B3B0}" type="datetimeFigureOut">
               <a:rPr lang="tr-TR" smtClean="0"/>
-              <a:t>01.06.2017</a:t>
+              <a:t>04.06.2017</a:t>
             </a:fld>
             <a:endParaRPr lang="tr-TR"/>
           </a:p>
@@ -840,7 +840,7 @@
           <a:p>
             <a:fld id="{D275723C-A363-4114-BE18-3E9589C2B9C2}" type="datetime1">
               <a:rPr lang="en-US" smtClean="0"/>
-              <a:t>6/1/2017</a:t>
+              <a:t>6/4/2017</a:t>
             </a:fld>
             <a:endParaRPr lang="en-US" dirty="0"/>
           </a:p>
@@ -1011,7 +1011,7 @@
           <a:p>
             <a:fld id="{C5592633-93A2-4DB7-B3D8-5F6714E7EFEC}" type="datetime1">
               <a:rPr lang="en-US" smtClean="0"/>
-              <a:t>6/1/2017</a:t>
+              <a:t>6/4/2017</a:t>
             </a:fld>
             <a:endParaRPr lang="en-US" dirty="0"/>
           </a:p>
@@ -1192,7 +1192,7 @@
           <a:p>
             <a:fld id="{6F760D8D-AE05-4AF5-8666-75C48EA7B609}" type="datetime1">
               <a:rPr lang="en-US" smtClean="0"/>
-              <a:t>6/1/2017</a:t>
+              <a:t>6/4/2017</a:t>
             </a:fld>
             <a:endParaRPr lang="en-US" dirty="0"/>
           </a:p>
@@ -1363,7 +1363,7 @@
           <a:p>
             <a:fld id="{6D87B8C0-62AE-47C8-A8EF-FC863B0F06E5}" type="datetime1">
               <a:rPr lang="en-US" smtClean="0"/>
-              <a:t>6/1/2017</a:t>
+              <a:t>6/4/2017</a:t>
             </a:fld>
             <a:endParaRPr lang="en-US" dirty="0"/>
           </a:p>
@@ -1610,7 +1610,7 @@
           <a:p>
             <a:fld id="{A76C8472-C309-40FA-8240-FF6234B7F0D0}" type="datetime1">
               <a:rPr lang="en-US" smtClean="0"/>
-              <a:t>6/1/2017</a:t>
+              <a:t>6/4/2017</a:t>
             </a:fld>
             <a:endParaRPr lang="en-US" dirty="0"/>
           </a:p>
@@ -1899,7 +1899,7 @@
           <a:p>
             <a:fld id="{33196F6B-6F2E-418E-A1A6-2F06576F6EF7}" type="datetime1">
               <a:rPr lang="en-US" smtClean="0"/>
-              <a:t>6/1/2017</a:t>
+              <a:t>6/4/2017</a:t>
             </a:fld>
             <a:endParaRPr lang="en-US" dirty="0"/>
           </a:p>
@@ -2322,7 +2322,7 @@
           <a:p>
             <a:fld id="{D09CD6EC-2E00-46F1-9BD2-E1865A200410}" type="datetime1">
               <a:rPr lang="en-US" smtClean="0"/>
-              <a:t>6/1/2017</a:t>
+              <a:t>6/4/2017</a:t>
             </a:fld>
             <a:endParaRPr lang="en-US" dirty="0"/>
           </a:p>
@@ -2441,7 +2441,7 @@
           <a:p>
             <a:fld id="{C40B9E5A-6330-4749-ACDB-FB892FCFE6A5}" type="datetime1">
               <a:rPr lang="en-US" smtClean="0"/>
-              <a:t>6/1/2017</a:t>
+              <a:t>6/4/2017</a:t>
             </a:fld>
             <a:endParaRPr lang="en-US" dirty="0"/>
           </a:p>
@@ -2537,7 +2537,7 @@
           <a:p>
             <a:fld id="{1C181CB3-A768-4AD8-A97F-12E47CC1200D}" type="datetime1">
               <a:rPr lang="en-US" smtClean="0"/>
-              <a:t>6/1/2017</a:t>
+              <a:t>6/4/2017</a:t>
             </a:fld>
             <a:endParaRPr lang="en-US" dirty="0"/>
           </a:p>
@@ -2815,7 +2815,7 @@
           <a:p>
             <a:fld id="{AF3D8106-484C-46C6-8BE9-348BFA7F2DCB}" type="datetime1">
               <a:rPr lang="en-US" smtClean="0"/>
-              <a:t>6/1/2017</a:t>
+              <a:t>6/4/2017</a:t>
             </a:fld>
             <a:endParaRPr lang="en-US" dirty="0"/>
           </a:p>
@@ -3069,7 +3069,7 @@
           <a:p>
             <a:fld id="{F2A57B0D-110E-4AAD-9411-DA6CB39E8776}" type="datetime1">
               <a:rPr lang="en-US" smtClean="0"/>
-              <a:t>6/1/2017</a:t>
+              <a:t>6/4/2017</a:t>
             </a:fld>
             <a:endParaRPr lang="en-US" dirty="0"/>
           </a:p>
@@ -3302,7 +3302,7 @@
           <a:p>
             <a:fld id="{FB4B5B0E-55D6-4DAA-879D-58BBFFC7379B}" type="datetime1">
               <a:rPr lang="en-US" smtClean="0"/>
-              <a:t>6/1/2017</a:t>
+              <a:t>6/4/2017</a:t>
             </a:fld>
             <a:endParaRPr lang="en-US" dirty="0"/>
           </a:p>
@@ -4343,10 +4343,6 @@
               </a:rPr>
               <a:t>Capacitor selection aspects</a:t>
             </a:r>
-            <a:endParaRPr lang="en-US" sz="2800" u="sng" dirty="0" smtClean="0">
-              <a:latin typeface="Times New Roman" panose="02020603050405020304" pitchFamily="18" charset="0"/>
-              <a:cs typeface="Times New Roman" panose="02020603050405020304" pitchFamily="18" charset="0"/>
-            </a:endParaRPr>
           </a:p>
         </p:txBody>
       </p:sp>
@@ -10482,8 +10478,8 @@
         </p:nvSpPr>
         <p:spPr bwMode="auto">
           <a:xfrm>
-            <a:off x="1168426" y="4311644"/>
-            <a:ext cx="7954082" cy="2554545"/>
+            <a:off x="6348263" y="1149613"/>
+            <a:ext cx="2633964" cy="636072"/>
           </a:xfrm>
           <a:prstGeom prst="rect">
             <a:avLst/>
@@ -10509,27 +10505,32 @@
               </a:spcAft>
             </a:pPr>
             <a:r>
-              <a:rPr lang="tr-TR" sz="2000" b="1" dirty="0" smtClean="0">
-                <a:latin typeface="Times New Roman" panose="02020603050405020304" pitchFamily="18" charset="0"/>
-                <a:cs typeface="Times New Roman" panose="02020603050405020304" pitchFamily="18" charset="0"/>
-              </a:rPr>
-              <a:t>Low voltage</a:t>
-            </a:r>
-          </a:p>
-          <a:p>
-            <a:pPr marL="342900" indent="-342900" algn="l">
-              <a:spcAft>
-                <a:spcPts val="400"/>
-              </a:spcAft>
-              <a:buFont typeface="Courier New" panose="02070309020205020404" pitchFamily="49" charset="0"/>
-              <a:buChar char="o"/>
-            </a:pPr>
-            <a:r>
-              <a:rPr lang="tr-TR" sz="2000" dirty="0" smtClean="0">
-                <a:latin typeface="Times New Roman" panose="02020603050405020304" pitchFamily="18" charset="0"/>
-                <a:cs typeface="Times New Roman" panose="02020603050405020304" pitchFamily="18" charset="0"/>
-              </a:rPr>
-              <a:t>Power density and cost is bad, superior thermal performance</a:t>
+              <a:rPr lang="tr-TR" sz="1600" dirty="0" smtClean="0">
+                <a:latin typeface="Times New Roman" panose="02020603050405020304" pitchFamily="18" charset="0"/>
+                <a:cs typeface="Times New Roman" panose="02020603050405020304" pitchFamily="18" charset="0"/>
+              </a:rPr>
+              <a:t>10 </a:t>
+            </a:r>
+            <a:r>
+              <a:rPr lang="el-GR" sz="1600" dirty="0" smtClean="0">
+                <a:latin typeface="Times New Roman" panose="02020603050405020304" pitchFamily="18" charset="0"/>
+                <a:cs typeface="Times New Roman" panose="02020603050405020304" pitchFamily="18" charset="0"/>
+              </a:rPr>
+              <a:t>μ</a:t>
+            </a:r>
+            <a:r>
+              <a:rPr lang="tr-TR" sz="1600" dirty="0" smtClean="0">
+                <a:latin typeface="Times New Roman" panose="02020603050405020304" pitchFamily="18" charset="0"/>
+                <a:cs typeface="Times New Roman" panose="02020603050405020304" pitchFamily="18" charset="0"/>
+              </a:rPr>
+              <a:t>F, </a:t>
+            </a:r>
+            <a:r>
+              <a:rPr lang="tr-TR" sz="1600" dirty="0" smtClean="0">
+                <a:latin typeface="Times New Roman" panose="02020603050405020304" pitchFamily="18" charset="0"/>
+                <a:cs typeface="Times New Roman" panose="02020603050405020304" pitchFamily="18" charset="0"/>
+              </a:rPr>
+              <a:t>300 V</a:t>
             </a:r>
           </a:p>
           <a:p>
@@ -10539,88 +10540,16 @@
               </a:spcAft>
             </a:pPr>
             <a:r>
-              <a:rPr lang="tr-TR" sz="2000" b="1" dirty="0" smtClean="0">
-                <a:latin typeface="Times New Roman" panose="02020603050405020304" pitchFamily="18" charset="0"/>
-                <a:cs typeface="Times New Roman" panose="02020603050405020304" pitchFamily="18" charset="0"/>
-              </a:rPr>
-              <a:t>High voltage</a:t>
-            </a:r>
-          </a:p>
-          <a:p>
-            <a:pPr marL="342900" indent="-342900" algn="l">
-              <a:spcAft>
-                <a:spcPts val="400"/>
-              </a:spcAft>
-              <a:buFont typeface="Courier New" panose="02070309020205020404" pitchFamily="49" charset="0"/>
-              <a:buChar char="o"/>
-            </a:pPr>
-            <a:r>
-              <a:rPr lang="tr-TR" sz="2000" dirty="0" smtClean="0">
-                <a:latin typeface="Times New Roman" panose="02020603050405020304" pitchFamily="18" charset="0"/>
-                <a:cs typeface="Times New Roman" panose="02020603050405020304" pitchFamily="18" charset="0"/>
-              </a:rPr>
-              <a:t>Low capacitance yields high cost</a:t>
-            </a:r>
-          </a:p>
-          <a:p>
-            <a:pPr marL="342900" indent="-342900" algn="l">
-              <a:spcAft>
-                <a:spcPts val="400"/>
-              </a:spcAft>
-              <a:buFont typeface="Courier New" panose="02070309020205020404" pitchFamily="49" charset="0"/>
-              <a:buChar char="o"/>
-            </a:pPr>
-            <a:r>
-              <a:rPr lang="tr-TR" sz="2000" dirty="0" smtClean="0">
-                <a:latin typeface="Times New Roman" panose="02020603050405020304" pitchFamily="18" charset="0"/>
-                <a:cs typeface="Times New Roman" panose="02020603050405020304" pitchFamily="18" charset="0"/>
-              </a:rPr>
-              <a:t>High capacitance yields bad thermal performance</a:t>
-            </a:r>
-          </a:p>
-          <a:p>
-            <a:pPr algn="l">
-              <a:spcAft>
-                <a:spcPts val="400"/>
-              </a:spcAft>
-            </a:pPr>
-            <a:r>
-              <a:rPr lang="tr-TR" sz="2000" b="1" dirty="0" smtClean="0">
-                <a:latin typeface="Times New Roman" panose="02020603050405020304" pitchFamily="18" charset="0"/>
-                <a:cs typeface="Times New Roman" panose="02020603050405020304" pitchFamily="18" charset="0"/>
-              </a:rPr>
-              <a:t>Result:</a:t>
-            </a:r>
-          </a:p>
-          <a:p>
-            <a:pPr marL="342900" indent="-342900" algn="l">
-              <a:spcAft>
-                <a:spcPts val="400"/>
-              </a:spcAft>
-              <a:buFont typeface="Wingdings" panose="05000000000000000000" pitchFamily="2" charset="2"/>
-              <a:buChar char="ü"/>
-            </a:pPr>
-            <a:r>
-              <a:rPr lang="tr-TR" sz="2000" dirty="0" smtClean="0">
-                <a:latin typeface="Times New Roman" panose="02020603050405020304" pitchFamily="18" charset="0"/>
-                <a:cs typeface="Times New Roman" panose="02020603050405020304" pitchFamily="18" charset="0"/>
-              </a:rPr>
-              <a:t>4 25</a:t>
-            </a:r>
-            <a:r>
-              <a:rPr lang="el-GR" sz="2000" dirty="0" smtClean="0">
-                <a:latin typeface="Times New Roman" panose="02020603050405020304" pitchFamily="18" charset="0"/>
-                <a:cs typeface="Times New Roman" panose="02020603050405020304" pitchFamily="18" charset="0"/>
-              </a:rPr>
-              <a:t>μ</a:t>
-            </a:r>
-            <a:r>
-              <a:rPr lang="tr-TR" sz="2000" dirty="0" smtClean="0">
-                <a:latin typeface="Times New Roman" panose="02020603050405020304" pitchFamily="18" charset="0"/>
-                <a:cs typeface="Times New Roman" panose="02020603050405020304" pitchFamily="18" charset="0"/>
-              </a:rPr>
-              <a:t>F, 450V metal film capacitors connected in parallel</a:t>
-            </a:r>
+              <a:rPr lang="tr-TR" sz="1600" dirty="0" smtClean="0">
+                <a:latin typeface="Times New Roman" panose="02020603050405020304" pitchFamily="18" charset="0"/>
+                <a:cs typeface="Times New Roman" panose="02020603050405020304" pitchFamily="18" charset="0"/>
+              </a:rPr>
+              <a:t>2s, 10p</a:t>
+            </a:r>
+            <a:endParaRPr lang="tr-TR" sz="1600" dirty="0" smtClean="0">
+              <a:latin typeface="Times New Roman" panose="02020603050405020304" pitchFamily="18" charset="0"/>
+              <a:cs typeface="Times New Roman" panose="02020603050405020304" pitchFamily="18" charset="0"/>
+            </a:endParaRPr>
           </a:p>
         </p:txBody>
       </p:sp>
@@ -10697,22 +10626,28 @@
       </p:pic>
       <p:pic>
         <p:nvPicPr>
-          <p:cNvPr id="3" name="Picture 2"/>
+          <p:cNvPr id="31" name="Picture 30"/>
           <p:cNvPicPr>
             <a:picLocks noChangeAspect="1"/>
           </p:cNvPicPr>
           <p:nvPr/>
         </p:nvPicPr>
         <p:blipFill>
-          <a:blip r:embed="rId4"/>
+          <a:blip r:embed="rId4" cstate="print">
+            <a:extLst>
+              <a:ext uri="{28A0092B-C50C-407E-A947-70E740481C1C}">
+                <a14:useLocalDpi xmlns:a14="http://schemas.microsoft.com/office/drawing/2010/main" val="0"/>
+              </a:ext>
+            </a:extLst>
+          </a:blip>
           <a:stretch>
             <a:fillRect/>
           </a:stretch>
         </p:blipFill>
         <p:spPr>
           <a:xfrm>
-            <a:off x="4572000" y="1242398"/>
-            <a:ext cx="3300274" cy="3145446"/>
+            <a:off x="1220683" y="1360206"/>
+            <a:ext cx="485058" cy="485058"/>
           </a:xfrm>
           <a:prstGeom prst="rect">
             <a:avLst/>
@@ -10721,27 +10656,1726 @@
       </p:pic>
       <p:pic>
         <p:nvPicPr>
-          <p:cNvPr id="6" name="Picture 5"/>
+          <p:cNvPr id="32" name="Picture 31"/>
           <p:cNvPicPr>
             <a:picLocks noChangeAspect="1"/>
           </p:cNvPicPr>
           <p:nvPr/>
         </p:nvPicPr>
-        <p:blipFill rotWithShape="1">
-          <a:blip r:embed="rId5"/>
-          <a:srcRect r="2434"/>
-          <a:stretch/>
+        <p:blipFill>
+          <a:blip r:embed="rId4" cstate="print">
+            <a:extLst>
+              <a:ext uri="{28A0092B-C50C-407E-A947-70E740481C1C}">
+                <a14:useLocalDpi xmlns:a14="http://schemas.microsoft.com/office/drawing/2010/main" val="0"/>
+              </a:ext>
+            </a:extLst>
+          </a:blip>
+          <a:stretch>
+            <a:fillRect/>
+          </a:stretch>
         </p:blipFill>
         <p:spPr>
           <a:xfrm>
-            <a:off x="1295400" y="1424599"/>
-            <a:ext cx="3643203" cy="2943249"/>
+            <a:off x="1747151" y="1360206"/>
+            <a:ext cx="485058" cy="485058"/>
           </a:xfrm>
           <a:prstGeom prst="rect">
             <a:avLst/>
           </a:prstGeom>
         </p:spPr>
       </p:pic>
+      <p:pic>
+        <p:nvPicPr>
+          <p:cNvPr id="33" name="Picture 32"/>
+          <p:cNvPicPr>
+            <a:picLocks noChangeAspect="1"/>
+          </p:cNvPicPr>
+          <p:nvPr/>
+        </p:nvPicPr>
+        <p:blipFill>
+          <a:blip r:embed="rId4" cstate="print">
+            <a:extLst>
+              <a:ext uri="{28A0092B-C50C-407E-A947-70E740481C1C}">
+                <a14:useLocalDpi xmlns:a14="http://schemas.microsoft.com/office/drawing/2010/main" val="0"/>
+              </a:ext>
+            </a:extLst>
+          </a:blip>
+          <a:stretch>
+            <a:fillRect/>
+          </a:stretch>
+        </p:blipFill>
+        <p:spPr>
+          <a:xfrm>
+            <a:off x="2797127" y="1405043"/>
+            <a:ext cx="485058" cy="485058"/>
+          </a:xfrm>
+          <a:prstGeom prst="rect">
+            <a:avLst/>
+          </a:prstGeom>
+        </p:spPr>
+      </p:pic>
+      <p:pic>
+        <p:nvPicPr>
+          <p:cNvPr id="34" name="Picture 33"/>
+          <p:cNvPicPr>
+            <a:picLocks noChangeAspect="1"/>
+          </p:cNvPicPr>
+          <p:nvPr/>
+        </p:nvPicPr>
+        <p:blipFill>
+          <a:blip r:embed="rId4" cstate="print">
+            <a:extLst>
+              <a:ext uri="{28A0092B-C50C-407E-A947-70E740481C1C}">
+                <a14:useLocalDpi xmlns:a14="http://schemas.microsoft.com/office/drawing/2010/main" val="0"/>
+              </a:ext>
+            </a:extLst>
+          </a:blip>
+          <a:stretch>
+            <a:fillRect/>
+          </a:stretch>
+        </p:blipFill>
+        <p:spPr>
+          <a:xfrm>
+            <a:off x="3323434" y="1405043"/>
+            <a:ext cx="485058" cy="485058"/>
+          </a:xfrm>
+          <a:prstGeom prst="rect">
+            <a:avLst/>
+          </a:prstGeom>
+        </p:spPr>
+      </p:pic>
+      <p:pic>
+        <p:nvPicPr>
+          <p:cNvPr id="35" name="Picture 34"/>
+          <p:cNvPicPr>
+            <a:picLocks noChangeAspect="1"/>
+          </p:cNvPicPr>
+          <p:nvPr/>
+        </p:nvPicPr>
+        <p:blipFill>
+          <a:blip r:embed="rId4" cstate="print">
+            <a:extLst>
+              <a:ext uri="{28A0092B-C50C-407E-A947-70E740481C1C}">
+                <a14:useLocalDpi xmlns:a14="http://schemas.microsoft.com/office/drawing/2010/main" val="0"/>
+              </a:ext>
+            </a:extLst>
+          </a:blip>
+          <a:stretch>
+            <a:fillRect/>
+          </a:stretch>
+        </p:blipFill>
+        <p:spPr>
+          <a:xfrm>
+            <a:off x="2276651" y="1391602"/>
+            <a:ext cx="485058" cy="485058"/>
+          </a:xfrm>
+          <a:prstGeom prst="rect">
+            <a:avLst/>
+          </a:prstGeom>
+        </p:spPr>
+      </p:pic>
+      <p:pic>
+        <p:nvPicPr>
+          <p:cNvPr id="37" name="Picture 36"/>
+          <p:cNvPicPr>
+            <a:picLocks noChangeAspect="1"/>
+          </p:cNvPicPr>
+          <p:nvPr/>
+        </p:nvPicPr>
+        <p:blipFill>
+          <a:blip r:embed="rId4" cstate="print">
+            <a:extLst>
+              <a:ext uri="{28A0092B-C50C-407E-A947-70E740481C1C}">
+                <a14:useLocalDpi xmlns:a14="http://schemas.microsoft.com/office/drawing/2010/main" val="0"/>
+              </a:ext>
+            </a:extLst>
+          </a:blip>
+          <a:stretch>
+            <a:fillRect/>
+          </a:stretch>
+        </p:blipFill>
+        <p:spPr>
+          <a:xfrm>
+            <a:off x="3808616" y="1390963"/>
+            <a:ext cx="485058" cy="485058"/>
+          </a:xfrm>
+          <a:prstGeom prst="rect">
+            <a:avLst/>
+          </a:prstGeom>
+        </p:spPr>
+      </p:pic>
+      <p:pic>
+        <p:nvPicPr>
+          <p:cNvPr id="38" name="Picture 37"/>
+          <p:cNvPicPr>
+            <a:picLocks noChangeAspect="1"/>
+          </p:cNvPicPr>
+          <p:nvPr/>
+        </p:nvPicPr>
+        <p:blipFill>
+          <a:blip r:embed="rId4" cstate="print">
+            <a:extLst>
+              <a:ext uri="{28A0092B-C50C-407E-A947-70E740481C1C}">
+                <a14:useLocalDpi xmlns:a14="http://schemas.microsoft.com/office/drawing/2010/main" val="0"/>
+              </a:ext>
+            </a:extLst>
+          </a:blip>
+          <a:stretch>
+            <a:fillRect/>
+          </a:stretch>
+        </p:blipFill>
+        <p:spPr>
+          <a:xfrm>
+            <a:off x="4286798" y="1365327"/>
+            <a:ext cx="485058" cy="485058"/>
+          </a:xfrm>
+          <a:prstGeom prst="rect">
+            <a:avLst/>
+          </a:prstGeom>
+        </p:spPr>
+      </p:pic>
+      <p:pic>
+        <p:nvPicPr>
+          <p:cNvPr id="39" name="Picture 38"/>
+          <p:cNvPicPr>
+            <a:picLocks noChangeAspect="1"/>
+          </p:cNvPicPr>
+          <p:nvPr/>
+        </p:nvPicPr>
+        <p:blipFill>
+          <a:blip r:embed="rId4" cstate="print">
+            <a:extLst>
+              <a:ext uri="{28A0092B-C50C-407E-A947-70E740481C1C}">
+                <a14:useLocalDpi xmlns:a14="http://schemas.microsoft.com/office/drawing/2010/main" val="0"/>
+              </a:ext>
+            </a:extLst>
+          </a:blip>
+          <a:stretch>
+            <a:fillRect/>
+          </a:stretch>
+        </p:blipFill>
+        <p:spPr>
+          <a:xfrm>
+            <a:off x="4778856" y="1381514"/>
+            <a:ext cx="485058" cy="485058"/>
+          </a:xfrm>
+          <a:prstGeom prst="rect">
+            <a:avLst/>
+          </a:prstGeom>
+        </p:spPr>
+      </p:pic>
+      <p:pic>
+        <p:nvPicPr>
+          <p:cNvPr id="40" name="Picture 39"/>
+          <p:cNvPicPr>
+            <a:picLocks noChangeAspect="1"/>
+          </p:cNvPicPr>
+          <p:nvPr/>
+        </p:nvPicPr>
+        <p:blipFill>
+          <a:blip r:embed="rId4" cstate="print">
+            <a:extLst>
+              <a:ext uri="{28A0092B-C50C-407E-A947-70E740481C1C}">
+                <a14:useLocalDpi xmlns:a14="http://schemas.microsoft.com/office/drawing/2010/main" val="0"/>
+              </a:ext>
+            </a:extLst>
+          </a:blip>
+          <a:stretch>
+            <a:fillRect/>
+          </a:stretch>
+        </p:blipFill>
+        <p:spPr>
+          <a:xfrm>
+            <a:off x="5270914" y="1413106"/>
+            <a:ext cx="485058" cy="485058"/>
+          </a:xfrm>
+          <a:prstGeom prst="rect">
+            <a:avLst/>
+          </a:prstGeom>
+        </p:spPr>
+      </p:pic>
+      <p:pic>
+        <p:nvPicPr>
+          <p:cNvPr id="41" name="Picture 40"/>
+          <p:cNvPicPr>
+            <a:picLocks noChangeAspect="1"/>
+          </p:cNvPicPr>
+          <p:nvPr/>
+        </p:nvPicPr>
+        <p:blipFill>
+          <a:blip r:embed="rId4" cstate="print">
+            <a:extLst>
+              <a:ext uri="{28A0092B-C50C-407E-A947-70E740481C1C}">
+                <a14:useLocalDpi xmlns:a14="http://schemas.microsoft.com/office/drawing/2010/main" val="0"/>
+              </a:ext>
+            </a:extLst>
+          </a:blip>
+          <a:stretch>
+            <a:fillRect/>
+          </a:stretch>
+        </p:blipFill>
+        <p:spPr>
+          <a:xfrm>
+            <a:off x="5758557" y="1401869"/>
+            <a:ext cx="485058" cy="485058"/>
+          </a:xfrm>
+          <a:prstGeom prst="rect">
+            <a:avLst/>
+          </a:prstGeom>
+        </p:spPr>
+      </p:pic>
+      <p:pic>
+        <p:nvPicPr>
+          <p:cNvPr id="43" name="Picture 42"/>
+          <p:cNvPicPr>
+            <a:picLocks noChangeAspect="1"/>
+          </p:cNvPicPr>
+          <p:nvPr/>
+        </p:nvPicPr>
+        <p:blipFill>
+          <a:blip r:embed="rId4" cstate="print">
+            <a:extLst>
+              <a:ext uri="{28A0092B-C50C-407E-A947-70E740481C1C}">
+                <a14:useLocalDpi xmlns:a14="http://schemas.microsoft.com/office/drawing/2010/main" val="0"/>
+              </a:ext>
+            </a:extLst>
+          </a:blip>
+          <a:stretch>
+            <a:fillRect/>
+          </a:stretch>
+        </p:blipFill>
+        <p:spPr>
+          <a:xfrm>
+            <a:off x="1176241" y="1856001"/>
+            <a:ext cx="485058" cy="485058"/>
+          </a:xfrm>
+          <a:prstGeom prst="rect">
+            <a:avLst/>
+          </a:prstGeom>
+        </p:spPr>
+      </p:pic>
+      <p:pic>
+        <p:nvPicPr>
+          <p:cNvPr id="44" name="Picture 43"/>
+          <p:cNvPicPr>
+            <a:picLocks noChangeAspect="1"/>
+          </p:cNvPicPr>
+          <p:nvPr/>
+        </p:nvPicPr>
+        <p:blipFill>
+          <a:blip r:embed="rId4" cstate="print">
+            <a:extLst>
+              <a:ext uri="{28A0092B-C50C-407E-A947-70E740481C1C}">
+                <a14:useLocalDpi xmlns:a14="http://schemas.microsoft.com/office/drawing/2010/main" val="0"/>
+              </a:ext>
+            </a:extLst>
+          </a:blip>
+          <a:stretch>
+            <a:fillRect/>
+          </a:stretch>
+        </p:blipFill>
+        <p:spPr>
+          <a:xfrm>
+            <a:off x="1702709" y="1856001"/>
+            <a:ext cx="485058" cy="485058"/>
+          </a:xfrm>
+          <a:prstGeom prst="rect">
+            <a:avLst/>
+          </a:prstGeom>
+        </p:spPr>
+      </p:pic>
+      <p:pic>
+        <p:nvPicPr>
+          <p:cNvPr id="45" name="Picture 44"/>
+          <p:cNvPicPr>
+            <a:picLocks noChangeAspect="1"/>
+          </p:cNvPicPr>
+          <p:nvPr/>
+        </p:nvPicPr>
+        <p:blipFill>
+          <a:blip r:embed="rId4" cstate="print">
+            <a:extLst>
+              <a:ext uri="{28A0092B-C50C-407E-A947-70E740481C1C}">
+                <a14:useLocalDpi xmlns:a14="http://schemas.microsoft.com/office/drawing/2010/main" val="0"/>
+              </a:ext>
+            </a:extLst>
+          </a:blip>
+          <a:stretch>
+            <a:fillRect/>
+          </a:stretch>
+        </p:blipFill>
+        <p:spPr>
+          <a:xfrm>
+            <a:off x="2752685" y="1900838"/>
+            <a:ext cx="485058" cy="485058"/>
+          </a:xfrm>
+          <a:prstGeom prst="rect">
+            <a:avLst/>
+          </a:prstGeom>
+        </p:spPr>
+      </p:pic>
+      <p:pic>
+        <p:nvPicPr>
+          <p:cNvPr id="46" name="Picture 45"/>
+          <p:cNvPicPr>
+            <a:picLocks noChangeAspect="1"/>
+          </p:cNvPicPr>
+          <p:nvPr/>
+        </p:nvPicPr>
+        <p:blipFill>
+          <a:blip r:embed="rId4" cstate="print">
+            <a:extLst>
+              <a:ext uri="{28A0092B-C50C-407E-A947-70E740481C1C}">
+                <a14:useLocalDpi xmlns:a14="http://schemas.microsoft.com/office/drawing/2010/main" val="0"/>
+              </a:ext>
+            </a:extLst>
+          </a:blip>
+          <a:stretch>
+            <a:fillRect/>
+          </a:stretch>
+        </p:blipFill>
+        <p:spPr>
+          <a:xfrm>
+            <a:off x="3278992" y="1900838"/>
+            <a:ext cx="485058" cy="485058"/>
+          </a:xfrm>
+          <a:prstGeom prst="rect">
+            <a:avLst/>
+          </a:prstGeom>
+        </p:spPr>
+      </p:pic>
+      <p:pic>
+        <p:nvPicPr>
+          <p:cNvPr id="47" name="Picture 46"/>
+          <p:cNvPicPr>
+            <a:picLocks noChangeAspect="1"/>
+          </p:cNvPicPr>
+          <p:nvPr/>
+        </p:nvPicPr>
+        <p:blipFill>
+          <a:blip r:embed="rId4" cstate="print">
+            <a:extLst>
+              <a:ext uri="{28A0092B-C50C-407E-A947-70E740481C1C}">
+                <a14:useLocalDpi xmlns:a14="http://schemas.microsoft.com/office/drawing/2010/main" val="0"/>
+              </a:ext>
+            </a:extLst>
+          </a:blip>
+          <a:stretch>
+            <a:fillRect/>
+          </a:stretch>
+        </p:blipFill>
+        <p:spPr>
+          <a:xfrm>
+            <a:off x="2232209" y="1887397"/>
+            <a:ext cx="485058" cy="485058"/>
+          </a:xfrm>
+          <a:prstGeom prst="rect">
+            <a:avLst/>
+          </a:prstGeom>
+        </p:spPr>
+      </p:pic>
+      <p:pic>
+        <p:nvPicPr>
+          <p:cNvPr id="48" name="Picture 47"/>
+          <p:cNvPicPr>
+            <a:picLocks noChangeAspect="1"/>
+          </p:cNvPicPr>
+          <p:nvPr/>
+        </p:nvPicPr>
+        <p:blipFill>
+          <a:blip r:embed="rId4" cstate="print">
+            <a:extLst>
+              <a:ext uri="{28A0092B-C50C-407E-A947-70E740481C1C}">
+                <a14:useLocalDpi xmlns:a14="http://schemas.microsoft.com/office/drawing/2010/main" val="0"/>
+              </a:ext>
+            </a:extLst>
+          </a:blip>
+          <a:stretch>
+            <a:fillRect/>
+          </a:stretch>
+        </p:blipFill>
+        <p:spPr>
+          <a:xfrm>
+            <a:off x="3764174" y="1886758"/>
+            <a:ext cx="485058" cy="485058"/>
+          </a:xfrm>
+          <a:prstGeom prst="rect">
+            <a:avLst/>
+          </a:prstGeom>
+        </p:spPr>
+      </p:pic>
+      <p:pic>
+        <p:nvPicPr>
+          <p:cNvPr id="49" name="Picture 48"/>
+          <p:cNvPicPr>
+            <a:picLocks noChangeAspect="1"/>
+          </p:cNvPicPr>
+          <p:nvPr/>
+        </p:nvPicPr>
+        <p:blipFill>
+          <a:blip r:embed="rId4" cstate="print">
+            <a:extLst>
+              <a:ext uri="{28A0092B-C50C-407E-A947-70E740481C1C}">
+                <a14:useLocalDpi xmlns:a14="http://schemas.microsoft.com/office/drawing/2010/main" val="0"/>
+              </a:ext>
+            </a:extLst>
+          </a:blip>
+          <a:stretch>
+            <a:fillRect/>
+          </a:stretch>
+        </p:blipFill>
+        <p:spPr>
+          <a:xfrm>
+            <a:off x="4242356" y="1861122"/>
+            <a:ext cx="485058" cy="485058"/>
+          </a:xfrm>
+          <a:prstGeom prst="rect">
+            <a:avLst/>
+          </a:prstGeom>
+        </p:spPr>
+      </p:pic>
+      <p:pic>
+        <p:nvPicPr>
+          <p:cNvPr id="50" name="Picture 49"/>
+          <p:cNvPicPr>
+            <a:picLocks noChangeAspect="1"/>
+          </p:cNvPicPr>
+          <p:nvPr/>
+        </p:nvPicPr>
+        <p:blipFill>
+          <a:blip r:embed="rId4" cstate="print">
+            <a:extLst>
+              <a:ext uri="{28A0092B-C50C-407E-A947-70E740481C1C}">
+                <a14:useLocalDpi xmlns:a14="http://schemas.microsoft.com/office/drawing/2010/main" val="0"/>
+              </a:ext>
+            </a:extLst>
+          </a:blip>
+          <a:stretch>
+            <a:fillRect/>
+          </a:stretch>
+        </p:blipFill>
+        <p:spPr>
+          <a:xfrm>
+            <a:off x="4734414" y="1877309"/>
+            <a:ext cx="485058" cy="485058"/>
+          </a:xfrm>
+          <a:prstGeom prst="rect">
+            <a:avLst/>
+          </a:prstGeom>
+        </p:spPr>
+      </p:pic>
+      <p:pic>
+        <p:nvPicPr>
+          <p:cNvPr id="51" name="Picture 50"/>
+          <p:cNvPicPr>
+            <a:picLocks noChangeAspect="1"/>
+          </p:cNvPicPr>
+          <p:nvPr/>
+        </p:nvPicPr>
+        <p:blipFill>
+          <a:blip r:embed="rId4" cstate="print">
+            <a:extLst>
+              <a:ext uri="{28A0092B-C50C-407E-A947-70E740481C1C}">
+                <a14:useLocalDpi xmlns:a14="http://schemas.microsoft.com/office/drawing/2010/main" val="0"/>
+              </a:ext>
+            </a:extLst>
+          </a:blip>
+          <a:stretch>
+            <a:fillRect/>
+          </a:stretch>
+        </p:blipFill>
+        <p:spPr>
+          <a:xfrm>
+            <a:off x="5226472" y="1908901"/>
+            <a:ext cx="485058" cy="485058"/>
+          </a:xfrm>
+          <a:prstGeom prst="rect">
+            <a:avLst/>
+          </a:prstGeom>
+        </p:spPr>
+      </p:pic>
+      <p:pic>
+        <p:nvPicPr>
+          <p:cNvPr id="52" name="Picture 51"/>
+          <p:cNvPicPr>
+            <a:picLocks noChangeAspect="1"/>
+          </p:cNvPicPr>
+          <p:nvPr/>
+        </p:nvPicPr>
+        <p:blipFill>
+          <a:blip r:embed="rId4" cstate="print">
+            <a:extLst>
+              <a:ext uri="{28A0092B-C50C-407E-A947-70E740481C1C}">
+                <a14:useLocalDpi xmlns:a14="http://schemas.microsoft.com/office/drawing/2010/main" val="0"/>
+              </a:ext>
+            </a:extLst>
+          </a:blip>
+          <a:stretch>
+            <a:fillRect/>
+          </a:stretch>
+        </p:blipFill>
+        <p:spPr>
+          <a:xfrm>
+            <a:off x="5714115" y="1897664"/>
+            <a:ext cx="485058" cy="485058"/>
+          </a:xfrm>
+          <a:prstGeom prst="rect">
+            <a:avLst/>
+          </a:prstGeom>
+        </p:spPr>
+      </p:pic>
+      <p:sp>
+        <p:nvSpPr>
+          <p:cNvPr id="53" name="Text Box 9"/>
+          <p:cNvSpPr txBox="1">
+            <a:spLocks noChangeArrowheads="1"/>
+          </p:cNvSpPr>
+          <p:nvPr/>
+        </p:nvSpPr>
+        <p:spPr bwMode="auto">
+          <a:xfrm>
+            <a:off x="6350176" y="1832533"/>
+            <a:ext cx="2539647" cy="697627"/>
+          </a:xfrm>
+          <a:prstGeom prst="rect">
+            <a:avLst/>
+          </a:prstGeom>
+          <a:noFill/>
+          <a:ln w="9525">
+            <a:noFill/>
+            <a:miter lim="800000"/>
+            <a:headEnd/>
+            <a:tailEnd/>
+          </a:ln>
+          <a:effectLst/>
+        </p:spPr>
+        <p:txBody>
+          <a:bodyPr wrap="square">
+            <a:spAutoFit/>
+          </a:bodyPr>
+          <a:lstStyle/>
+          <a:p>
+            <a:pPr marL="285750" indent="-285750" algn="l">
+              <a:spcAft>
+                <a:spcPts val="400"/>
+              </a:spcAft>
+              <a:buFont typeface="Wingdings" panose="05000000000000000000" pitchFamily="2" charset="2"/>
+              <a:buChar char="v"/>
+            </a:pPr>
+            <a:r>
+              <a:rPr lang="tr-TR" dirty="0" smtClean="0">
+                <a:latin typeface="Times New Roman" panose="02020603050405020304" pitchFamily="18" charset="0"/>
+                <a:cs typeface="Times New Roman" panose="02020603050405020304" pitchFamily="18" charset="0"/>
+              </a:rPr>
+              <a:t>High </a:t>
+            </a:r>
+            <a:r>
+              <a:rPr lang="tr-TR" dirty="0" err="1" smtClean="0">
+                <a:latin typeface="Times New Roman" panose="02020603050405020304" pitchFamily="18" charset="0"/>
+                <a:cs typeface="Times New Roman" panose="02020603050405020304" pitchFamily="18" charset="0"/>
+              </a:rPr>
+              <a:t>cost</a:t>
+            </a:r>
+            <a:endParaRPr lang="tr-TR" dirty="0" smtClean="0">
+              <a:latin typeface="Times New Roman" panose="02020603050405020304" pitchFamily="18" charset="0"/>
+              <a:cs typeface="Times New Roman" panose="02020603050405020304" pitchFamily="18" charset="0"/>
+            </a:endParaRPr>
+          </a:p>
+          <a:p>
+            <a:pPr marL="285750" indent="-285750" algn="l">
+              <a:spcAft>
+                <a:spcPts val="400"/>
+              </a:spcAft>
+              <a:buFont typeface="Wingdings" panose="05000000000000000000" pitchFamily="2" charset="2"/>
+              <a:buChar char="v"/>
+            </a:pPr>
+            <a:r>
+              <a:rPr lang="tr-TR" dirty="0" err="1" smtClean="0">
+                <a:latin typeface="Times New Roman" panose="02020603050405020304" pitchFamily="18" charset="0"/>
+                <a:cs typeface="Times New Roman" panose="02020603050405020304" pitchFamily="18" charset="0"/>
+              </a:rPr>
+              <a:t>Low</a:t>
+            </a:r>
+            <a:r>
+              <a:rPr lang="tr-TR" dirty="0" smtClean="0">
+                <a:latin typeface="Times New Roman" panose="02020603050405020304" pitchFamily="18" charset="0"/>
+                <a:cs typeface="Times New Roman" panose="02020603050405020304" pitchFamily="18" charset="0"/>
+              </a:rPr>
+              <a:t> </a:t>
+            </a:r>
+            <a:r>
+              <a:rPr lang="tr-TR" dirty="0" err="1" smtClean="0">
+                <a:latin typeface="Times New Roman" panose="02020603050405020304" pitchFamily="18" charset="0"/>
+                <a:cs typeface="Times New Roman" panose="02020603050405020304" pitchFamily="18" charset="0"/>
+              </a:rPr>
+              <a:t>power</a:t>
+            </a:r>
+            <a:r>
+              <a:rPr lang="tr-TR" dirty="0" smtClean="0">
+                <a:latin typeface="Times New Roman" panose="02020603050405020304" pitchFamily="18" charset="0"/>
+                <a:cs typeface="Times New Roman" panose="02020603050405020304" pitchFamily="18" charset="0"/>
+              </a:rPr>
+              <a:t> </a:t>
+            </a:r>
+            <a:r>
+              <a:rPr lang="tr-TR" dirty="0" err="1" smtClean="0">
+                <a:latin typeface="Times New Roman" panose="02020603050405020304" pitchFamily="18" charset="0"/>
+                <a:cs typeface="Times New Roman" panose="02020603050405020304" pitchFamily="18" charset="0"/>
+              </a:rPr>
+              <a:t>density</a:t>
+            </a:r>
+            <a:endParaRPr lang="tr-TR" dirty="0" smtClean="0">
+              <a:latin typeface="Times New Roman" panose="02020603050405020304" pitchFamily="18" charset="0"/>
+              <a:cs typeface="Times New Roman" panose="02020603050405020304" pitchFamily="18" charset="0"/>
+            </a:endParaRPr>
+          </a:p>
+        </p:txBody>
+      </p:sp>
+      <p:pic>
+        <p:nvPicPr>
+          <p:cNvPr id="5" name="Picture 4"/>
+          <p:cNvPicPr>
+            <a:picLocks noChangeAspect="1"/>
+          </p:cNvPicPr>
+          <p:nvPr/>
+        </p:nvPicPr>
+        <p:blipFill>
+          <a:blip r:embed="rId5" cstate="print">
+            <a:extLst>
+              <a:ext uri="{28A0092B-C50C-407E-A947-70E740481C1C}">
+                <a14:useLocalDpi xmlns:a14="http://schemas.microsoft.com/office/drawing/2010/main" val="0"/>
+              </a:ext>
+            </a:extLst>
+          </a:blip>
+          <a:stretch>
+            <a:fillRect/>
+          </a:stretch>
+        </p:blipFill>
+        <p:spPr>
+          <a:xfrm>
+            <a:off x="1160611" y="2902141"/>
+            <a:ext cx="688171" cy="688171"/>
+          </a:xfrm>
+          <a:prstGeom prst="rect">
+            <a:avLst/>
+          </a:prstGeom>
+        </p:spPr>
+      </p:pic>
+      <p:pic>
+        <p:nvPicPr>
+          <p:cNvPr id="55" name="Picture 54"/>
+          <p:cNvPicPr>
+            <a:picLocks noChangeAspect="1"/>
+          </p:cNvPicPr>
+          <p:nvPr/>
+        </p:nvPicPr>
+        <p:blipFill>
+          <a:blip r:embed="rId5" cstate="print">
+            <a:extLst>
+              <a:ext uri="{28A0092B-C50C-407E-A947-70E740481C1C}">
+                <a14:useLocalDpi xmlns:a14="http://schemas.microsoft.com/office/drawing/2010/main" val="0"/>
+              </a:ext>
+            </a:extLst>
+          </a:blip>
+          <a:stretch>
+            <a:fillRect/>
+          </a:stretch>
+        </p:blipFill>
+        <p:spPr>
+          <a:xfrm>
+            <a:off x="1894904" y="2878093"/>
+            <a:ext cx="688171" cy="688171"/>
+          </a:xfrm>
+          <a:prstGeom prst="rect">
+            <a:avLst/>
+          </a:prstGeom>
+        </p:spPr>
+      </p:pic>
+      <p:pic>
+        <p:nvPicPr>
+          <p:cNvPr id="56" name="Picture 55"/>
+          <p:cNvPicPr>
+            <a:picLocks noChangeAspect="1"/>
+          </p:cNvPicPr>
+          <p:nvPr/>
+        </p:nvPicPr>
+        <p:blipFill>
+          <a:blip r:embed="rId5" cstate="print">
+            <a:extLst>
+              <a:ext uri="{28A0092B-C50C-407E-A947-70E740481C1C}">
+                <a14:useLocalDpi xmlns:a14="http://schemas.microsoft.com/office/drawing/2010/main" val="0"/>
+              </a:ext>
+            </a:extLst>
+          </a:blip>
+          <a:stretch>
+            <a:fillRect/>
+          </a:stretch>
+        </p:blipFill>
+        <p:spPr>
+          <a:xfrm>
+            <a:off x="2651556" y="2945085"/>
+            <a:ext cx="688171" cy="688171"/>
+          </a:xfrm>
+          <a:prstGeom prst="rect">
+            <a:avLst/>
+          </a:prstGeom>
+        </p:spPr>
+      </p:pic>
+      <p:pic>
+        <p:nvPicPr>
+          <p:cNvPr id="57" name="Picture 56"/>
+          <p:cNvPicPr>
+            <a:picLocks noChangeAspect="1"/>
+          </p:cNvPicPr>
+          <p:nvPr/>
+        </p:nvPicPr>
+        <p:blipFill>
+          <a:blip r:embed="rId5" cstate="print">
+            <a:extLst>
+              <a:ext uri="{28A0092B-C50C-407E-A947-70E740481C1C}">
+                <a14:useLocalDpi xmlns:a14="http://schemas.microsoft.com/office/drawing/2010/main" val="0"/>
+              </a:ext>
+            </a:extLst>
+          </a:blip>
+          <a:stretch>
+            <a:fillRect/>
+          </a:stretch>
+        </p:blipFill>
+        <p:spPr>
+          <a:xfrm>
+            <a:off x="1160610" y="3650380"/>
+            <a:ext cx="688171" cy="688171"/>
+          </a:xfrm>
+          <a:prstGeom prst="rect">
+            <a:avLst/>
+          </a:prstGeom>
+        </p:spPr>
+      </p:pic>
+      <p:pic>
+        <p:nvPicPr>
+          <p:cNvPr id="58" name="Picture 57"/>
+          <p:cNvPicPr>
+            <a:picLocks noChangeAspect="1"/>
+          </p:cNvPicPr>
+          <p:nvPr/>
+        </p:nvPicPr>
+        <p:blipFill>
+          <a:blip r:embed="rId5" cstate="print">
+            <a:extLst>
+              <a:ext uri="{28A0092B-C50C-407E-A947-70E740481C1C}">
+                <a14:useLocalDpi xmlns:a14="http://schemas.microsoft.com/office/drawing/2010/main" val="0"/>
+              </a:ext>
+            </a:extLst>
+          </a:blip>
+          <a:stretch>
+            <a:fillRect/>
+          </a:stretch>
+        </p:blipFill>
+        <p:spPr>
+          <a:xfrm>
+            <a:off x="1895176" y="3641861"/>
+            <a:ext cx="688171" cy="688171"/>
+          </a:xfrm>
+          <a:prstGeom prst="rect">
+            <a:avLst/>
+          </a:prstGeom>
+        </p:spPr>
+      </p:pic>
+      <p:pic>
+        <p:nvPicPr>
+          <p:cNvPr id="59" name="Picture 58"/>
+          <p:cNvPicPr>
+            <a:picLocks noChangeAspect="1"/>
+          </p:cNvPicPr>
+          <p:nvPr/>
+        </p:nvPicPr>
+        <p:blipFill>
+          <a:blip r:embed="rId5" cstate="print">
+            <a:extLst>
+              <a:ext uri="{28A0092B-C50C-407E-A947-70E740481C1C}">
+                <a14:useLocalDpi xmlns:a14="http://schemas.microsoft.com/office/drawing/2010/main" val="0"/>
+              </a:ext>
+            </a:extLst>
+          </a:blip>
+          <a:stretch>
+            <a:fillRect/>
+          </a:stretch>
+        </p:blipFill>
+        <p:spPr>
+          <a:xfrm>
+            <a:off x="2634425" y="3681743"/>
+            <a:ext cx="688171" cy="688171"/>
+          </a:xfrm>
+          <a:prstGeom prst="rect">
+            <a:avLst/>
+          </a:prstGeom>
+        </p:spPr>
+      </p:pic>
+      <p:sp>
+        <p:nvSpPr>
+          <p:cNvPr id="60" name="Text Box 9"/>
+          <p:cNvSpPr txBox="1">
+            <a:spLocks noChangeArrowheads="1"/>
+          </p:cNvSpPr>
+          <p:nvPr/>
+        </p:nvSpPr>
+        <p:spPr bwMode="auto">
+          <a:xfrm>
+            <a:off x="3415337" y="2782766"/>
+            <a:ext cx="1330118" cy="636072"/>
+          </a:xfrm>
+          <a:prstGeom prst="rect">
+            <a:avLst/>
+          </a:prstGeom>
+          <a:noFill/>
+          <a:ln w="9525">
+            <a:noFill/>
+            <a:miter lim="800000"/>
+            <a:headEnd/>
+            <a:tailEnd/>
+          </a:ln>
+          <a:effectLst/>
+        </p:spPr>
+        <p:txBody>
+          <a:bodyPr wrap="square">
+            <a:spAutoFit/>
+          </a:bodyPr>
+          <a:lstStyle/>
+          <a:p>
+            <a:pPr algn="l">
+              <a:spcAft>
+                <a:spcPts val="400"/>
+              </a:spcAft>
+            </a:pPr>
+            <a:r>
+              <a:rPr lang="tr-TR" sz="1600" dirty="0">
+                <a:latin typeface="Times New Roman" panose="02020603050405020304" pitchFamily="18" charset="0"/>
+                <a:cs typeface="Times New Roman" panose="02020603050405020304" pitchFamily="18" charset="0"/>
+              </a:rPr>
+              <a:t>4</a:t>
+            </a:r>
+            <a:r>
+              <a:rPr lang="tr-TR" sz="1600" dirty="0" smtClean="0">
+                <a:latin typeface="Times New Roman" panose="02020603050405020304" pitchFamily="18" charset="0"/>
+                <a:cs typeface="Times New Roman" panose="02020603050405020304" pitchFamily="18" charset="0"/>
+              </a:rPr>
+              <a:t>0 </a:t>
+            </a:r>
+            <a:r>
+              <a:rPr lang="el-GR" sz="1600" dirty="0" smtClean="0">
+                <a:latin typeface="Times New Roman" panose="02020603050405020304" pitchFamily="18" charset="0"/>
+                <a:cs typeface="Times New Roman" panose="02020603050405020304" pitchFamily="18" charset="0"/>
+              </a:rPr>
+              <a:t>μ</a:t>
+            </a:r>
+            <a:r>
+              <a:rPr lang="tr-TR" sz="1600" dirty="0" smtClean="0">
+                <a:latin typeface="Times New Roman" panose="02020603050405020304" pitchFamily="18" charset="0"/>
+                <a:cs typeface="Times New Roman" panose="02020603050405020304" pitchFamily="18" charset="0"/>
+              </a:rPr>
+              <a:t>F, </a:t>
+            </a:r>
+            <a:r>
+              <a:rPr lang="tr-TR" sz="1600" dirty="0" smtClean="0">
+                <a:latin typeface="Times New Roman" panose="02020603050405020304" pitchFamily="18" charset="0"/>
+                <a:cs typeface="Times New Roman" panose="02020603050405020304" pitchFamily="18" charset="0"/>
+              </a:rPr>
+              <a:t>300 V</a:t>
+            </a:r>
+          </a:p>
+          <a:p>
+            <a:pPr algn="l">
+              <a:spcAft>
+                <a:spcPts val="400"/>
+              </a:spcAft>
+            </a:pPr>
+            <a:r>
+              <a:rPr lang="tr-TR" sz="1600" dirty="0" smtClean="0">
+                <a:latin typeface="Times New Roman" panose="02020603050405020304" pitchFamily="18" charset="0"/>
+                <a:cs typeface="Times New Roman" panose="02020603050405020304" pitchFamily="18" charset="0"/>
+              </a:rPr>
+              <a:t>2s, 3p</a:t>
+            </a:r>
+            <a:endParaRPr lang="tr-TR" sz="1600" dirty="0" smtClean="0">
+              <a:latin typeface="Times New Roman" panose="02020603050405020304" pitchFamily="18" charset="0"/>
+              <a:cs typeface="Times New Roman" panose="02020603050405020304" pitchFamily="18" charset="0"/>
+            </a:endParaRPr>
+          </a:p>
+        </p:txBody>
+      </p:sp>
+      <p:sp>
+        <p:nvSpPr>
+          <p:cNvPr id="61" name="Text Box 9"/>
+          <p:cNvSpPr txBox="1">
+            <a:spLocks noChangeArrowheads="1"/>
+          </p:cNvSpPr>
+          <p:nvPr/>
+        </p:nvSpPr>
+        <p:spPr bwMode="auto">
+          <a:xfrm>
+            <a:off x="3381951" y="3451690"/>
+            <a:ext cx="2513898" cy="1025922"/>
+          </a:xfrm>
+          <a:prstGeom prst="rect">
+            <a:avLst/>
+          </a:prstGeom>
+          <a:noFill/>
+          <a:ln w="9525">
+            <a:noFill/>
+            <a:miter lim="800000"/>
+            <a:headEnd/>
+            <a:tailEnd/>
+          </a:ln>
+          <a:effectLst/>
+        </p:spPr>
+        <p:txBody>
+          <a:bodyPr wrap="square">
+            <a:spAutoFit/>
+          </a:bodyPr>
+          <a:lstStyle/>
+          <a:p>
+            <a:pPr marL="285750" indent="-285750" algn="l">
+              <a:spcAft>
+                <a:spcPts val="400"/>
+              </a:spcAft>
+              <a:buFont typeface="Wingdings" panose="05000000000000000000" pitchFamily="2" charset="2"/>
+              <a:buChar char="v"/>
+            </a:pPr>
+            <a:r>
+              <a:rPr lang="tr-TR" dirty="0" err="1" smtClean="0">
+                <a:latin typeface="Times New Roman" panose="02020603050405020304" pitchFamily="18" charset="0"/>
+                <a:cs typeface="Times New Roman" panose="02020603050405020304" pitchFamily="18" charset="0"/>
+              </a:rPr>
+              <a:t>Moderate</a:t>
+            </a:r>
+            <a:r>
+              <a:rPr lang="tr-TR" dirty="0" smtClean="0">
+                <a:latin typeface="Times New Roman" panose="02020603050405020304" pitchFamily="18" charset="0"/>
+                <a:cs typeface="Times New Roman" panose="02020603050405020304" pitchFamily="18" charset="0"/>
+              </a:rPr>
+              <a:t> </a:t>
+            </a:r>
+            <a:r>
+              <a:rPr lang="tr-TR" dirty="0" err="1" smtClean="0">
+                <a:latin typeface="Times New Roman" panose="02020603050405020304" pitchFamily="18" charset="0"/>
+                <a:cs typeface="Times New Roman" panose="02020603050405020304" pitchFamily="18" charset="0"/>
+              </a:rPr>
+              <a:t>cost</a:t>
+            </a:r>
+            <a:endParaRPr lang="tr-TR" dirty="0" smtClean="0">
+              <a:latin typeface="Times New Roman" panose="02020603050405020304" pitchFamily="18" charset="0"/>
+              <a:cs typeface="Times New Roman" panose="02020603050405020304" pitchFamily="18" charset="0"/>
+            </a:endParaRPr>
+          </a:p>
+          <a:p>
+            <a:pPr marL="285750" indent="-285750" algn="l">
+              <a:spcAft>
+                <a:spcPts val="400"/>
+              </a:spcAft>
+              <a:buFont typeface="Wingdings" panose="05000000000000000000" pitchFamily="2" charset="2"/>
+              <a:buChar char="v"/>
+            </a:pPr>
+            <a:r>
+              <a:rPr lang="tr-TR" dirty="0" err="1" smtClean="0">
+                <a:latin typeface="Times New Roman" panose="02020603050405020304" pitchFamily="18" charset="0"/>
+                <a:cs typeface="Times New Roman" panose="02020603050405020304" pitchFamily="18" charset="0"/>
+              </a:rPr>
+              <a:t>Low</a:t>
+            </a:r>
+            <a:r>
+              <a:rPr lang="tr-TR" dirty="0" smtClean="0">
+                <a:latin typeface="Times New Roman" panose="02020603050405020304" pitchFamily="18" charset="0"/>
+                <a:cs typeface="Times New Roman" panose="02020603050405020304" pitchFamily="18" charset="0"/>
+              </a:rPr>
+              <a:t> </a:t>
+            </a:r>
+            <a:r>
+              <a:rPr lang="tr-TR" dirty="0" err="1" smtClean="0">
+                <a:latin typeface="Times New Roman" panose="02020603050405020304" pitchFamily="18" charset="0"/>
+                <a:cs typeface="Times New Roman" panose="02020603050405020304" pitchFamily="18" charset="0"/>
+              </a:rPr>
+              <a:t>power</a:t>
+            </a:r>
+            <a:r>
+              <a:rPr lang="tr-TR" dirty="0" smtClean="0">
+                <a:latin typeface="Times New Roman" panose="02020603050405020304" pitchFamily="18" charset="0"/>
+                <a:cs typeface="Times New Roman" panose="02020603050405020304" pitchFamily="18" charset="0"/>
+              </a:rPr>
+              <a:t> </a:t>
+            </a:r>
+            <a:r>
+              <a:rPr lang="tr-TR" dirty="0" err="1" smtClean="0">
+                <a:latin typeface="Times New Roman" panose="02020603050405020304" pitchFamily="18" charset="0"/>
+                <a:cs typeface="Times New Roman" panose="02020603050405020304" pitchFamily="18" charset="0"/>
+              </a:rPr>
+              <a:t>density</a:t>
+            </a:r>
+            <a:endParaRPr lang="tr-TR" dirty="0" smtClean="0">
+              <a:latin typeface="Times New Roman" panose="02020603050405020304" pitchFamily="18" charset="0"/>
+              <a:cs typeface="Times New Roman" panose="02020603050405020304" pitchFamily="18" charset="0"/>
+            </a:endParaRPr>
+          </a:p>
+          <a:p>
+            <a:pPr marL="285750" indent="-285750" algn="l">
+              <a:spcAft>
+                <a:spcPts val="400"/>
+              </a:spcAft>
+              <a:buFont typeface="Wingdings" panose="05000000000000000000" pitchFamily="2" charset="2"/>
+              <a:buChar char="v"/>
+            </a:pPr>
+            <a:r>
+              <a:rPr lang="tr-TR" dirty="0" err="1" smtClean="0">
+                <a:latin typeface="Times New Roman" panose="02020603050405020304" pitchFamily="18" charset="0"/>
+                <a:cs typeface="Times New Roman" panose="02020603050405020304" pitchFamily="18" charset="0"/>
+              </a:rPr>
+              <a:t>Height</a:t>
+            </a:r>
+            <a:endParaRPr lang="tr-TR" dirty="0" smtClean="0">
+              <a:latin typeface="Times New Roman" panose="02020603050405020304" pitchFamily="18" charset="0"/>
+              <a:cs typeface="Times New Roman" panose="02020603050405020304" pitchFamily="18" charset="0"/>
+            </a:endParaRPr>
+          </a:p>
+        </p:txBody>
+      </p:sp>
+      <p:pic>
+        <p:nvPicPr>
+          <p:cNvPr id="62" name="Picture 61"/>
+          <p:cNvPicPr>
+            <a:picLocks noChangeAspect="1"/>
+          </p:cNvPicPr>
+          <p:nvPr/>
+        </p:nvPicPr>
+        <p:blipFill>
+          <a:blip r:embed="rId6" cstate="print">
+            <a:extLst>
+              <a:ext uri="{28A0092B-C50C-407E-A947-70E740481C1C}">
+                <a14:useLocalDpi xmlns:a14="http://schemas.microsoft.com/office/drawing/2010/main" val="0"/>
+              </a:ext>
+            </a:extLst>
+          </a:blip>
+          <a:stretch>
+            <a:fillRect/>
+          </a:stretch>
+        </p:blipFill>
+        <p:spPr>
+          <a:xfrm>
+            <a:off x="5545061" y="3100802"/>
+            <a:ext cx="790293" cy="790293"/>
+          </a:xfrm>
+          <a:prstGeom prst="rect">
+            <a:avLst/>
+          </a:prstGeom>
+        </p:spPr>
+      </p:pic>
+      <p:pic>
+        <p:nvPicPr>
+          <p:cNvPr id="63" name="Picture 62"/>
+          <p:cNvPicPr>
+            <a:picLocks noChangeAspect="1"/>
+          </p:cNvPicPr>
+          <p:nvPr/>
+        </p:nvPicPr>
+        <p:blipFill>
+          <a:blip r:embed="rId7" cstate="print">
+            <a:extLst>
+              <a:ext uri="{28A0092B-C50C-407E-A947-70E740481C1C}">
+                <a14:useLocalDpi xmlns:a14="http://schemas.microsoft.com/office/drawing/2010/main" val="0"/>
+              </a:ext>
+            </a:extLst>
+          </a:blip>
+          <a:stretch>
+            <a:fillRect/>
+          </a:stretch>
+        </p:blipFill>
+        <p:spPr>
+          <a:xfrm>
+            <a:off x="6351302" y="3101069"/>
+            <a:ext cx="758068" cy="758068"/>
+          </a:xfrm>
+          <a:prstGeom prst="rect">
+            <a:avLst/>
+          </a:prstGeom>
+        </p:spPr>
+      </p:pic>
+      <p:sp>
+        <p:nvSpPr>
+          <p:cNvPr id="64" name="Text Box 9"/>
+          <p:cNvSpPr txBox="1">
+            <a:spLocks noChangeArrowheads="1"/>
+          </p:cNvSpPr>
+          <p:nvPr/>
+        </p:nvSpPr>
+        <p:spPr bwMode="auto">
+          <a:xfrm>
+            <a:off x="7134960" y="2764147"/>
+            <a:ext cx="1421244" cy="636072"/>
+          </a:xfrm>
+          <a:prstGeom prst="rect">
+            <a:avLst/>
+          </a:prstGeom>
+          <a:noFill/>
+          <a:ln w="9525">
+            <a:noFill/>
+            <a:miter lim="800000"/>
+            <a:headEnd/>
+            <a:tailEnd/>
+          </a:ln>
+          <a:effectLst/>
+        </p:spPr>
+        <p:txBody>
+          <a:bodyPr wrap="square">
+            <a:spAutoFit/>
+          </a:bodyPr>
+          <a:lstStyle/>
+          <a:p>
+            <a:pPr algn="l">
+              <a:spcAft>
+                <a:spcPts val="400"/>
+              </a:spcAft>
+            </a:pPr>
+            <a:r>
+              <a:rPr lang="tr-TR" sz="1600" dirty="0">
+                <a:latin typeface="Times New Roman" panose="02020603050405020304" pitchFamily="18" charset="0"/>
+                <a:cs typeface="Times New Roman" panose="02020603050405020304" pitchFamily="18" charset="0"/>
+              </a:rPr>
+              <a:t>4</a:t>
+            </a:r>
+            <a:r>
+              <a:rPr lang="tr-TR" sz="1600" dirty="0" smtClean="0">
+                <a:latin typeface="Times New Roman" panose="02020603050405020304" pitchFamily="18" charset="0"/>
+                <a:cs typeface="Times New Roman" panose="02020603050405020304" pitchFamily="18" charset="0"/>
+              </a:rPr>
+              <a:t>0 </a:t>
+            </a:r>
+            <a:r>
+              <a:rPr lang="el-GR" sz="1600" dirty="0" smtClean="0">
+                <a:latin typeface="Times New Roman" panose="02020603050405020304" pitchFamily="18" charset="0"/>
+                <a:cs typeface="Times New Roman" panose="02020603050405020304" pitchFamily="18" charset="0"/>
+              </a:rPr>
+              <a:t>μ</a:t>
+            </a:r>
+            <a:r>
+              <a:rPr lang="tr-TR" sz="1600" dirty="0" smtClean="0">
+                <a:latin typeface="Times New Roman" panose="02020603050405020304" pitchFamily="18" charset="0"/>
+                <a:cs typeface="Times New Roman" panose="02020603050405020304" pitchFamily="18" charset="0"/>
+              </a:rPr>
+              <a:t>F, </a:t>
+            </a:r>
+            <a:r>
+              <a:rPr lang="tr-TR" sz="1600" dirty="0" smtClean="0">
+                <a:latin typeface="Times New Roman" panose="02020603050405020304" pitchFamily="18" charset="0"/>
+                <a:cs typeface="Times New Roman" panose="02020603050405020304" pitchFamily="18" charset="0"/>
+              </a:rPr>
+              <a:t>450 V</a:t>
+            </a:r>
+          </a:p>
+          <a:p>
+            <a:pPr algn="l">
+              <a:spcAft>
+                <a:spcPts val="400"/>
+              </a:spcAft>
+            </a:pPr>
+            <a:r>
+              <a:rPr lang="tr-TR" sz="1600" dirty="0" smtClean="0">
+                <a:latin typeface="Times New Roman" panose="02020603050405020304" pitchFamily="18" charset="0"/>
+                <a:cs typeface="Times New Roman" panose="02020603050405020304" pitchFamily="18" charset="0"/>
+              </a:rPr>
+              <a:t>1s, 2p</a:t>
+            </a:r>
+            <a:endParaRPr lang="tr-TR" sz="1600" dirty="0" smtClean="0">
+              <a:latin typeface="Times New Roman" panose="02020603050405020304" pitchFamily="18" charset="0"/>
+              <a:cs typeface="Times New Roman" panose="02020603050405020304" pitchFamily="18" charset="0"/>
+            </a:endParaRPr>
+          </a:p>
+        </p:txBody>
+      </p:sp>
+      <p:sp>
+        <p:nvSpPr>
+          <p:cNvPr id="65" name="Text Box 9"/>
+          <p:cNvSpPr txBox="1">
+            <a:spLocks noChangeArrowheads="1"/>
+          </p:cNvSpPr>
+          <p:nvPr/>
+        </p:nvSpPr>
+        <p:spPr bwMode="auto">
+          <a:xfrm>
+            <a:off x="7152108" y="3380482"/>
+            <a:ext cx="2064834" cy="697627"/>
+          </a:xfrm>
+          <a:prstGeom prst="rect">
+            <a:avLst/>
+          </a:prstGeom>
+          <a:noFill/>
+          <a:ln w="9525">
+            <a:noFill/>
+            <a:miter lim="800000"/>
+            <a:headEnd/>
+            <a:tailEnd/>
+          </a:ln>
+          <a:effectLst/>
+        </p:spPr>
+        <p:txBody>
+          <a:bodyPr wrap="square">
+            <a:spAutoFit/>
+          </a:bodyPr>
+          <a:lstStyle/>
+          <a:p>
+            <a:pPr marL="285750" indent="-285750" algn="l">
+              <a:spcAft>
+                <a:spcPts val="400"/>
+              </a:spcAft>
+              <a:buFont typeface="Wingdings" panose="05000000000000000000" pitchFamily="2" charset="2"/>
+              <a:buChar char="v"/>
+            </a:pPr>
+            <a:r>
+              <a:rPr lang="tr-TR" dirty="0" err="1" smtClean="0">
+                <a:latin typeface="Times New Roman" panose="02020603050405020304" pitchFamily="18" charset="0"/>
+                <a:cs typeface="Times New Roman" panose="02020603050405020304" pitchFamily="18" charset="0"/>
+              </a:rPr>
+              <a:t>Height</a:t>
+            </a:r>
+            <a:endParaRPr lang="tr-TR" dirty="0" smtClean="0">
+              <a:latin typeface="Times New Roman" panose="02020603050405020304" pitchFamily="18" charset="0"/>
+              <a:cs typeface="Times New Roman" panose="02020603050405020304" pitchFamily="18" charset="0"/>
+            </a:endParaRPr>
+          </a:p>
+          <a:p>
+            <a:pPr marL="285750" indent="-285750" algn="l">
+              <a:spcAft>
+                <a:spcPts val="400"/>
+              </a:spcAft>
+              <a:buFont typeface="Wingdings" panose="05000000000000000000" pitchFamily="2" charset="2"/>
+              <a:buChar char="v"/>
+            </a:pPr>
+            <a:r>
+              <a:rPr lang="tr-TR" dirty="0" smtClean="0">
+                <a:latin typeface="Times New Roman" panose="02020603050405020304" pitchFamily="18" charset="0"/>
+                <a:cs typeface="Times New Roman" panose="02020603050405020304" pitchFamily="18" charset="0"/>
+              </a:rPr>
+              <a:t>High </a:t>
+            </a:r>
+            <a:r>
+              <a:rPr lang="tr-TR" dirty="0" err="1" smtClean="0">
+                <a:latin typeface="Times New Roman" panose="02020603050405020304" pitchFamily="18" charset="0"/>
+                <a:cs typeface="Times New Roman" panose="02020603050405020304" pitchFamily="18" charset="0"/>
+              </a:rPr>
+              <a:t>temp</a:t>
+            </a:r>
+            <a:r>
+              <a:rPr lang="tr-TR" dirty="0" smtClean="0">
+                <a:latin typeface="Times New Roman" panose="02020603050405020304" pitchFamily="18" charset="0"/>
+                <a:cs typeface="Times New Roman" panose="02020603050405020304" pitchFamily="18" charset="0"/>
+              </a:rPr>
+              <a:t>. </a:t>
+            </a:r>
+            <a:r>
+              <a:rPr lang="tr-TR" dirty="0" err="1" smtClean="0">
+                <a:latin typeface="Times New Roman" panose="02020603050405020304" pitchFamily="18" charset="0"/>
+                <a:cs typeface="Times New Roman" panose="02020603050405020304" pitchFamily="18" charset="0"/>
+              </a:rPr>
+              <a:t>rise</a:t>
+            </a:r>
+            <a:endParaRPr lang="tr-TR" dirty="0" smtClean="0">
+              <a:latin typeface="Times New Roman" panose="02020603050405020304" pitchFamily="18" charset="0"/>
+              <a:cs typeface="Times New Roman" panose="02020603050405020304" pitchFamily="18" charset="0"/>
+            </a:endParaRPr>
+          </a:p>
+        </p:txBody>
+      </p:sp>
+      <p:pic>
+        <p:nvPicPr>
+          <p:cNvPr id="66" name="Picture 65"/>
+          <p:cNvPicPr>
+            <a:picLocks noChangeAspect="1"/>
+          </p:cNvPicPr>
+          <p:nvPr/>
+        </p:nvPicPr>
+        <p:blipFill>
+          <a:blip r:embed="rId8" cstate="print">
+            <a:extLst>
+              <a:ext uri="{28A0092B-C50C-407E-A947-70E740481C1C}">
+                <a14:useLocalDpi xmlns:a14="http://schemas.microsoft.com/office/drawing/2010/main" val="0"/>
+              </a:ext>
+            </a:extLst>
+          </a:blip>
+          <a:stretch>
+            <a:fillRect/>
+          </a:stretch>
+        </p:blipFill>
+        <p:spPr>
+          <a:xfrm>
+            <a:off x="1351085" y="4840911"/>
+            <a:ext cx="914191" cy="914191"/>
+          </a:xfrm>
+          <a:prstGeom prst="rect">
+            <a:avLst/>
+          </a:prstGeom>
+        </p:spPr>
+      </p:pic>
+      <p:pic>
+        <p:nvPicPr>
+          <p:cNvPr id="67" name="Picture 66"/>
+          <p:cNvPicPr>
+            <a:picLocks noChangeAspect="1"/>
+          </p:cNvPicPr>
+          <p:nvPr/>
+        </p:nvPicPr>
+        <p:blipFill>
+          <a:blip r:embed="rId8" cstate="print">
+            <a:extLst>
+              <a:ext uri="{28A0092B-C50C-407E-A947-70E740481C1C}">
+                <a14:useLocalDpi xmlns:a14="http://schemas.microsoft.com/office/drawing/2010/main" val="0"/>
+              </a:ext>
+            </a:extLst>
+          </a:blip>
+          <a:stretch>
+            <a:fillRect/>
+          </a:stretch>
+        </p:blipFill>
+        <p:spPr>
+          <a:xfrm>
+            <a:off x="2354857" y="4844434"/>
+            <a:ext cx="914191" cy="914191"/>
+          </a:xfrm>
+          <a:prstGeom prst="rect">
+            <a:avLst/>
+          </a:prstGeom>
+        </p:spPr>
+      </p:pic>
+      <p:pic>
+        <p:nvPicPr>
+          <p:cNvPr id="68" name="Picture 67"/>
+          <p:cNvPicPr>
+            <a:picLocks noChangeAspect="1"/>
+          </p:cNvPicPr>
+          <p:nvPr/>
+        </p:nvPicPr>
+        <p:blipFill>
+          <a:blip r:embed="rId8" cstate="print">
+            <a:extLst>
+              <a:ext uri="{28A0092B-C50C-407E-A947-70E740481C1C}">
+                <a14:useLocalDpi xmlns:a14="http://schemas.microsoft.com/office/drawing/2010/main" val="0"/>
+              </a:ext>
+            </a:extLst>
+          </a:blip>
+          <a:stretch>
+            <a:fillRect/>
+          </a:stretch>
+        </p:blipFill>
+        <p:spPr>
+          <a:xfrm>
+            <a:off x="4282639" y="4830536"/>
+            <a:ext cx="914191" cy="914191"/>
+          </a:xfrm>
+          <a:prstGeom prst="rect">
+            <a:avLst/>
+          </a:prstGeom>
+        </p:spPr>
+      </p:pic>
+      <p:pic>
+        <p:nvPicPr>
+          <p:cNvPr id="69" name="Picture 68"/>
+          <p:cNvPicPr>
+            <a:picLocks noChangeAspect="1"/>
+          </p:cNvPicPr>
+          <p:nvPr/>
+        </p:nvPicPr>
+        <p:blipFill>
+          <a:blip r:embed="rId8" cstate="print">
+            <a:extLst>
+              <a:ext uri="{28A0092B-C50C-407E-A947-70E740481C1C}">
+                <a14:useLocalDpi xmlns:a14="http://schemas.microsoft.com/office/drawing/2010/main" val="0"/>
+              </a:ext>
+            </a:extLst>
+          </a:blip>
+          <a:stretch>
+            <a:fillRect/>
+          </a:stretch>
+        </p:blipFill>
+        <p:spPr>
+          <a:xfrm>
+            <a:off x="3326211" y="4840912"/>
+            <a:ext cx="914191" cy="914191"/>
+          </a:xfrm>
+          <a:prstGeom prst="rect">
+            <a:avLst/>
+          </a:prstGeom>
+        </p:spPr>
+      </p:pic>
+      <p:sp>
+        <p:nvSpPr>
+          <p:cNvPr id="70" name="Text Box 9"/>
+          <p:cNvSpPr txBox="1">
+            <a:spLocks noChangeArrowheads="1"/>
+          </p:cNvSpPr>
+          <p:nvPr/>
+        </p:nvSpPr>
+        <p:spPr bwMode="auto">
+          <a:xfrm>
+            <a:off x="2324803" y="5886877"/>
+            <a:ext cx="2633964" cy="759182"/>
+          </a:xfrm>
+          <a:prstGeom prst="rect">
+            <a:avLst/>
+          </a:prstGeom>
+          <a:noFill/>
+          <a:ln w="9525">
+            <a:noFill/>
+            <a:miter lim="800000"/>
+            <a:headEnd/>
+            <a:tailEnd/>
+          </a:ln>
+          <a:effectLst/>
+        </p:spPr>
+        <p:txBody>
+          <a:bodyPr wrap="square">
+            <a:spAutoFit/>
+          </a:bodyPr>
+          <a:lstStyle/>
+          <a:p>
+            <a:pPr algn="l">
+              <a:spcAft>
+                <a:spcPts val="400"/>
+              </a:spcAft>
+            </a:pPr>
+            <a:r>
+              <a:rPr lang="tr-TR" sz="2000" dirty="0" smtClean="0">
+                <a:latin typeface="Times New Roman" panose="02020603050405020304" pitchFamily="18" charset="0"/>
+                <a:cs typeface="Times New Roman" panose="02020603050405020304" pitchFamily="18" charset="0"/>
+              </a:rPr>
+              <a:t>20 </a:t>
+            </a:r>
+            <a:r>
+              <a:rPr lang="el-GR" sz="2000" dirty="0" smtClean="0">
+                <a:latin typeface="Times New Roman" panose="02020603050405020304" pitchFamily="18" charset="0"/>
+                <a:cs typeface="Times New Roman" panose="02020603050405020304" pitchFamily="18" charset="0"/>
+              </a:rPr>
+              <a:t>μ</a:t>
+            </a:r>
+            <a:r>
+              <a:rPr lang="tr-TR" sz="2000" dirty="0" smtClean="0">
+                <a:latin typeface="Times New Roman" panose="02020603050405020304" pitchFamily="18" charset="0"/>
+                <a:cs typeface="Times New Roman" panose="02020603050405020304" pitchFamily="18" charset="0"/>
+              </a:rPr>
+              <a:t>F, </a:t>
+            </a:r>
+            <a:r>
+              <a:rPr lang="tr-TR" sz="2000" dirty="0" smtClean="0">
+                <a:latin typeface="Times New Roman" panose="02020603050405020304" pitchFamily="18" charset="0"/>
+                <a:cs typeface="Times New Roman" panose="02020603050405020304" pitchFamily="18" charset="0"/>
+              </a:rPr>
+              <a:t>450 V</a:t>
+            </a:r>
+          </a:p>
+          <a:p>
+            <a:pPr algn="l">
+              <a:spcAft>
+                <a:spcPts val="400"/>
+              </a:spcAft>
+            </a:pPr>
+            <a:r>
+              <a:rPr lang="tr-TR" sz="2000" dirty="0" smtClean="0">
+                <a:latin typeface="Times New Roman" panose="02020603050405020304" pitchFamily="18" charset="0"/>
+                <a:cs typeface="Times New Roman" panose="02020603050405020304" pitchFamily="18" charset="0"/>
+              </a:rPr>
+              <a:t>2s, 2p</a:t>
+            </a:r>
+            <a:endParaRPr lang="tr-TR" sz="2000" dirty="0" smtClean="0">
+              <a:latin typeface="Times New Roman" panose="02020603050405020304" pitchFamily="18" charset="0"/>
+              <a:cs typeface="Times New Roman" panose="02020603050405020304" pitchFamily="18" charset="0"/>
+            </a:endParaRPr>
+          </a:p>
+        </p:txBody>
+      </p:sp>
+      <p:sp>
+        <p:nvSpPr>
+          <p:cNvPr id="73" name="Text Box 9"/>
+          <p:cNvSpPr txBox="1">
+            <a:spLocks noChangeArrowheads="1"/>
+          </p:cNvSpPr>
+          <p:nvPr/>
+        </p:nvSpPr>
+        <p:spPr bwMode="auto">
+          <a:xfrm>
+            <a:off x="5467667" y="4996241"/>
+            <a:ext cx="2513898" cy="1477328"/>
+          </a:xfrm>
+          <a:prstGeom prst="rect">
+            <a:avLst/>
+          </a:prstGeom>
+          <a:noFill/>
+          <a:ln w="9525">
+            <a:noFill/>
+            <a:miter lim="800000"/>
+            <a:headEnd/>
+            <a:tailEnd/>
+          </a:ln>
+          <a:effectLst/>
+        </p:spPr>
+        <p:txBody>
+          <a:bodyPr wrap="square">
+            <a:spAutoFit/>
+          </a:bodyPr>
+          <a:lstStyle/>
+          <a:p>
+            <a:pPr marL="285750" indent="-285750" algn="l">
+              <a:spcAft>
+                <a:spcPts val="400"/>
+              </a:spcAft>
+              <a:buFont typeface="Wingdings" panose="05000000000000000000" pitchFamily="2" charset="2"/>
+              <a:buChar char="ü"/>
+            </a:pPr>
+            <a:r>
+              <a:rPr lang="tr-TR" sz="2000" dirty="0" smtClean="0">
+                <a:latin typeface="Times New Roman" panose="02020603050405020304" pitchFamily="18" charset="0"/>
+                <a:cs typeface="Times New Roman" panose="02020603050405020304" pitchFamily="18" charset="0"/>
+              </a:rPr>
+              <a:t>High </a:t>
+            </a:r>
+            <a:r>
+              <a:rPr lang="tr-TR" sz="2000" dirty="0" err="1" smtClean="0">
+                <a:latin typeface="Times New Roman" panose="02020603050405020304" pitchFamily="18" charset="0"/>
+                <a:cs typeface="Times New Roman" panose="02020603050405020304" pitchFamily="18" charset="0"/>
+              </a:rPr>
+              <a:t>power</a:t>
+            </a:r>
+            <a:r>
+              <a:rPr lang="tr-TR" sz="2000" dirty="0" smtClean="0">
+                <a:latin typeface="Times New Roman" panose="02020603050405020304" pitchFamily="18" charset="0"/>
+                <a:cs typeface="Times New Roman" panose="02020603050405020304" pitchFamily="18" charset="0"/>
+              </a:rPr>
+              <a:t> </a:t>
+            </a:r>
+            <a:r>
+              <a:rPr lang="tr-TR" sz="2000" dirty="0" err="1" smtClean="0">
+                <a:latin typeface="Times New Roman" panose="02020603050405020304" pitchFamily="18" charset="0"/>
+                <a:cs typeface="Times New Roman" panose="02020603050405020304" pitchFamily="18" charset="0"/>
+              </a:rPr>
+              <a:t>density</a:t>
+            </a:r>
+            <a:endParaRPr lang="tr-TR" sz="2000" dirty="0" smtClean="0">
+              <a:latin typeface="Times New Roman" panose="02020603050405020304" pitchFamily="18" charset="0"/>
+              <a:cs typeface="Times New Roman" panose="02020603050405020304" pitchFamily="18" charset="0"/>
+            </a:endParaRPr>
+          </a:p>
+          <a:p>
+            <a:pPr marL="285750" indent="-285750" algn="l">
+              <a:spcAft>
+                <a:spcPts val="400"/>
+              </a:spcAft>
+              <a:buFont typeface="Wingdings" panose="05000000000000000000" pitchFamily="2" charset="2"/>
+              <a:buChar char="ü"/>
+            </a:pPr>
+            <a:r>
+              <a:rPr lang="tr-TR" sz="2000" dirty="0" err="1" smtClean="0">
+                <a:latin typeface="Times New Roman" panose="02020603050405020304" pitchFamily="18" charset="0"/>
+                <a:cs typeface="Times New Roman" panose="02020603050405020304" pitchFamily="18" charset="0"/>
+              </a:rPr>
+              <a:t>Low</a:t>
+            </a:r>
+            <a:r>
+              <a:rPr lang="tr-TR" sz="2000" dirty="0" smtClean="0">
+                <a:latin typeface="Times New Roman" panose="02020603050405020304" pitchFamily="18" charset="0"/>
+                <a:cs typeface="Times New Roman" panose="02020603050405020304" pitchFamily="18" charset="0"/>
+              </a:rPr>
+              <a:t> </a:t>
+            </a:r>
+            <a:r>
+              <a:rPr lang="tr-TR" sz="2000" dirty="0" err="1" smtClean="0">
+                <a:latin typeface="Times New Roman" panose="02020603050405020304" pitchFamily="18" charset="0"/>
+                <a:cs typeface="Times New Roman" panose="02020603050405020304" pitchFamily="18" charset="0"/>
+              </a:rPr>
+              <a:t>cost</a:t>
+            </a:r>
+            <a:endParaRPr lang="tr-TR" sz="2000" dirty="0" smtClean="0">
+              <a:latin typeface="Times New Roman" panose="02020603050405020304" pitchFamily="18" charset="0"/>
+              <a:cs typeface="Times New Roman" panose="02020603050405020304" pitchFamily="18" charset="0"/>
+            </a:endParaRPr>
+          </a:p>
+          <a:p>
+            <a:pPr marL="285750" indent="-285750" algn="l">
+              <a:spcAft>
+                <a:spcPts val="400"/>
+              </a:spcAft>
+              <a:buFont typeface="Wingdings" panose="05000000000000000000" pitchFamily="2" charset="2"/>
+              <a:buChar char="ü"/>
+            </a:pPr>
+            <a:r>
+              <a:rPr lang="tr-TR" sz="2000" dirty="0" err="1" smtClean="0">
+                <a:latin typeface="Times New Roman" panose="02020603050405020304" pitchFamily="18" charset="0"/>
+                <a:cs typeface="Times New Roman" panose="02020603050405020304" pitchFamily="18" charset="0"/>
+              </a:rPr>
+              <a:t>Low</a:t>
+            </a:r>
+            <a:r>
+              <a:rPr lang="tr-TR" sz="2000" dirty="0" smtClean="0">
+                <a:latin typeface="Times New Roman" panose="02020603050405020304" pitchFamily="18" charset="0"/>
+                <a:cs typeface="Times New Roman" panose="02020603050405020304" pitchFamily="18" charset="0"/>
+              </a:rPr>
+              <a:t> </a:t>
+            </a:r>
+            <a:r>
+              <a:rPr lang="tr-TR" sz="2000" dirty="0" err="1" smtClean="0">
+                <a:latin typeface="Times New Roman" panose="02020603050405020304" pitchFamily="18" charset="0"/>
+                <a:cs typeface="Times New Roman" panose="02020603050405020304" pitchFamily="18" charset="0"/>
+              </a:rPr>
+              <a:t>height</a:t>
+            </a:r>
+            <a:endParaRPr lang="tr-TR" sz="2000" dirty="0" smtClean="0">
+              <a:latin typeface="Times New Roman" panose="02020603050405020304" pitchFamily="18" charset="0"/>
+              <a:cs typeface="Times New Roman" panose="02020603050405020304" pitchFamily="18" charset="0"/>
+            </a:endParaRPr>
+          </a:p>
+          <a:p>
+            <a:pPr marL="285750" indent="-285750" algn="l">
+              <a:spcAft>
+                <a:spcPts val="400"/>
+              </a:spcAft>
+              <a:buFont typeface="Wingdings" panose="05000000000000000000" pitchFamily="2" charset="2"/>
+              <a:buChar char="ü"/>
+            </a:pPr>
+            <a:r>
+              <a:rPr lang="tr-TR" sz="2000" dirty="0" err="1" smtClean="0">
+                <a:latin typeface="Times New Roman" panose="02020603050405020304" pitchFamily="18" charset="0"/>
+                <a:cs typeface="Times New Roman" panose="02020603050405020304" pitchFamily="18" charset="0"/>
+              </a:rPr>
+              <a:t>Low</a:t>
+            </a:r>
+            <a:r>
+              <a:rPr lang="tr-TR" sz="2000" dirty="0" smtClean="0">
+                <a:latin typeface="Times New Roman" panose="02020603050405020304" pitchFamily="18" charset="0"/>
+                <a:cs typeface="Times New Roman" panose="02020603050405020304" pitchFamily="18" charset="0"/>
+              </a:rPr>
+              <a:t> </a:t>
+            </a:r>
+            <a:r>
+              <a:rPr lang="tr-TR" sz="2000" dirty="0" err="1" smtClean="0">
+                <a:latin typeface="Times New Roman" panose="02020603050405020304" pitchFamily="18" charset="0"/>
+                <a:cs typeface="Times New Roman" panose="02020603050405020304" pitchFamily="18" charset="0"/>
+              </a:rPr>
+              <a:t>temp</a:t>
+            </a:r>
+            <a:r>
+              <a:rPr lang="tr-TR" sz="2000" dirty="0" smtClean="0">
+                <a:latin typeface="Times New Roman" panose="02020603050405020304" pitchFamily="18" charset="0"/>
+                <a:cs typeface="Times New Roman" panose="02020603050405020304" pitchFamily="18" charset="0"/>
+              </a:rPr>
+              <a:t>. </a:t>
+            </a:r>
+            <a:r>
+              <a:rPr lang="tr-TR" sz="2000" dirty="0" err="1" smtClean="0">
+                <a:latin typeface="Times New Roman" panose="02020603050405020304" pitchFamily="18" charset="0"/>
+                <a:cs typeface="Times New Roman" panose="02020603050405020304" pitchFamily="18" charset="0"/>
+              </a:rPr>
+              <a:t>rise</a:t>
+            </a:r>
+            <a:endParaRPr lang="tr-TR" sz="2000" dirty="0" smtClean="0">
+              <a:latin typeface="Times New Roman" panose="02020603050405020304" pitchFamily="18" charset="0"/>
+              <a:cs typeface="Times New Roman" panose="02020603050405020304" pitchFamily="18" charset="0"/>
+            </a:endParaRPr>
+          </a:p>
+        </p:txBody>
+      </p:sp>
     </p:spTree>
     <p:extLst>
       <p:ext uri="{BB962C8B-B14F-4D97-AF65-F5344CB8AC3E}">
@@ -10764,6 +12398,9 @@
                     <p:cTn id="3" fill="hold">
                       <p:stCondLst>
                         <p:cond delay="indefinite"/>
+                        <p:cond evt="onBegin" delay="0">
+                          <p:tn val="2"/>
+                        </p:cond>
                       </p:stCondLst>
                       <p:childTnLst>
                         <p:par>
@@ -10773,7 +12410,7 @@
                             </p:stCondLst>
                             <p:childTnLst>
                               <p:par>
-                                <p:cTn id="5" presetID="10" presetClass="entr" presetSubtype="0" fill="hold" nodeType="clickEffect">
+                                <p:cTn id="5" presetID="10" presetClass="entr" presetSubtype="0" fill="hold" nodeType="withEffect">
                                   <p:stCondLst>
                                     <p:cond delay="0"/>
                                   </p:stCondLst>
@@ -10858,39 +12495,279 @@
                                   </p:childTnLst>
                                 </p:cTn>
                               </p:par>
-                            </p:childTnLst>
-                          </p:cTn>
-                        </p:par>
-                      </p:childTnLst>
-                    </p:cTn>
-                  </p:par>
-                  <p:par>
-                    <p:cTn id="11" fill="hold">
-                      <p:stCondLst>
-                        <p:cond delay="indefinite"/>
-                      </p:stCondLst>
-                      <p:childTnLst>
-                        <p:par>
-                          <p:cTn id="12" fill="hold">
-                            <p:stCondLst>
-                              <p:cond delay="0"/>
-                            </p:stCondLst>
-                            <p:childTnLst>
                               <p:par>
-                                <p:cTn id="13" presetID="10" presetClass="entr" presetSubtype="0" fill="hold" nodeType="clickEffect">
+                                <p:cTn id="11" presetID="10" presetClass="entr" presetSubtype="0" fill="hold" nodeType="withEffect">
                                   <p:stCondLst>
                                     <p:cond delay="0"/>
                                   </p:stCondLst>
                                   <p:childTnLst>
                                     <p:set>
                                       <p:cBhvr>
-                                        <p:cTn id="14" dur="1" fill="hold">
+                                        <p:cTn id="12" dur="1" fill="hold">
                                           <p:stCondLst>
                                             <p:cond delay="0"/>
                                           </p:stCondLst>
                                         </p:cTn>
                                         <p:tgtEl>
-                                          <p:spTgt spid="18">
+                                          <p:spTgt spid="53">
+                                            <p:txEl>
+                                              <p:pRg st="0" end="0"/>
+                                            </p:txEl>
+                                          </p:spTgt>
+                                        </p:tgtEl>
+                                        <p:attrNameLst>
+                                          <p:attrName>style.visibility</p:attrName>
+                                        </p:attrNameLst>
+                                      </p:cBhvr>
+                                      <p:to>
+                                        <p:strVal val="visible"/>
+                                      </p:to>
+                                    </p:set>
+                                    <p:animEffect transition="in" filter="fade">
+                                      <p:cBhvr>
+                                        <p:cTn id="13" dur="500"/>
+                                        <p:tgtEl>
+                                          <p:spTgt spid="53">
+                                            <p:txEl>
+                                              <p:pRg st="0" end="0"/>
+                                            </p:txEl>
+                                          </p:spTgt>
+                                        </p:tgtEl>
+                                      </p:cBhvr>
+                                    </p:animEffect>
+                                  </p:childTnLst>
+                                </p:cTn>
+                              </p:par>
+                              <p:par>
+                                <p:cTn id="14" presetID="10" presetClass="entr" presetSubtype="0" fill="hold" nodeType="withEffect">
+                                  <p:stCondLst>
+                                    <p:cond delay="0"/>
+                                  </p:stCondLst>
+                                  <p:childTnLst>
+                                    <p:set>
+                                      <p:cBhvr>
+                                        <p:cTn id="15" dur="1" fill="hold">
+                                          <p:stCondLst>
+                                            <p:cond delay="0"/>
+                                          </p:stCondLst>
+                                        </p:cTn>
+                                        <p:tgtEl>
+                                          <p:spTgt spid="53">
+                                            <p:txEl>
+                                              <p:pRg st="1" end="1"/>
+                                            </p:txEl>
+                                          </p:spTgt>
+                                        </p:tgtEl>
+                                        <p:attrNameLst>
+                                          <p:attrName>style.visibility</p:attrName>
+                                        </p:attrNameLst>
+                                      </p:cBhvr>
+                                      <p:to>
+                                        <p:strVal val="visible"/>
+                                      </p:to>
+                                    </p:set>
+                                    <p:animEffect transition="in" filter="fade">
+                                      <p:cBhvr>
+                                        <p:cTn id="16" dur="500"/>
+                                        <p:tgtEl>
+                                          <p:spTgt spid="53">
+                                            <p:txEl>
+                                              <p:pRg st="1" end="1"/>
+                                            </p:txEl>
+                                          </p:spTgt>
+                                        </p:tgtEl>
+                                      </p:cBhvr>
+                                    </p:animEffect>
+                                  </p:childTnLst>
+                                </p:cTn>
+                              </p:par>
+                              <p:par>
+                                <p:cTn id="17" presetID="10" presetClass="entr" presetSubtype="0" fill="hold" nodeType="withEffect">
+                                  <p:stCondLst>
+                                    <p:cond delay="0"/>
+                                  </p:stCondLst>
+                                  <p:childTnLst>
+                                    <p:set>
+                                      <p:cBhvr>
+                                        <p:cTn id="18" dur="1" fill="hold">
+                                          <p:stCondLst>
+                                            <p:cond delay="0"/>
+                                          </p:stCondLst>
+                                        </p:cTn>
+                                        <p:tgtEl>
+                                          <p:spTgt spid="60">
+                                            <p:txEl>
+                                              <p:pRg st="0" end="0"/>
+                                            </p:txEl>
+                                          </p:spTgt>
+                                        </p:tgtEl>
+                                        <p:attrNameLst>
+                                          <p:attrName>style.visibility</p:attrName>
+                                        </p:attrNameLst>
+                                      </p:cBhvr>
+                                      <p:to>
+                                        <p:strVal val="visible"/>
+                                      </p:to>
+                                    </p:set>
+                                    <p:animEffect transition="in" filter="fade">
+                                      <p:cBhvr>
+                                        <p:cTn id="19" dur="500"/>
+                                        <p:tgtEl>
+                                          <p:spTgt spid="60">
+                                            <p:txEl>
+                                              <p:pRg st="0" end="0"/>
+                                            </p:txEl>
+                                          </p:spTgt>
+                                        </p:tgtEl>
+                                      </p:cBhvr>
+                                    </p:animEffect>
+                                  </p:childTnLst>
+                                </p:cTn>
+                              </p:par>
+                              <p:par>
+                                <p:cTn id="20" presetID="10" presetClass="entr" presetSubtype="0" fill="hold" nodeType="withEffect">
+                                  <p:stCondLst>
+                                    <p:cond delay="0"/>
+                                  </p:stCondLst>
+                                  <p:childTnLst>
+                                    <p:set>
+                                      <p:cBhvr>
+                                        <p:cTn id="21" dur="1" fill="hold">
+                                          <p:stCondLst>
+                                            <p:cond delay="0"/>
+                                          </p:stCondLst>
+                                        </p:cTn>
+                                        <p:tgtEl>
+                                          <p:spTgt spid="60">
+                                            <p:txEl>
+                                              <p:pRg st="1" end="1"/>
+                                            </p:txEl>
+                                          </p:spTgt>
+                                        </p:tgtEl>
+                                        <p:attrNameLst>
+                                          <p:attrName>style.visibility</p:attrName>
+                                        </p:attrNameLst>
+                                      </p:cBhvr>
+                                      <p:to>
+                                        <p:strVal val="visible"/>
+                                      </p:to>
+                                    </p:set>
+                                    <p:animEffect transition="in" filter="fade">
+                                      <p:cBhvr>
+                                        <p:cTn id="22" dur="500"/>
+                                        <p:tgtEl>
+                                          <p:spTgt spid="60">
+                                            <p:txEl>
+                                              <p:pRg st="1" end="1"/>
+                                            </p:txEl>
+                                          </p:spTgt>
+                                        </p:tgtEl>
+                                      </p:cBhvr>
+                                    </p:animEffect>
+                                  </p:childTnLst>
+                                </p:cTn>
+                              </p:par>
+                              <p:par>
+                                <p:cTn id="23" presetID="10" presetClass="entr" presetSubtype="0" fill="hold" nodeType="withEffect">
+                                  <p:stCondLst>
+                                    <p:cond delay="0"/>
+                                  </p:stCondLst>
+                                  <p:childTnLst>
+                                    <p:set>
+                                      <p:cBhvr>
+                                        <p:cTn id="24" dur="1" fill="hold">
+                                          <p:stCondLst>
+                                            <p:cond delay="0"/>
+                                          </p:stCondLst>
+                                        </p:cTn>
+                                        <p:tgtEl>
+                                          <p:spTgt spid="61">
+                                            <p:txEl>
+                                              <p:pRg st="0" end="0"/>
+                                            </p:txEl>
+                                          </p:spTgt>
+                                        </p:tgtEl>
+                                        <p:attrNameLst>
+                                          <p:attrName>style.visibility</p:attrName>
+                                        </p:attrNameLst>
+                                      </p:cBhvr>
+                                      <p:to>
+                                        <p:strVal val="visible"/>
+                                      </p:to>
+                                    </p:set>
+                                    <p:animEffect transition="in" filter="fade">
+                                      <p:cBhvr>
+                                        <p:cTn id="25" dur="500"/>
+                                        <p:tgtEl>
+                                          <p:spTgt spid="61">
+                                            <p:txEl>
+                                              <p:pRg st="0" end="0"/>
+                                            </p:txEl>
+                                          </p:spTgt>
+                                        </p:tgtEl>
+                                      </p:cBhvr>
+                                    </p:animEffect>
+                                  </p:childTnLst>
+                                </p:cTn>
+                              </p:par>
+                              <p:par>
+                                <p:cTn id="26" presetID="10" presetClass="entr" presetSubtype="0" fill="hold" nodeType="withEffect">
+                                  <p:stCondLst>
+                                    <p:cond delay="0"/>
+                                  </p:stCondLst>
+                                  <p:childTnLst>
+                                    <p:set>
+                                      <p:cBhvr>
+                                        <p:cTn id="27" dur="1" fill="hold">
+                                          <p:stCondLst>
+                                            <p:cond delay="0"/>
+                                          </p:stCondLst>
+                                        </p:cTn>
+                                        <p:tgtEl>
+                                          <p:spTgt spid="61">
+                                            <p:txEl>
+                                              <p:pRg st="1" end="1"/>
+                                            </p:txEl>
+                                          </p:spTgt>
+                                        </p:tgtEl>
+                                        <p:attrNameLst>
+                                          <p:attrName>style.visibility</p:attrName>
+                                        </p:attrNameLst>
+                                      </p:cBhvr>
+                                      <p:to>
+                                        <p:strVal val="visible"/>
+                                      </p:to>
+                                    </p:set>
+                                    <p:animEffect transition="in" filter="fade">
+                                      <p:cBhvr>
+                                        <p:cTn id="28" dur="500"/>
+                                        <p:tgtEl>
+                                          <p:spTgt spid="61">
+                                            <p:txEl>
+                                              <p:pRg st="1" end="1"/>
+                                            </p:txEl>
+                                          </p:spTgt>
+                                        </p:tgtEl>
+                                      </p:cBhvr>
+                                    </p:animEffect>
+                                  </p:childTnLst>
+                                </p:cTn>
+                              </p:par>
+                              <p:par>
+                                <p:cTn id="29" presetID="10" presetClass="entr" presetSubtype="0" fill="hold" nodeType="withEffect">
+                                  <p:stCondLst>
+                                    <p:cond delay="0"/>
+                                  </p:stCondLst>
+                                  <p:childTnLst>
+                                    <p:set>
+                                      <p:cBhvr>
+                                        <p:cTn id="30" dur="1" fill="hold">
+                                          <p:stCondLst>
+                                            <p:cond delay="0"/>
+                                          </p:stCondLst>
+                                        </p:cTn>
+                                        <p:tgtEl>
+                                          <p:spTgt spid="61">
                                             <p:txEl>
                                               <p:pRg st="2" end="2"/>
                                             </p:txEl>
@@ -10906,9 +12783,9 @@
                                     </p:set>
                                     <p:animEffect transition="in" filter="fade">
                                       <p:cBhvr>
-                                        <p:cTn id="15" dur="500"/>
+                                        <p:cTn id="31" dur="500"/>
                                         <p:tgtEl>
-                                          <p:spTgt spid="18">
+                                          <p:spTgt spid="61">
                                             <p:txEl>
                                               <p:pRg st="2" end="2"/>
                                             </p:txEl>
@@ -10920,20 +12797,407 @@
                                 </p:cTn>
                               </p:par>
                               <p:par>
-                                <p:cTn id="16" presetID="10" presetClass="entr" presetSubtype="0" fill="hold" nodeType="withEffect">
+                                <p:cTn id="32" presetID="10" presetClass="entr" presetSubtype="0" fill="hold" nodeType="withEffect">
                                   <p:stCondLst>
                                     <p:cond delay="0"/>
                                   </p:stCondLst>
                                   <p:childTnLst>
                                     <p:set>
                                       <p:cBhvr>
-                                        <p:cTn id="17" dur="1" fill="hold">
+                                        <p:cTn id="33" dur="1" fill="hold">
                                           <p:stCondLst>
                                             <p:cond delay="0"/>
                                           </p:stCondLst>
                                         </p:cTn>
                                         <p:tgtEl>
-                                          <p:spTgt spid="18">
+                                          <p:spTgt spid="64">
+                                            <p:txEl>
+                                              <p:pRg st="0" end="0"/>
+                                            </p:txEl>
+                                          </p:spTgt>
+                                        </p:tgtEl>
+                                        <p:attrNameLst>
+                                          <p:attrName>style.visibility</p:attrName>
+                                        </p:attrNameLst>
+                                      </p:cBhvr>
+                                      <p:to>
+                                        <p:strVal val="visible"/>
+                                      </p:to>
+                                    </p:set>
+                                    <p:animEffect transition="in" filter="fade">
+                                      <p:cBhvr>
+                                        <p:cTn id="34" dur="500"/>
+                                        <p:tgtEl>
+                                          <p:spTgt spid="64">
+                                            <p:txEl>
+                                              <p:pRg st="0" end="0"/>
+                                            </p:txEl>
+                                          </p:spTgt>
+                                        </p:tgtEl>
+                                      </p:cBhvr>
+                                    </p:animEffect>
+                                  </p:childTnLst>
+                                </p:cTn>
+                              </p:par>
+                              <p:par>
+                                <p:cTn id="35" presetID="10" presetClass="entr" presetSubtype="0" fill="hold" nodeType="withEffect">
+                                  <p:stCondLst>
+                                    <p:cond delay="0"/>
+                                  </p:stCondLst>
+                                  <p:childTnLst>
+                                    <p:set>
+                                      <p:cBhvr>
+                                        <p:cTn id="36" dur="1" fill="hold">
+                                          <p:stCondLst>
+                                            <p:cond delay="0"/>
+                                          </p:stCondLst>
+                                        </p:cTn>
+                                        <p:tgtEl>
+                                          <p:spTgt spid="64">
+                                            <p:txEl>
+                                              <p:pRg st="1" end="1"/>
+                                            </p:txEl>
+                                          </p:spTgt>
+                                        </p:tgtEl>
+                                        <p:attrNameLst>
+                                          <p:attrName>style.visibility</p:attrName>
+                                        </p:attrNameLst>
+                                      </p:cBhvr>
+                                      <p:to>
+                                        <p:strVal val="visible"/>
+                                      </p:to>
+                                    </p:set>
+                                    <p:animEffect transition="in" filter="fade">
+                                      <p:cBhvr>
+                                        <p:cTn id="37" dur="500"/>
+                                        <p:tgtEl>
+                                          <p:spTgt spid="64">
+                                            <p:txEl>
+                                              <p:pRg st="1" end="1"/>
+                                            </p:txEl>
+                                          </p:spTgt>
+                                        </p:tgtEl>
+                                      </p:cBhvr>
+                                    </p:animEffect>
+                                  </p:childTnLst>
+                                </p:cTn>
+                              </p:par>
+                              <p:par>
+                                <p:cTn id="38" presetID="10" presetClass="entr" presetSubtype="0" fill="hold" nodeType="withEffect">
+                                  <p:stCondLst>
+                                    <p:cond delay="0"/>
+                                  </p:stCondLst>
+                                  <p:childTnLst>
+                                    <p:set>
+                                      <p:cBhvr>
+                                        <p:cTn id="39" dur="1" fill="hold">
+                                          <p:stCondLst>
+                                            <p:cond delay="0"/>
+                                          </p:stCondLst>
+                                        </p:cTn>
+                                        <p:tgtEl>
+                                          <p:spTgt spid="65">
+                                            <p:txEl>
+                                              <p:pRg st="0" end="0"/>
+                                            </p:txEl>
+                                          </p:spTgt>
+                                        </p:tgtEl>
+                                        <p:attrNameLst>
+                                          <p:attrName>style.visibility</p:attrName>
+                                        </p:attrNameLst>
+                                      </p:cBhvr>
+                                      <p:to>
+                                        <p:strVal val="visible"/>
+                                      </p:to>
+                                    </p:set>
+                                    <p:animEffect transition="in" filter="fade">
+                                      <p:cBhvr>
+                                        <p:cTn id="40" dur="500"/>
+                                        <p:tgtEl>
+                                          <p:spTgt spid="65">
+                                            <p:txEl>
+                                              <p:pRg st="0" end="0"/>
+                                            </p:txEl>
+                                          </p:spTgt>
+                                        </p:tgtEl>
+                                      </p:cBhvr>
+                                    </p:animEffect>
+                                  </p:childTnLst>
+                                </p:cTn>
+                              </p:par>
+                              <p:par>
+                                <p:cTn id="41" presetID="10" presetClass="entr" presetSubtype="0" fill="hold" nodeType="withEffect">
+                                  <p:stCondLst>
+                                    <p:cond delay="0"/>
+                                  </p:stCondLst>
+                                  <p:childTnLst>
+                                    <p:set>
+                                      <p:cBhvr>
+                                        <p:cTn id="42" dur="1" fill="hold">
+                                          <p:stCondLst>
+                                            <p:cond delay="0"/>
+                                          </p:stCondLst>
+                                        </p:cTn>
+                                        <p:tgtEl>
+                                          <p:spTgt spid="65">
+                                            <p:txEl>
+                                              <p:pRg st="1" end="1"/>
+                                            </p:txEl>
+                                          </p:spTgt>
+                                        </p:tgtEl>
+                                        <p:attrNameLst>
+                                          <p:attrName>style.visibility</p:attrName>
+                                        </p:attrNameLst>
+                                      </p:cBhvr>
+                                      <p:to>
+                                        <p:strVal val="visible"/>
+                                      </p:to>
+                                    </p:set>
+                                    <p:animEffect transition="in" filter="fade">
+                                      <p:cBhvr>
+                                        <p:cTn id="43" dur="500"/>
+                                        <p:tgtEl>
+                                          <p:spTgt spid="65">
+                                            <p:txEl>
+                                              <p:pRg st="1" end="1"/>
+                                            </p:txEl>
+                                          </p:spTgt>
+                                        </p:tgtEl>
+                                      </p:cBhvr>
+                                    </p:animEffect>
+                                  </p:childTnLst>
+                                </p:cTn>
+                              </p:par>
+                              <p:par>
+                                <p:cTn id="44" presetID="10" presetClass="entr" presetSubtype="0" fill="hold" nodeType="withEffect">
+                                  <p:stCondLst>
+                                    <p:cond delay="0"/>
+                                  </p:stCondLst>
+                                  <p:childTnLst>
+                                    <p:set>
+                                      <p:cBhvr>
+                                        <p:cTn id="45" dur="1" fill="hold">
+                                          <p:stCondLst>
+                                            <p:cond delay="0"/>
+                                          </p:stCondLst>
+                                        </p:cTn>
+                                        <p:tgtEl>
+                                          <p:spTgt spid="70">
+                                            <p:txEl>
+                                              <p:pRg st="0" end="0"/>
+                                            </p:txEl>
+                                          </p:spTgt>
+                                        </p:tgtEl>
+                                        <p:attrNameLst>
+                                          <p:attrName>style.visibility</p:attrName>
+                                        </p:attrNameLst>
+                                      </p:cBhvr>
+                                      <p:to>
+                                        <p:strVal val="visible"/>
+                                      </p:to>
+                                    </p:set>
+                                    <p:animEffect transition="in" filter="fade">
+                                      <p:cBhvr>
+                                        <p:cTn id="46" dur="500"/>
+                                        <p:tgtEl>
+                                          <p:spTgt spid="70">
+                                            <p:txEl>
+                                              <p:pRg st="0" end="0"/>
+                                            </p:txEl>
+                                          </p:spTgt>
+                                        </p:tgtEl>
+                                      </p:cBhvr>
+                                    </p:animEffect>
+                                  </p:childTnLst>
+                                </p:cTn>
+                              </p:par>
+                              <p:par>
+                                <p:cTn id="47" presetID="10" presetClass="entr" presetSubtype="0" fill="hold" nodeType="withEffect">
+                                  <p:stCondLst>
+                                    <p:cond delay="0"/>
+                                  </p:stCondLst>
+                                  <p:childTnLst>
+                                    <p:set>
+                                      <p:cBhvr>
+                                        <p:cTn id="48" dur="1" fill="hold">
+                                          <p:stCondLst>
+                                            <p:cond delay="0"/>
+                                          </p:stCondLst>
+                                        </p:cTn>
+                                        <p:tgtEl>
+                                          <p:spTgt spid="70">
+                                            <p:txEl>
+                                              <p:pRg st="1" end="1"/>
+                                            </p:txEl>
+                                          </p:spTgt>
+                                        </p:tgtEl>
+                                        <p:attrNameLst>
+                                          <p:attrName>style.visibility</p:attrName>
+                                        </p:attrNameLst>
+                                      </p:cBhvr>
+                                      <p:to>
+                                        <p:strVal val="visible"/>
+                                      </p:to>
+                                    </p:set>
+                                    <p:animEffect transition="in" filter="fade">
+                                      <p:cBhvr>
+                                        <p:cTn id="49" dur="500"/>
+                                        <p:tgtEl>
+                                          <p:spTgt spid="70">
+                                            <p:txEl>
+                                              <p:pRg st="1" end="1"/>
+                                            </p:txEl>
+                                          </p:spTgt>
+                                        </p:tgtEl>
+                                      </p:cBhvr>
+                                    </p:animEffect>
+                                  </p:childTnLst>
+                                </p:cTn>
+                              </p:par>
+                              <p:par>
+                                <p:cTn id="50" presetID="10" presetClass="entr" presetSubtype="0" fill="hold" nodeType="withEffect">
+                                  <p:stCondLst>
+                                    <p:cond delay="0"/>
+                                  </p:stCondLst>
+                                  <p:childTnLst>
+                                    <p:set>
+                                      <p:cBhvr>
+                                        <p:cTn id="51" dur="1" fill="hold">
+                                          <p:stCondLst>
+                                            <p:cond delay="0"/>
+                                          </p:stCondLst>
+                                        </p:cTn>
+                                        <p:tgtEl>
+                                          <p:spTgt spid="73">
+                                            <p:txEl>
+                                              <p:pRg st="0" end="0"/>
+                                            </p:txEl>
+                                          </p:spTgt>
+                                        </p:tgtEl>
+                                        <p:attrNameLst>
+                                          <p:attrName>style.visibility</p:attrName>
+                                        </p:attrNameLst>
+                                      </p:cBhvr>
+                                      <p:to>
+                                        <p:strVal val="visible"/>
+                                      </p:to>
+                                    </p:set>
+                                    <p:animEffect transition="in" filter="fade">
+                                      <p:cBhvr>
+                                        <p:cTn id="52" dur="500"/>
+                                        <p:tgtEl>
+                                          <p:spTgt spid="73">
+                                            <p:txEl>
+                                              <p:pRg st="0" end="0"/>
+                                            </p:txEl>
+                                          </p:spTgt>
+                                        </p:tgtEl>
+                                      </p:cBhvr>
+                                    </p:animEffect>
+                                  </p:childTnLst>
+                                </p:cTn>
+                              </p:par>
+                              <p:par>
+                                <p:cTn id="53" presetID="10" presetClass="entr" presetSubtype="0" fill="hold" nodeType="withEffect">
+                                  <p:stCondLst>
+                                    <p:cond delay="0"/>
+                                  </p:stCondLst>
+                                  <p:childTnLst>
+                                    <p:set>
+                                      <p:cBhvr>
+                                        <p:cTn id="54" dur="1" fill="hold">
+                                          <p:stCondLst>
+                                            <p:cond delay="0"/>
+                                          </p:stCondLst>
+                                        </p:cTn>
+                                        <p:tgtEl>
+                                          <p:spTgt spid="73">
+                                            <p:txEl>
+                                              <p:pRg st="1" end="1"/>
+                                            </p:txEl>
+                                          </p:spTgt>
+                                        </p:tgtEl>
+                                        <p:attrNameLst>
+                                          <p:attrName>style.visibility</p:attrName>
+                                        </p:attrNameLst>
+                                      </p:cBhvr>
+                                      <p:to>
+                                        <p:strVal val="visible"/>
+                                      </p:to>
+                                    </p:set>
+                                    <p:animEffect transition="in" filter="fade">
+                                      <p:cBhvr>
+                                        <p:cTn id="55" dur="500"/>
+                                        <p:tgtEl>
+                                          <p:spTgt spid="73">
+                                            <p:txEl>
+                                              <p:pRg st="1" end="1"/>
+                                            </p:txEl>
+                                          </p:spTgt>
+                                        </p:tgtEl>
+                                      </p:cBhvr>
+                                    </p:animEffect>
+                                  </p:childTnLst>
+                                </p:cTn>
+                              </p:par>
+                              <p:par>
+                                <p:cTn id="56" presetID="10" presetClass="entr" presetSubtype="0" fill="hold" nodeType="withEffect">
+                                  <p:stCondLst>
+                                    <p:cond delay="0"/>
+                                  </p:stCondLst>
+                                  <p:childTnLst>
+                                    <p:set>
+                                      <p:cBhvr>
+                                        <p:cTn id="57" dur="1" fill="hold">
+                                          <p:stCondLst>
+                                            <p:cond delay="0"/>
+                                          </p:stCondLst>
+                                        </p:cTn>
+                                        <p:tgtEl>
+                                          <p:spTgt spid="73">
+                                            <p:txEl>
+                                              <p:pRg st="2" end="2"/>
+                                            </p:txEl>
+                                          </p:spTgt>
+                                        </p:tgtEl>
+                                        <p:attrNameLst>
+                                          <p:attrName>style.visibility</p:attrName>
+                                        </p:attrNameLst>
+                                      </p:cBhvr>
+                                      <p:to>
+                                        <p:strVal val="visible"/>
+                                      </p:to>
+                                    </p:set>
+                                    <p:animEffect transition="in" filter="fade">
+                                      <p:cBhvr>
+                                        <p:cTn id="58" dur="500"/>
+                                        <p:tgtEl>
+                                          <p:spTgt spid="73">
+                                            <p:txEl>
+                                              <p:pRg st="2" end="2"/>
+                                            </p:txEl>
+                                          </p:spTgt>
+                                        </p:tgtEl>
+                                      </p:cBhvr>
+                                    </p:animEffect>
+                                  </p:childTnLst>
+                                </p:cTn>
+                              </p:par>
+                              <p:par>
+                                <p:cTn id="59" presetID="10" presetClass="entr" presetSubtype="0" fill="hold" nodeType="withEffect">
+                                  <p:stCondLst>
+                                    <p:cond delay="0"/>
+                                  </p:stCondLst>
+                                  <p:childTnLst>
+                                    <p:set>
+                                      <p:cBhvr>
+                                        <p:cTn id="60" dur="1" fill="hold">
+                                          <p:stCondLst>
+                                            <p:cond delay="0"/>
+                                          </p:stCondLst>
+                                        </p:cTn>
+                                        <p:tgtEl>
+                                          <p:spTgt spid="73">
                                             <p:txEl>
                                               <p:pRg st="3" end="3"/>
                                             </p:txEl>
@@ -10949,158 +13213,11 @@
                                     </p:set>
                                     <p:animEffect transition="in" filter="fade">
                                       <p:cBhvr>
-                                        <p:cTn id="18" dur="500"/>
+                                        <p:cTn id="61" dur="500"/>
                                         <p:tgtEl>
-                                          <p:spTgt spid="18">
+                                          <p:spTgt spid="73">
                                             <p:txEl>
                                               <p:pRg st="3" end="3"/>
-                                            </p:txEl>
-                                          </p:spTgt>
-                                        </p:tgtEl>
-                                      </p:cBhvr>
-                                    </p:animEffect>
-                                  </p:childTnLst>
-                                </p:cTn>
-                              </p:par>
-                              <p:par>
-                                <p:cTn id="19" presetID="10" presetClass="entr" presetSubtype="0" fill="hold" nodeType="withEffect">
-                                  <p:stCondLst>
-                                    <p:cond delay="0"/>
-                                  </p:stCondLst>
-                                  <p:childTnLst>
-                                    <p:set>
-                                      <p:cBhvr>
-                                        <p:cTn id="20" dur="1" fill="hold">
-                                          <p:stCondLst>
-                                            <p:cond delay="0"/>
-                                          </p:stCondLst>
-                                        </p:cTn>
-                                        <p:tgtEl>
-                                          <p:spTgt spid="18">
-                                            <p:txEl>
-                                              <p:pRg st="4" end="4"/>
-                                            </p:txEl>
-                                          </p:spTgt>
-                                        </p:tgtEl>
-                                        <p:attrNameLst>
-                                          <p:attrName>style.visibility</p:attrName>
-                                        </p:attrNameLst>
-                                      </p:cBhvr>
-                                      <p:to>
-                                        <p:strVal val="visible"/>
-                                      </p:to>
-                                    </p:set>
-                                    <p:animEffect transition="in" filter="fade">
-                                      <p:cBhvr>
-                                        <p:cTn id="21" dur="500"/>
-                                        <p:tgtEl>
-                                          <p:spTgt spid="18">
-                                            <p:txEl>
-                                              <p:pRg st="4" end="4"/>
-                                            </p:txEl>
-                                          </p:spTgt>
-                                        </p:tgtEl>
-                                      </p:cBhvr>
-                                    </p:animEffect>
-                                  </p:childTnLst>
-                                </p:cTn>
-                              </p:par>
-                            </p:childTnLst>
-                          </p:cTn>
-                        </p:par>
-                      </p:childTnLst>
-                    </p:cTn>
-                  </p:par>
-                  <p:par>
-                    <p:cTn id="22" fill="hold">
-                      <p:stCondLst>
-                        <p:cond delay="indefinite"/>
-                      </p:stCondLst>
-                      <p:childTnLst>
-                        <p:par>
-                          <p:cTn id="23" fill="hold">
-                            <p:stCondLst>
-                              <p:cond delay="0"/>
-                            </p:stCondLst>
-                            <p:childTnLst>
-                              <p:par>
-                                <p:cTn id="24" presetID="10" presetClass="entr" presetSubtype="0" fill="hold" nodeType="clickEffect">
-                                  <p:stCondLst>
-                                    <p:cond delay="0"/>
-                                  </p:stCondLst>
-                                  <p:childTnLst>
-                                    <p:set>
-                                      <p:cBhvr>
-                                        <p:cTn id="25" dur="1" fill="hold">
-                                          <p:stCondLst>
-                                            <p:cond delay="0"/>
-                                          </p:stCondLst>
-                                        </p:cTn>
-                                        <p:tgtEl>
-                                          <p:spTgt spid="18">
-                                            <p:txEl>
-                                              <p:pRg st="5" end="5"/>
-                                            </p:txEl>
-                                          </p:spTgt>
-                                        </p:tgtEl>
-                                        <p:attrNameLst>
-                                          <p:attrName>style.visibility</p:attrName>
-                                        </p:attrNameLst>
-                                      </p:cBhvr>
-                                      <p:to>
-                                        <p:strVal val="visible"/>
-                                      </p:to>
-                                    </p:set>
-                                    <p:animEffect transition="in" filter="fade">
-                                      <p:cBhvr>
-                                        <p:cTn id="26" dur="500"/>
-                                        <p:tgtEl>
-                                          <p:spTgt spid="18">
-                                            <p:txEl>
-                                              <p:pRg st="5" end="5"/>
-                                            </p:txEl>
-                                          </p:spTgt>
-                                        </p:tgtEl>
-                                      </p:cBhvr>
-                                    </p:animEffect>
-                                  </p:childTnLst>
-                                </p:cTn>
-                              </p:par>
-                              <p:par>
-                                <p:cTn id="27" presetID="10" presetClass="entr" presetSubtype="0" fill="hold" nodeType="withEffect">
-                                  <p:stCondLst>
-                                    <p:cond delay="0"/>
-                                  </p:stCondLst>
-                                  <p:childTnLst>
-                                    <p:set>
-                                      <p:cBhvr>
-                                        <p:cTn id="28" dur="1" fill="hold">
-                                          <p:stCondLst>
-                                            <p:cond delay="0"/>
-                                          </p:stCondLst>
-                                        </p:cTn>
-                                        <p:tgtEl>
-                                          <p:spTgt spid="18">
-                                            <p:txEl>
-                                              <p:pRg st="6" end="6"/>
-                                            </p:txEl>
-                                          </p:spTgt>
-                                        </p:tgtEl>
-                                        <p:attrNameLst>
-                                          <p:attrName>style.visibility</p:attrName>
-                                        </p:attrNameLst>
-                                      </p:cBhvr>
-                                      <p:to>
-                                        <p:strVal val="visible"/>
-                                      </p:to>
-                                    </p:set>
-                                    <p:animEffect transition="in" filter="fade">
-                                      <p:cBhvr>
-                                        <p:cTn id="29" dur="500"/>
-                                        <p:tgtEl>
-                                          <p:spTgt spid="18">
-                                            <p:txEl>
-                                              <p:pRg st="6" end="6"/>
                                             </p:txEl>
                                           </p:spTgt>
                                         </p:tgtEl>
@@ -11362,8 +13479,8 @@
         </p:nvSpPr>
         <p:spPr bwMode="auto">
           <a:xfrm>
-            <a:off x="1189918" y="1447800"/>
-            <a:ext cx="7954082" cy="3093154"/>
+            <a:off x="1166472" y="990600"/>
+            <a:ext cx="7954082" cy="5632311"/>
           </a:xfrm>
           <a:prstGeom prst="rect">
             <a:avLst/>
@@ -11384,286 +13501,232 @@
           <a:lstStyle/>
           <a:p>
             <a:pPr marL="342900" indent="-342900" algn="l">
-              <a:lnSpc>
-                <a:spcPct val="150000"/>
-              </a:lnSpc>
-              <a:spcAft>
-                <a:spcPts val="600"/>
-              </a:spcAft>
               <a:buFont typeface="Wingdings" panose="05000000000000000000" pitchFamily="2" charset="2"/>
               <a:buChar char="q"/>
             </a:pPr>
             <a:r>
-              <a:rPr lang="tr-TR" sz="2000" dirty="0" smtClean="0">
-                <a:solidFill>
-                  <a:srgbClr val="F20000"/>
-                </a:solidFill>
-                <a:latin typeface="Times New Roman" panose="02020603050405020304" pitchFamily="18" charset="0"/>
-                <a:cs typeface="Times New Roman" panose="02020603050405020304" pitchFamily="18" charset="0"/>
-              </a:rPr>
-              <a:t> </a:t>
-            </a:r>
-            <a:r>
-              <a:rPr lang="tr-TR" sz="2000" dirty="0" smtClean="0">
-                <a:latin typeface="Times New Roman" panose="02020603050405020304" pitchFamily="18" charset="0"/>
-                <a:cs typeface="Times New Roman" panose="02020603050405020304" pitchFamily="18" charset="0"/>
-              </a:rPr>
-              <a:t>IMMD </a:t>
-            </a:r>
-            <a:r>
-              <a:rPr lang="tr-TR" sz="2000" dirty="0" err="1" smtClean="0">
-                <a:latin typeface="Times New Roman" panose="02020603050405020304" pitchFamily="18" charset="0"/>
-                <a:cs typeface="Times New Roman" panose="02020603050405020304" pitchFamily="18" charset="0"/>
-              </a:rPr>
-              <a:t>bla</a:t>
-            </a:r>
-            <a:r>
-              <a:rPr lang="tr-TR" sz="2000" dirty="0" smtClean="0">
-                <a:latin typeface="Times New Roman" panose="02020603050405020304" pitchFamily="18" charset="0"/>
-                <a:cs typeface="Times New Roman" panose="02020603050405020304" pitchFamily="18" charset="0"/>
-              </a:rPr>
-              <a:t> </a:t>
-            </a:r>
-            <a:r>
-              <a:rPr lang="tr-TR" sz="2000" dirty="0" err="1" smtClean="0">
-                <a:latin typeface="Times New Roman" panose="02020603050405020304" pitchFamily="18" charset="0"/>
-                <a:cs typeface="Times New Roman" panose="02020603050405020304" pitchFamily="18" charset="0"/>
-              </a:rPr>
-              <a:t>bla</a:t>
-            </a:r>
-            <a:endParaRPr lang="tr-TR" sz="2000" dirty="0" smtClean="0">
+              <a:rPr lang="en-US" sz="2000" dirty="0" smtClean="0">
+                <a:latin typeface="Times New Roman" panose="02020603050405020304" pitchFamily="18" charset="0"/>
+                <a:cs typeface="Times New Roman" panose="02020603050405020304" pitchFamily="18" charset="0"/>
+              </a:rPr>
+              <a:t>Integrated modular motor drives</a:t>
+            </a:r>
+          </a:p>
+          <a:p>
+            <a:pPr marL="800100" lvl="1" indent="-342900">
+              <a:buFont typeface="Wingdings" panose="05000000000000000000" pitchFamily="2" charset="2"/>
+              <a:buChar char="ü"/>
+            </a:pPr>
+            <a:r>
+              <a:rPr lang="en-US" sz="2000" dirty="0" smtClean="0">
+                <a:latin typeface="Times New Roman" panose="02020603050405020304" pitchFamily="18" charset="0"/>
+                <a:cs typeface="Times New Roman" panose="02020603050405020304" pitchFamily="18" charset="0"/>
+              </a:rPr>
+              <a:t>Advantages and challenges</a:t>
+            </a:r>
+          </a:p>
+          <a:p>
+            <a:pPr marL="800100" lvl="1" indent="-342900">
+              <a:buFont typeface="Wingdings" panose="05000000000000000000" pitchFamily="2" charset="2"/>
+              <a:buChar char="ü"/>
+            </a:pPr>
+            <a:endParaRPr lang="en-US" sz="2000" dirty="0" smtClean="0">
               <a:latin typeface="Times New Roman" panose="02020603050405020304" pitchFamily="18" charset="0"/>
               <a:cs typeface="Times New Roman" panose="02020603050405020304" pitchFamily="18" charset="0"/>
             </a:endParaRPr>
           </a:p>
           <a:p>
             <a:pPr marL="342900" indent="-342900">
-              <a:lnSpc>
-                <a:spcPct val="150000"/>
-              </a:lnSpc>
-              <a:spcAft>
-                <a:spcPts val="600"/>
-              </a:spcAft>
               <a:buFont typeface="Wingdings" panose="05000000000000000000" pitchFamily="2" charset="2"/>
               <a:buChar char="q"/>
             </a:pPr>
             <a:r>
-              <a:rPr lang="tr-TR" sz="2000" dirty="0">
-                <a:solidFill>
-                  <a:srgbClr val="F20000"/>
-                </a:solidFill>
-                <a:latin typeface="Times New Roman" panose="02020603050405020304" pitchFamily="18" charset="0"/>
-                <a:cs typeface="Times New Roman" panose="02020603050405020304" pitchFamily="18" charset="0"/>
-              </a:rPr>
-              <a:t> </a:t>
-            </a:r>
-            <a:r>
-              <a:rPr lang="tr-TR" sz="2000" dirty="0">
-                <a:latin typeface="Times New Roman" panose="02020603050405020304" pitchFamily="18" charset="0"/>
-                <a:cs typeface="Times New Roman" panose="02020603050405020304" pitchFamily="18" charset="0"/>
-              </a:rPr>
-              <a:t>IMMD </a:t>
-            </a:r>
-            <a:r>
-              <a:rPr lang="tr-TR" sz="2000" dirty="0" err="1">
-                <a:latin typeface="Times New Roman" panose="02020603050405020304" pitchFamily="18" charset="0"/>
-                <a:cs typeface="Times New Roman" panose="02020603050405020304" pitchFamily="18" charset="0"/>
-              </a:rPr>
-              <a:t>bla</a:t>
-            </a:r>
-            <a:r>
-              <a:rPr lang="tr-TR" sz="2000" dirty="0">
-                <a:latin typeface="Times New Roman" panose="02020603050405020304" pitchFamily="18" charset="0"/>
-                <a:cs typeface="Times New Roman" panose="02020603050405020304" pitchFamily="18" charset="0"/>
-              </a:rPr>
-              <a:t> </a:t>
-            </a:r>
-            <a:r>
-              <a:rPr lang="tr-TR" sz="2000" dirty="0" err="1">
-                <a:latin typeface="Times New Roman" panose="02020603050405020304" pitchFamily="18" charset="0"/>
-                <a:cs typeface="Times New Roman" panose="02020603050405020304" pitchFamily="18" charset="0"/>
-              </a:rPr>
-              <a:t>bla</a:t>
-            </a:r>
-            <a:endParaRPr lang="tr-TR" sz="2000" dirty="0">
+              <a:rPr lang="en-US" sz="2000" dirty="0" smtClean="0">
+                <a:latin typeface="Times New Roman" panose="02020603050405020304" pitchFamily="18" charset="0"/>
+                <a:cs typeface="Times New Roman" panose="02020603050405020304" pitchFamily="18" charset="0"/>
+              </a:rPr>
+              <a:t>Volume reduction challenge</a:t>
+            </a:r>
+          </a:p>
+          <a:p>
+            <a:pPr marL="800100" lvl="1" indent="-342900">
+              <a:buFont typeface="Wingdings" panose="05000000000000000000" pitchFamily="2" charset="2"/>
+              <a:buChar char="ü"/>
+            </a:pPr>
+            <a:r>
+              <a:rPr lang="en-US" sz="2000" dirty="0" smtClean="0">
+                <a:latin typeface="Times New Roman" panose="02020603050405020304" pitchFamily="18" charset="0"/>
+                <a:cs typeface="Times New Roman" panose="02020603050405020304" pitchFamily="18" charset="0"/>
+              </a:rPr>
+              <a:t>DC link capacitor size optimization</a:t>
+            </a:r>
+          </a:p>
+          <a:p>
+            <a:pPr marL="800100" lvl="1" indent="-342900">
+              <a:buFont typeface="Wingdings" panose="05000000000000000000" pitchFamily="2" charset="2"/>
+              <a:buChar char="ü"/>
+            </a:pPr>
+            <a:endParaRPr lang="en-US" sz="2000" dirty="0" smtClean="0">
               <a:latin typeface="Times New Roman" panose="02020603050405020304" pitchFamily="18" charset="0"/>
               <a:cs typeface="Times New Roman" panose="02020603050405020304" pitchFamily="18" charset="0"/>
             </a:endParaRPr>
           </a:p>
           <a:p>
             <a:pPr marL="342900" indent="-342900">
-              <a:lnSpc>
-                <a:spcPct val="150000"/>
-              </a:lnSpc>
-              <a:spcAft>
-                <a:spcPts val="600"/>
-              </a:spcAft>
               <a:buFont typeface="Wingdings" panose="05000000000000000000" pitchFamily="2" charset="2"/>
               <a:buChar char="q"/>
             </a:pPr>
             <a:r>
-              <a:rPr lang="tr-TR" sz="2000" dirty="0">
-                <a:solidFill>
-                  <a:srgbClr val="F20000"/>
-                </a:solidFill>
-                <a:latin typeface="Times New Roman" panose="02020603050405020304" pitchFamily="18" charset="0"/>
-                <a:cs typeface="Times New Roman" panose="02020603050405020304" pitchFamily="18" charset="0"/>
-              </a:rPr>
-              <a:t> </a:t>
-            </a:r>
-            <a:r>
-              <a:rPr lang="tr-TR" sz="2000" dirty="0">
-                <a:latin typeface="Times New Roman" panose="02020603050405020304" pitchFamily="18" charset="0"/>
-                <a:cs typeface="Times New Roman" panose="02020603050405020304" pitchFamily="18" charset="0"/>
-              </a:rPr>
-              <a:t>IMMD </a:t>
-            </a:r>
-            <a:r>
-              <a:rPr lang="tr-TR" sz="2000" dirty="0" err="1">
-                <a:latin typeface="Times New Roman" panose="02020603050405020304" pitchFamily="18" charset="0"/>
-                <a:cs typeface="Times New Roman" panose="02020603050405020304" pitchFamily="18" charset="0"/>
-              </a:rPr>
-              <a:t>bla</a:t>
-            </a:r>
-            <a:r>
-              <a:rPr lang="tr-TR" sz="2000" dirty="0">
-                <a:latin typeface="Times New Roman" panose="02020603050405020304" pitchFamily="18" charset="0"/>
-                <a:cs typeface="Times New Roman" panose="02020603050405020304" pitchFamily="18" charset="0"/>
-              </a:rPr>
-              <a:t> </a:t>
-            </a:r>
-            <a:r>
-              <a:rPr lang="tr-TR" sz="2000" dirty="0" err="1">
-                <a:latin typeface="Times New Roman" panose="02020603050405020304" pitchFamily="18" charset="0"/>
-                <a:cs typeface="Times New Roman" panose="02020603050405020304" pitchFamily="18" charset="0"/>
-              </a:rPr>
-              <a:t>bla</a:t>
-            </a:r>
-            <a:endParaRPr lang="tr-TR" sz="2000" dirty="0">
+              <a:rPr lang="en-US" sz="2000" dirty="0" smtClean="0">
+                <a:latin typeface="Times New Roman" panose="02020603050405020304" pitchFamily="18" charset="0"/>
+                <a:cs typeface="Times New Roman" panose="02020603050405020304" pitchFamily="18" charset="0"/>
+              </a:rPr>
+              <a:t>DC Link model of an IMMD</a:t>
+            </a:r>
+          </a:p>
+          <a:p>
+            <a:pPr marL="800100" lvl="1" indent="-342900">
+              <a:buFont typeface="Wingdings" panose="05000000000000000000" pitchFamily="2" charset="2"/>
+              <a:buChar char="ü"/>
+            </a:pPr>
+            <a:r>
+              <a:rPr lang="en-US" sz="2000" dirty="0" smtClean="0">
+                <a:latin typeface="Times New Roman" panose="02020603050405020304" pitchFamily="18" charset="0"/>
+                <a:cs typeface="Times New Roman" panose="02020603050405020304" pitchFamily="18" charset="0"/>
+              </a:rPr>
+              <a:t>Critical parameters</a:t>
+            </a:r>
+          </a:p>
+          <a:p>
+            <a:pPr marL="800100" lvl="1" indent="-342900">
+              <a:buFont typeface="Wingdings" panose="05000000000000000000" pitchFamily="2" charset="2"/>
+              <a:buChar char="ü"/>
+            </a:pPr>
+            <a:r>
+              <a:rPr lang="en-US" sz="2000" dirty="0" smtClean="0">
+                <a:latin typeface="Times New Roman" panose="02020603050405020304" pitchFamily="18" charset="0"/>
+                <a:cs typeface="Times New Roman" panose="02020603050405020304" pitchFamily="18" charset="0"/>
+              </a:rPr>
+              <a:t>Analytical model</a:t>
+            </a:r>
+          </a:p>
+          <a:p>
+            <a:pPr marL="800100" lvl="1" indent="-342900">
+              <a:buFont typeface="Wingdings" panose="05000000000000000000" pitchFamily="2" charset="2"/>
+              <a:buChar char="ü"/>
+            </a:pPr>
+            <a:endParaRPr lang="en-US" sz="2000" dirty="0" smtClean="0">
               <a:latin typeface="Times New Roman" panose="02020603050405020304" pitchFamily="18" charset="0"/>
               <a:cs typeface="Times New Roman" panose="02020603050405020304" pitchFamily="18" charset="0"/>
             </a:endParaRPr>
           </a:p>
           <a:p>
             <a:pPr marL="342900" indent="-342900">
-              <a:lnSpc>
-                <a:spcPct val="150000"/>
-              </a:lnSpc>
-              <a:spcAft>
-                <a:spcPts val="600"/>
-              </a:spcAft>
               <a:buFont typeface="Wingdings" panose="05000000000000000000" pitchFamily="2" charset="2"/>
               <a:buChar char="q"/>
             </a:pPr>
             <a:r>
-              <a:rPr lang="tr-TR" sz="2000" dirty="0">
-                <a:solidFill>
-                  <a:srgbClr val="F20000"/>
-                </a:solidFill>
+              <a:rPr lang="en-US" sz="2000" dirty="0" smtClean="0">
+                <a:latin typeface="Times New Roman" panose="02020603050405020304" pitchFamily="18" charset="0"/>
+                <a:cs typeface="Times New Roman" panose="02020603050405020304" pitchFamily="18" charset="0"/>
+              </a:rPr>
+              <a:t>Interleaving</a:t>
+            </a:r>
+          </a:p>
+          <a:p>
+            <a:pPr marL="800100" lvl="1" indent="-342900">
+              <a:buFont typeface="Wingdings" panose="05000000000000000000" pitchFamily="2" charset="2"/>
+              <a:buChar char="ü"/>
+            </a:pPr>
+            <a:r>
+              <a:rPr lang="en-US" sz="2000" dirty="0" smtClean="0">
+                <a:latin typeface="Times New Roman" panose="02020603050405020304" pitchFamily="18" charset="0"/>
+                <a:cs typeface="Times New Roman" panose="02020603050405020304" pitchFamily="18" charset="0"/>
+              </a:rPr>
+              <a:t>Optimum phase shift angle</a:t>
+            </a:r>
+          </a:p>
+          <a:p>
+            <a:pPr marL="800100" lvl="1" indent="-342900">
+              <a:buFont typeface="Wingdings" panose="05000000000000000000" pitchFamily="2" charset="2"/>
+              <a:buChar char="ü"/>
+            </a:pPr>
+            <a:r>
+              <a:rPr lang="en-US" sz="2000" dirty="0" smtClean="0">
+                <a:latin typeface="Times New Roman" panose="02020603050405020304" pitchFamily="18" charset="0"/>
+                <a:cs typeface="Times New Roman" panose="02020603050405020304" pitchFamily="18" charset="0"/>
+              </a:rPr>
+              <a:t>Optimum number of modules</a:t>
+            </a:r>
+            <a:r>
+              <a:rPr lang="en-US" sz="2000" dirty="0" smtClean="0">
                 <a:latin typeface="Times New Roman" panose="02020603050405020304" pitchFamily="18" charset="0"/>
                 <a:cs typeface="Times New Roman" panose="02020603050405020304" pitchFamily="18" charset="0"/>
               </a:rPr>
               <a:t> </a:t>
             </a:r>
-            <a:r>
-              <a:rPr lang="tr-TR" sz="2000" dirty="0">
-                <a:latin typeface="Times New Roman" panose="02020603050405020304" pitchFamily="18" charset="0"/>
-                <a:cs typeface="Times New Roman" panose="02020603050405020304" pitchFamily="18" charset="0"/>
-              </a:rPr>
-              <a:t>IMMD </a:t>
-            </a:r>
-            <a:r>
-              <a:rPr lang="tr-TR" sz="2000" dirty="0" err="1">
-                <a:latin typeface="Times New Roman" panose="02020603050405020304" pitchFamily="18" charset="0"/>
-                <a:cs typeface="Times New Roman" panose="02020603050405020304" pitchFamily="18" charset="0"/>
-              </a:rPr>
-              <a:t>bla</a:t>
-            </a:r>
-            <a:r>
-              <a:rPr lang="tr-TR" sz="2000" dirty="0">
-                <a:latin typeface="Times New Roman" panose="02020603050405020304" pitchFamily="18" charset="0"/>
-                <a:cs typeface="Times New Roman" panose="02020603050405020304" pitchFamily="18" charset="0"/>
-              </a:rPr>
-              <a:t> </a:t>
-            </a:r>
-            <a:r>
-              <a:rPr lang="tr-TR" sz="2000" dirty="0" err="1">
-                <a:latin typeface="Times New Roman" panose="02020603050405020304" pitchFamily="18" charset="0"/>
-                <a:cs typeface="Times New Roman" panose="02020603050405020304" pitchFamily="18" charset="0"/>
-              </a:rPr>
-              <a:t>bla</a:t>
-            </a:r>
-            <a:endParaRPr lang="tr-TR" sz="2000" dirty="0">
+          </a:p>
+          <a:p>
+            <a:pPr marL="800100" lvl="1" indent="-342900">
+              <a:buFont typeface="Wingdings" panose="05000000000000000000" pitchFamily="2" charset="2"/>
+              <a:buChar char="ü"/>
+            </a:pPr>
+            <a:endParaRPr lang="en-US" sz="2000" dirty="0" smtClean="0">
               <a:latin typeface="Times New Roman" panose="02020603050405020304" pitchFamily="18" charset="0"/>
               <a:cs typeface="Times New Roman" panose="02020603050405020304" pitchFamily="18" charset="0"/>
             </a:endParaRPr>
           </a:p>
           <a:p>
             <a:pPr marL="342900" indent="-342900">
-              <a:lnSpc>
-                <a:spcPct val="150000"/>
-              </a:lnSpc>
-              <a:spcAft>
-                <a:spcPts val="600"/>
-              </a:spcAft>
               <a:buFont typeface="Wingdings" panose="05000000000000000000" pitchFamily="2" charset="2"/>
               <a:buChar char="q"/>
             </a:pPr>
             <a:r>
-              <a:rPr lang="tr-TR" sz="2000" dirty="0">
-                <a:solidFill>
-                  <a:srgbClr val="F20000"/>
-                </a:solidFill>
-                <a:latin typeface="Times New Roman" panose="02020603050405020304" pitchFamily="18" charset="0"/>
-                <a:cs typeface="Times New Roman" panose="02020603050405020304" pitchFamily="18" charset="0"/>
-              </a:rPr>
-              <a:t> </a:t>
-            </a:r>
-            <a:r>
-              <a:rPr lang="tr-TR" sz="2000" dirty="0">
-                <a:latin typeface="Times New Roman" panose="02020603050405020304" pitchFamily="18" charset="0"/>
-                <a:cs typeface="Times New Roman" panose="02020603050405020304" pitchFamily="18" charset="0"/>
-              </a:rPr>
-              <a:t>IMMD </a:t>
-            </a:r>
-            <a:r>
-              <a:rPr lang="tr-TR" sz="2000" dirty="0" err="1">
-                <a:latin typeface="Times New Roman" panose="02020603050405020304" pitchFamily="18" charset="0"/>
-                <a:cs typeface="Times New Roman" panose="02020603050405020304" pitchFamily="18" charset="0"/>
-              </a:rPr>
-              <a:t>bla</a:t>
-            </a:r>
-            <a:r>
-              <a:rPr lang="tr-TR" sz="2000" dirty="0">
-                <a:latin typeface="Times New Roman" panose="02020603050405020304" pitchFamily="18" charset="0"/>
-                <a:cs typeface="Times New Roman" panose="02020603050405020304" pitchFamily="18" charset="0"/>
-              </a:rPr>
-              <a:t> </a:t>
-            </a:r>
-            <a:r>
-              <a:rPr lang="tr-TR" sz="2000" dirty="0" err="1">
-                <a:latin typeface="Times New Roman" panose="02020603050405020304" pitchFamily="18" charset="0"/>
-                <a:cs typeface="Times New Roman" panose="02020603050405020304" pitchFamily="18" charset="0"/>
-              </a:rPr>
-              <a:t>bla</a:t>
-            </a:r>
-            <a:endParaRPr lang="tr-TR" sz="2000" dirty="0">
-              <a:latin typeface="Times New Roman" panose="02020603050405020304" pitchFamily="18" charset="0"/>
-              <a:cs typeface="Times New Roman" panose="02020603050405020304" pitchFamily="18" charset="0"/>
-            </a:endParaRPr>
-          </a:p>
-          <a:p>
-            <a:pPr marL="342900" indent="-342900" algn="l">
-              <a:spcAft>
-                <a:spcPts val="600"/>
-              </a:spcAft>
+              <a:rPr lang="en-US" sz="2000" dirty="0" smtClean="0">
+                <a:latin typeface="Times New Roman" panose="02020603050405020304" pitchFamily="18" charset="0"/>
+                <a:cs typeface="Times New Roman" panose="02020603050405020304" pitchFamily="18" charset="0"/>
+              </a:rPr>
+              <a:t>Capacitor selection algorithm</a:t>
+            </a:r>
+          </a:p>
+          <a:p>
+            <a:pPr marL="800100" lvl="1" indent="-342900">
               <a:buFont typeface="Wingdings" panose="05000000000000000000" pitchFamily="2" charset="2"/>
-              <a:buChar char="q"/>
+              <a:buChar char="ü"/>
             </a:pPr>
-            <a:endParaRPr lang="tr-TR" sz="2000" dirty="0" smtClean="0">
-              <a:latin typeface="Times New Roman" panose="02020603050405020304" pitchFamily="18" charset="0"/>
-              <a:cs typeface="Times New Roman" panose="02020603050405020304" pitchFamily="18" charset="0"/>
-            </a:endParaRPr>
+            <a:r>
+              <a:rPr lang="en-US" sz="2000" dirty="0" smtClean="0">
+                <a:latin typeface="Times New Roman" panose="02020603050405020304" pitchFamily="18" charset="0"/>
+                <a:cs typeface="Times New Roman" panose="02020603050405020304" pitchFamily="18" charset="0"/>
+              </a:rPr>
+              <a:t>Film capacitors =&gt; datasheet parameters</a:t>
+            </a:r>
+          </a:p>
+          <a:p>
+            <a:pPr marL="800100" lvl="1" indent="-342900">
+              <a:buFont typeface="Wingdings" panose="05000000000000000000" pitchFamily="2" charset="2"/>
+              <a:buChar char="ü"/>
+            </a:pPr>
+            <a:r>
+              <a:rPr lang="en-US" sz="2000" dirty="0" smtClean="0">
+                <a:latin typeface="Times New Roman" panose="02020603050405020304" pitchFamily="18" charset="0"/>
+                <a:cs typeface="Times New Roman" panose="02020603050405020304" pitchFamily="18" charset="0"/>
+              </a:rPr>
+              <a:t>Critical switching frequency</a:t>
+            </a:r>
+          </a:p>
+          <a:p>
+            <a:pPr marL="800100" lvl="1" indent="-342900">
+              <a:buFont typeface="Wingdings" panose="05000000000000000000" pitchFamily="2" charset="2"/>
+              <a:buChar char="ü"/>
+            </a:pPr>
+            <a:r>
+              <a:rPr lang="en-US" sz="2000" dirty="0" smtClean="0">
+                <a:latin typeface="Times New Roman" panose="02020603050405020304" pitchFamily="18" charset="0"/>
+                <a:cs typeface="Times New Roman" panose="02020603050405020304" pitchFamily="18" charset="0"/>
+              </a:rPr>
+              <a:t>Case results =&gt; optimum combination</a:t>
+            </a:r>
           </a:p>
         </p:txBody>
       </p:sp>
@@ -11906,7 +13969,7 @@
                                         <p:tgtEl>
                                           <p:spTgt spid="12">
                                             <p:txEl>
-                                              <p:pRg st="2" end="2"/>
+                                              <p:pRg st="3" end="3"/>
                                             </p:txEl>
                                           </p:spTgt>
                                         </p:tgtEl>
@@ -11924,7 +13987,7 @@
                                         <p:tgtEl>
                                           <p:spTgt spid="12">
                                             <p:txEl>
-                                              <p:pRg st="2" end="2"/>
+                                              <p:pRg st="3" end="3"/>
                                             </p:txEl>
                                           </p:spTgt>
                                         </p:tgtEl>
@@ -11967,7 +14030,7 @@
                                         <p:tgtEl>
                                           <p:spTgt spid="12">
                                             <p:txEl>
-                                              <p:pRg st="3" end="3"/>
+                                              <p:pRg st="4" end="4"/>
                                             </p:txEl>
                                           </p:spTgt>
                                         </p:tgtEl>
@@ -11985,7 +14048,7 @@
                                         <p:tgtEl>
                                           <p:spTgt spid="12">
                                             <p:txEl>
-                                              <p:pRg st="3" end="3"/>
+                                              <p:pRg st="4" end="4"/>
                                             </p:txEl>
                                           </p:spTgt>
                                         </p:tgtEl>
@@ -12028,7 +14091,7 @@
                                         <p:tgtEl>
                                           <p:spTgt spid="12">
                                             <p:txEl>
-                                              <p:pRg st="4" end="4"/>
+                                              <p:pRg st="6" end="6"/>
                                             </p:txEl>
                                           </p:spTgt>
                                         </p:tgtEl>
@@ -12046,7 +14109,556 @@
                                         <p:tgtEl>
                                           <p:spTgt spid="12">
                                             <p:txEl>
-                                              <p:pRg st="4" end="4"/>
+                                              <p:pRg st="6" end="6"/>
+                                            </p:txEl>
+                                          </p:spTgt>
+                                        </p:tgtEl>
+                                      </p:cBhvr>
+                                    </p:animEffect>
+                                  </p:childTnLst>
+                                </p:cTn>
+                              </p:par>
+                            </p:childTnLst>
+                          </p:cTn>
+                        </p:par>
+                      </p:childTnLst>
+                    </p:cTn>
+                  </p:par>
+                  <p:par>
+                    <p:cTn id="28" fill="hold">
+                      <p:stCondLst>
+                        <p:cond delay="indefinite"/>
+                      </p:stCondLst>
+                      <p:childTnLst>
+                        <p:par>
+                          <p:cTn id="29" fill="hold">
+                            <p:stCondLst>
+                              <p:cond delay="0"/>
+                            </p:stCondLst>
+                            <p:childTnLst>
+                              <p:par>
+                                <p:cTn id="30" presetID="10" presetClass="entr" presetSubtype="0" fill="hold" nodeType="clickEffect">
+                                  <p:stCondLst>
+                                    <p:cond delay="0"/>
+                                  </p:stCondLst>
+                                  <p:childTnLst>
+                                    <p:set>
+                                      <p:cBhvr>
+                                        <p:cTn id="31" dur="1" fill="hold">
+                                          <p:stCondLst>
+                                            <p:cond delay="0"/>
+                                          </p:stCondLst>
+                                        </p:cTn>
+                                        <p:tgtEl>
+                                          <p:spTgt spid="12">
+                                            <p:txEl>
+                                              <p:pRg st="7" end="7"/>
+                                            </p:txEl>
+                                          </p:spTgt>
+                                        </p:tgtEl>
+                                        <p:attrNameLst>
+                                          <p:attrName>style.visibility</p:attrName>
+                                        </p:attrNameLst>
+                                      </p:cBhvr>
+                                      <p:to>
+                                        <p:strVal val="visible"/>
+                                      </p:to>
+                                    </p:set>
+                                    <p:animEffect transition="in" filter="fade">
+                                      <p:cBhvr>
+                                        <p:cTn id="32" dur="500"/>
+                                        <p:tgtEl>
+                                          <p:spTgt spid="12">
+                                            <p:txEl>
+                                              <p:pRg st="7" end="7"/>
+                                            </p:txEl>
+                                          </p:spTgt>
+                                        </p:tgtEl>
+                                      </p:cBhvr>
+                                    </p:animEffect>
+                                  </p:childTnLst>
+                                </p:cTn>
+                              </p:par>
+                            </p:childTnLst>
+                          </p:cTn>
+                        </p:par>
+                      </p:childTnLst>
+                    </p:cTn>
+                  </p:par>
+                  <p:par>
+                    <p:cTn id="33" fill="hold">
+                      <p:stCondLst>
+                        <p:cond delay="indefinite"/>
+                      </p:stCondLst>
+                      <p:childTnLst>
+                        <p:par>
+                          <p:cTn id="34" fill="hold">
+                            <p:stCondLst>
+                              <p:cond delay="0"/>
+                            </p:stCondLst>
+                            <p:childTnLst>
+                              <p:par>
+                                <p:cTn id="35" presetID="10" presetClass="entr" presetSubtype="0" fill="hold" nodeType="clickEffect">
+                                  <p:stCondLst>
+                                    <p:cond delay="0"/>
+                                  </p:stCondLst>
+                                  <p:childTnLst>
+                                    <p:set>
+                                      <p:cBhvr>
+                                        <p:cTn id="36" dur="1" fill="hold">
+                                          <p:stCondLst>
+                                            <p:cond delay="0"/>
+                                          </p:stCondLst>
+                                        </p:cTn>
+                                        <p:tgtEl>
+                                          <p:spTgt spid="12">
+                                            <p:txEl>
+                                              <p:pRg st="8" end="8"/>
+                                            </p:txEl>
+                                          </p:spTgt>
+                                        </p:tgtEl>
+                                        <p:attrNameLst>
+                                          <p:attrName>style.visibility</p:attrName>
+                                        </p:attrNameLst>
+                                      </p:cBhvr>
+                                      <p:to>
+                                        <p:strVal val="visible"/>
+                                      </p:to>
+                                    </p:set>
+                                    <p:animEffect transition="in" filter="fade">
+                                      <p:cBhvr>
+                                        <p:cTn id="37" dur="500"/>
+                                        <p:tgtEl>
+                                          <p:spTgt spid="12">
+                                            <p:txEl>
+                                              <p:pRg st="8" end="8"/>
+                                            </p:txEl>
+                                          </p:spTgt>
+                                        </p:tgtEl>
+                                      </p:cBhvr>
+                                    </p:animEffect>
+                                  </p:childTnLst>
+                                </p:cTn>
+                              </p:par>
+                            </p:childTnLst>
+                          </p:cTn>
+                        </p:par>
+                      </p:childTnLst>
+                    </p:cTn>
+                  </p:par>
+                  <p:par>
+                    <p:cTn id="38" fill="hold">
+                      <p:stCondLst>
+                        <p:cond delay="indefinite"/>
+                      </p:stCondLst>
+                      <p:childTnLst>
+                        <p:par>
+                          <p:cTn id="39" fill="hold">
+                            <p:stCondLst>
+                              <p:cond delay="0"/>
+                            </p:stCondLst>
+                            <p:childTnLst>
+                              <p:par>
+                                <p:cTn id="40" presetID="10" presetClass="entr" presetSubtype="0" fill="hold" nodeType="clickEffect">
+                                  <p:stCondLst>
+                                    <p:cond delay="0"/>
+                                  </p:stCondLst>
+                                  <p:childTnLst>
+                                    <p:set>
+                                      <p:cBhvr>
+                                        <p:cTn id="41" dur="1" fill="hold">
+                                          <p:stCondLst>
+                                            <p:cond delay="0"/>
+                                          </p:stCondLst>
+                                        </p:cTn>
+                                        <p:tgtEl>
+                                          <p:spTgt spid="12">
+                                            <p:txEl>
+                                              <p:pRg st="10" end="10"/>
+                                            </p:txEl>
+                                          </p:spTgt>
+                                        </p:tgtEl>
+                                        <p:attrNameLst>
+                                          <p:attrName>style.visibility</p:attrName>
+                                        </p:attrNameLst>
+                                      </p:cBhvr>
+                                      <p:to>
+                                        <p:strVal val="visible"/>
+                                      </p:to>
+                                    </p:set>
+                                    <p:animEffect transition="in" filter="fade">
+                                      <p:cBhvr>
+                                        <p:cTn id="42" dur="500"/>
+                                        <p:tgtEl>
+                                          <p:spTgt spid="12">
+                                            <p:txEl>
+                                              <p:pRg st="10" end="10"/>
+                                            </p:txEl>
+                                          </p:spTgt>
+                                        </p:tgtEl>
+                                      </p:cBhvr>
+                                    </p:animEffect>
+                                  </p:childTnLst>
+                                </p:cTn>
+                              </p:par>
+                            </p:childTnLst>
+                          </p:cTn>
+                        </p:par>
+                      </p:childTnLst>
+                    </p:cTn>
+                  </p:par>
+                  <p:par>
+                    <p:cTn id="43" fill="hold">
+                      <p:stCondLst>
+                        <p:cond delay="indefinite"/>
+                      </p:stCondLst>
+                      <p:childTnLst>
+                        <p:par>
+                          <p:cTn id="44" fill="hold">
+                            <p:stCondLst>
+                              <p:cond delay="0"/>
+                            </p:stCondLst>
+                            <p:childTnLst>
+                              <p:par>
+                                <p:cTn id="45" presetID="10" presetClass="entr" presetSubtype="0" fill="hold" nodeType="clickEffect">
+                                  <p:stCondLst>
+                                    <p:cond delay="0"/>
+                                  </p:stCondLst>
+                                  <p:childTnLst>
+                                    <p:set>
+                                      <p:cBhvr>
+                                        <p:cTn id="46" dur="1" fill="hold">
+                                          <p:stCondLst>
+                                            <p:cond delay="0"/>
+                                          </p:stCondLst>
+                                        </p:cTn>
+                                        <p:tgtEl>
+                                          <p:spTgt spid="12">
+                                            <p:txEl>
+                                              <p:pRg st="11" end="11"/>
+                                            </p:txEl>
+                                          </p:spTgt>
+                                        </p:tgtEl>
+                                        <p:attrNameLst>
+                                          <p:attrName>style.visibility</p:attrName>
+                                        </p:attrNameLst>
+                                      </p:cBhvr>
+                                      <p:to>
+                                        <p:strVal val="visible"/>
+                                      </p:to>
+                                    </p:set>
+                                    <p:animEffect transition="in" filter="fade">
+                                      <p:cBhvr>
+                                        <p:cTn id="47" dur="500"/>
+                                        <p:tgtEl>
+                                          <p:spTgt spid="12">
+                                            <p:txEl>
+                                              <p:pRg st="11" end="11"/>
+                                            </p:txEl>
+                                          </p:spTgt>
+                                        </p:tgtEl>
+                                      </p:cBhvr>
+                                    </p:animEffect>
+                                  </p:childTnLst>
+                                </p:cTn>
+                              </p:par>
+                            </p:childTnLst>
+                          </p:cTn>
+                        </p:par>
+                      </p:childTnLst>
+                    </p:cTn>
+                  </p:par>
+                  <p:par>
+                    <p:cTn id="48" fill="hold">
+                      <p:stCondLst>
+                        <p:cond delay="indefinite"/>
+                      </p:stCondLst>
+                      <p:childTnLst>
+                        <p:par>
+                          <p:cTn id="49" fill="hold">
+                            <p:stCondLst>
+                              <p:cond delay="0"/>
+                            </p:stCondLst>
+                            <p:childTnLst>
+                              <p:par>
+                                <p:cTn id="50" presetID="10" presetClass="entr" presetSubtype="0" fill="hold" nodeType="clickEffect">
+                                  <p:stCondLst>
+                                    <p:cond delay="0"/>
+                                  </p:stCondLst>
+                                  <p:childTnLst>
+                                    <p:set>
+                                      <p:cBhvr>
+                                        <p:cTn id="51" dur="1" fill="hold">
+                                          <p:stCondLst>
+                                            <p:cond delay="0"/>
+                                          </p:stCondLst>
+                                        </p:cTn>
+                                        <p:tgtEl>
+                                          <p:spTgt spid="12">
+                                            <p:txEl>
+                                              <p:pRg st="12" end="12"/>
+                                            </p:txEl>
+                                          </p:spTgt>
+                                        </p:tgtEl>
+                                        <p:attrNameLst>
+                                          <p:attrName>style.visibility</p:attrName>
+                                        </p:attrNameLst>
+                                      </p:cBhvr>
+                                      <p:to>
+                                        <p:strVal val="visible"/>
+                                      </p:to>
+                                    </p:set>
+                                    <p:animEffect transition="in" filter="fade">
+                                      <p:cBhvr>
+                                        <p:cTn id="52" dur="500"/>
+                                        <p:tgtEl>
+                                          <p:spTgt spid="12">
+                                            <p:txEl>
+                                              <p:pRg st="12" end="12"/>
+                                            </p:txEl>
+                                          </p:spTgt>
+                                        </p:tgtEl>
+                                      </p:cBhvr>
+                                    </p:animEffect>
+                                  </p:childTnLst>
+                                </p:cTn>
+                              </p:par>
+                            </p:childTnLst>
+                          </p:cTn>
+                        </p:par>
+                      </p:childTnLst>
+                    </p:cTn>
+                  </p:par>
+                  <p:par>
+                    <p:cTn id="53" fill="hold">
+                      <p:stCondLst>
+                        <p:cond delay="indefinite"/>
+                      </p:stCondLst>
+                      <p:childTnLst>
+                        <p:par>
+                          <p:cTn id="54" fill="hold">
+                            <p:stCondLst>
+                              <p:cond delay="0"/>
+                            </p:stCondLst>
+                            <p:childTnLst>
+                              <p:par>
+                                <p:cTn id="55" presetID="10" presetClass="entr" presetSubtype="0" fill="hold" nodeType="clickEffect">
+                                  <p:stCondLst>
+                                    <p:cond delay="0"/>
+                                  </p:stCondLst>
+                                  <p:childTnLst>
+                                    <p:set>
+                                      <p:cBhvr>
+                                        <p:cTn id="56" dur="1" fill="hold">
+                                          <p:stCondLst>
+                                            <p:cond delay="0"/>
+                                          </p:stCondLst>
+                                        </p:cTn>
+                                        <p:tgtEl>
+                                          <p:spTgt spid="12">
+                                            <p:txEl>
+                                              <p:pRg st="14" end="14"/>
+                                            </p:txEl>
+                                          </p:spTgt>
+                                        </p:tgtEl>
+                                        <p:attrNameLst>
+                                          <p:attrName>style.visibility</p:attrName>
+                                        </p:attrNameLst>
+                                      </p:cBhvr>
+                                      <p:to>
+                                        <p:strVal val="visible"/>
+                                      </p:to>
+                                    </p:set>
+                                    <p:animEffect transition="in" filter="fade">
+                                      <p:cBhvr>
+                                        <p:cTn id="57" dur="500"/>
+                                        <p:tgtEl>
+                                          <p:spTgt spid="12">
+                                            <p:txEl>
+                                              <p:pRg st="14" end="14"/>
+                                            </p:txEl>
+                                          </p:spTgt>
+                                        </p:tgtEl>
+                                      </p:cBhvr>
+                                    </p:animEffect>
+                                  </p:childTnLst>
+                                </p:cTn>
+                              </p:par>
+                            </p:childTnLst>
+                          </p:cTn>
+                        </p:par>
+                      </p:childTnLst>
+                    </p:cTn>
+                  </p:par>
+                  <p:par>
+                    <p:cTn id="58" fill="hold">
+                      <p:stCondLst>
+                        <p:cond delay="indefinite"/>
+                      </p:stCondLst>
+                      <p:childTnLst>
+                        <p:par>
+                          <p:cTn id="59" fill="hold">
+                            <p:stCondLst>
+                              <p:cond delay="0"/>
+                            </p:stCondLst>
+                            <p:childTnLst>
+                              <p:par>
+                                <p:cTn id="60" presetID="10" presetClass="entr" presetSubtype="0" fill="hold" nodeType="clickEffect">
+                                  <p:stCondLst>
+                                    <p:cond delay="0"/>
+                                  </p:stCondLst>
+                                  <p:childTnLst>
+                                    <p:set>
+                                      <p:cBhvr>
+                                        <p:cTn id="61" dur="1" fill="hold">
+                                          <p:stCondLst>
+                                            <p:cond delay="0"/>
+                                          </p:stCondLst>
+                                        </p:cTn>
+                                        <p:tgtEl>
+                                          <p:spTgt spid="12">
+                                            <p:txEl>
+                                              <p:pRg st="15" end="15"/>
+                                            </p:txEl>
+                                          </p:spTgt>
+                                        </p:tgtEl>
+                                        <p:attrNameLst>
+                                          <p:attrName>style.visibility</p:attrName>
+                                        </p:attrNameLst>
+                                      </p:cBhvr>
+                                      <p:to>
+                                        <p:strVal val="visible"/>
+                                      </p:to>
+                                    </p:set>
+                                    <p:animEffect transition="in" filter="fade">
+                                      <p:cBhvr>
+                                        <p:cTn id="62" dur="500"/>
+                                        <p:tgtEl>
+                                          <p:spTgt spid="12">
+                                            <p:txEl>
+                                              <p:pRg st="15" end="15"/>
+                                            </p:txEl>
+                                          </p:spTgt>
+                                        </p:tgtEl>
+                                      </p:cBhvr>
+                                    </p:animEffect>
+                                  </p:childTnLst>
+                                </p:cTn>
+                              </p:par>
+                            </p:childTnLst>
+                          </p:cTn>
+                        </p:par>
+                      </p:childTnLst>
+                    </p:cTn>
+                  </p:par>
+                  <p:par>
+                    <p:cTn id="63" fill="hold">
+                      <p:stCondLst>
+                        <p:cond delay="indefinite"/>
+                      </p:stCondLst>
+                      <p:childTnLst>
+                        <p:par>
+                          <p:cTn id="64" fill="hold">
+                            <p:stCondLst>
+                              <p:cond delay="0"/>
+                            </p:stCondLst>
+                            <p:childTnLst>
+                              <p:par>
+                                <p:cTn id="65" presetID="10" presetClass="entr" presetSubtype="0" fill="hold" nodeType="clickEffect">
+                                  <p:stCondLst>
+                                    <p:cond delay="0"/>
+                                  </p:stCondLst>
+                                  <p:childTnLst>
+                                    <p:set>
+                                      <p:cBhvr>
+                                        <p:cTn id="66" dur="1" fill="hold">
+                                          <p:stCondLst>
+                                            <p:cond delay="0"/>
+                                          </p:stCondLst>
+                                        </p:cTn>
+                                        <p:tgtEl>
+                                          <p:spTgt spid="12">
+                                            <p:txEl>
+                                              <p:pRg st="16" end="16"/>
+                                            </p:txEl>
+                                          </p:spTgt>
+                                        </p:tgtEl>
+                                        <p:attrNameLst>
+                                          <p:attrName>style.visibility</p:attrName>
+                                        </p:attrNameLst>
+                                      </p:cBhvr>
+                                      <p:to>
+                                        <p:strVal val="visible"/>
+                                      </p:to>
+                                    </p:set>
+                                    <p:animEffect transition="in" filter="fade">
+                                      <p:cBhvr>
+                                        <p:cTn id="67" dur="500"/>
+                                        <p:tgtEl>
+                                          <p:spTgt spid="12">
+                                            <p:txEl>
+                                              <p:pRg st="16" end="16"/>
+                                            </p:txEl>
+                                          </p:spTgt>
+                                        </p:tgtEl>
+                                      </p:cBhvr>
+                                    </p:animEffect>
+                                  </p:childTnLst>
+                                </p:cTn>
+                              </p:par>
+                            </p:childTnLst>
+                          </p:cTn>
+                        </p:par>
+                      </p:childTnLst>
+                    </p:cTn>
+                  </p:par>
+                  <p:par>
+                    <p:cTn id="68" fill="hold">
+                      <p:stCondLst>
+                        <p:cond delay="indefinite"/>
+                      </p:stCondLst>
+                      <p:childTnLst>
+                        <p:par>
+                          <p:cTn id="69" fill="hold">
+                            <p:stCondLst>
+                              <p:cond delay="0"/>
+                            </p:stCondLst>
+                            <p:childTnLst>
+                              <p:par>
+                                <p:cTn id="70" presetID="10" presetClass="entr" presetSubtype="0" fill="hold" nodeType="clickEffect">
+                                  <p:stCondLst>
+                                    <p:cond delay="0"/>
+                                  </p:stCondLst>
+                                  <p:childTnLst>
+                                    <p:set>
+                                      <p:cBhvr>
+                                        <p:cTn id="71" dur="1" fill="hold">
+                                          <p:stCondLst>
+                                            <p:cond delay="0"/>
+                                          </p:stCondLst>
+                                        </p:cTn>
+                                        <p:tgtEl>
+                                          <p:spTgt spid="12">
+                                            <p:txEl>
+                                              <p:pRg st="17" end="17"/>
+                                            </p:txEl>
+                                          </p:spTgt>
+                                        </p:tgtEl>
+                                        <p:attrNameLst>
+                                          <p:attrName>style.visibility</p:attrName>
+                                        </p:attrNameLst>
+                                      </p:cBhvr>
+                                      <p:to>
+                                        <p:strVal val="visible"/>
+                                      </p:to>
+                                    </p:set>
+                                    <p:animEffect transition="in" filter="fade">
+                                      <p:cBhvr>
+                                        <p:cTn id="72" dur="500"/>
+                                        <p:tgtEl>
+                                          <p:spTgt spid="12">
+                                            <p:txEl>
+                                              <p:pRg st="17" end="17"/>
                                             </p:txEl>
                                           </p:spTgt>
                                         </p:tgtEl>
@@ -12308,8 +14920,8 @@
         </p:nvSpPr>
         <p:spPr bwMode="auto">
           <a:xfrm>
-            <a:off x="1164518" y="1371600"/>
-            <a:ext cx="7300509" cy="5047536"/>
+            <a:off x="1189918" y="1308814"/>
+            <a:ext cx="7903282" cy="5047536"/>
           </a:xfrm>
           <a:prstGeom prst="rect">
             <a:avLst/>
@@ -12334,61 +14946,103 @@
                 <a:spcPts val="1200"/>
               </a:spcAft>
               <a:buFont typeface="+mj-lt"/>
-              <a:buAutoNum type="arabicPeriod"/>
+              <a:buAutoNum type="romanUcPeriod"/>
             </a:pPr>
             <a:r>
-              <a:rPr lang="en-US" sz="1600" dirty="0" smtClean="0"/>
+              <a:rPr lang="en-US" sz="1600" dirty="0" smtClean="0">
+                <a:latin typeface="Times New Roman" panose="02020603050405020304" pitchFamily="18" charset="0"/>
+                <a:cs typeface="Times New Roman" panose="02020603050405020304" pitchFamily="18" charset="0"/>
+              </a:rPr>
               <a:t>G</a:t>
             </a:r>
             <a:r>
-              <a:rPr lang="en-US" sz="1600" dirty="0"/>
+              <a:rPr lang="en-US" sz="1600" dirty="0">
+                <a:latin typeface="Times New Roman" panose="02020603050405020304" pitchFamily="18" charset="0"/>
+                <a:cs typeface="Times New Roman" panose="02020603050405020304" pitchFamily="18" charset="0"/>
+              </a:rPr>
               <a:t>. Lo </a:t>
             </a:r>
             <a:r>
-              <a:rPr lang="en-US" sz="1600" dirty="0" err="1"/>
+              <a:rPr lang="en-US" sz="1600" dirty="0" err="1">
+                <a:latin typeface="Times New Roman" panose="02020603050405020304" pitchFamily="18" charset="0"/>
+                <a:cs typeface="Times New Roman" panose="02020603050405020304" pitchFamily="18" charset="0"/>
+              </a:rPr>
               <a:t>Calzo</a:t>
             </a:r>
             <a:r>
-              <a:rPr lang="en-US" sz="1600" dirty="0"/>
+              <a:rPr lang="en-US" sz="1600" dirty="0">
+                <a:latin typeface="Times New Roman" panose="02020603050405020304" pitchFamily="18" charset="0"/>
+                <a:cs typeface="Times New Roman" panose="02020603050405020304" pitchFamily="18" charset="0"/>
+              </a:rPr>
               <a:t> </a:t>
             </a:r>
             <a:r>
-              <a:rPr lang="en-US" sz="1600" i="1" dirty="0"/>
+              <a:rPr lang="en-US" sz="1600" i="1" dirty="0">
+                <a:latin typeface="Times New Roman" panose="02020603050405020304" pitchFamily="18" charset="0"/>
+                <a:cs typeface="Times New Roman" panose="02020603050405020304" pitchFamily="18" charset="0"/>
+              </a:rPr>
               <a:t>et al.</a:t>
             </a:r>
             <a:r>
-              <a:rPr lang="en-US" sz="1600" dirty="0"/>
+              <a:rPr lang="en-US" sz="1600" dirty="0">
+                <a:latin typeface="Times New Roman" panose="02020603050405020304" pitchFamily="18" charset="0"/>
+                <a:cs typeface="Times New Roman" panose="02020603050405020304" pitchFamily="18" charset="0"/>
+              </a:rPr>
               <a:t>, “</a:t>
             </a:r>
             <a:r>
-              <a:rPr lang="en-US" sz="1600" b="1" dirty="0"/>
+              <a:rPr lang="en-US" sz="1600" b="1" dirty="0">
+                <a:latin typeface="Times New Roman" panose="02020603050405020304" pitchFamily="18" charset="0"/>
+                <a:cs typeface="Times New Roman" panose="02020603050405020304" pitchFamily="18" charset="0"/>
+              </a:rPr>
               <a:t>Integrated motor drives: state of the art and future trends</a:t>
             </a:r>
             <a:r>
-              <a:rPr lang="en-US" sz="1600" dirty="0"/>
+              <a:rPr lang="en-US" sz="1600" dirty="0">
+                <a:latin typeface="Times New Roman" panose="02020603050405020304" pitchFamily="18" charset="0"/>
+                <a:cs typeface="Times New Roman" panose="02020603050405020304" pitchFamily="18" charset="0"/>
+              </a:rPr>
               <a:t>,” </a:t>
             </a:r>
             <a:r>
-              <a:rPr lang="en-US" sz="1600" i="1" dirty="0"/>
+              <a:rPr lang="en-US" sz="1600" i="1" dirty="0">
+                <a:latin typeface="Times New Roman" panose="02020603050405020304" pitchFamily="18" charset="0"/>
+                <a:cs typeface="Times New Roman" panose="02020603050405020304" pitchFamily="18" charset="0"/>
+              </a:rPr>
               <a:t>IET </a:t>
             </a:r>
             <a:r>
-              <a:rPr lang="en-US" sz="1600" i="1" dirty="0" err="1"/>
+              <a:rPr lang="en-US" sz="1600" i="1" dirty="0" err="1">
+                <a:latin typeface="Times New Roman" panose="02020603050405020304" pitchFamily="18" charset="0"/>
+                <a:cs typeface="Times New Roman" panose="02020603050405020304" pitchFamily="18" charset="0"/>
+              </a:rPr>
               <a:t>Electr</a:t>
             </a:r>
             <a:r>
-              <a:rPr lang="en-US" sz="1600" i="1" dirty="0"/>
+              <a:rPr lang="en-US" sz="1600" i="1" dirty="0">
+                <a:latin typeface="Times New Roman" panose="02020603050405020304" pitchFamily="18" charset="0"/>
+                <a:cs typeface="Times New Roman" panose="02020603050405020304" pitchFamily="18" charset="0"/>
+              </a:rPr>
               <a:t>. Power Appl.</a:t>
             </a:r>
             <a:r>
-              <a:rPr lang="en-US" sz="1600" dirty="0"/>
+              <a:rPr lang="en-US" sz="1600" dirty="0">
+                <a:latin typeface="Times New Roman" panose="02020603050405020304" pitchFamily="18" charset="0"/>
+                <a:cs typeface="Times New Roman" panose="02020603050405020304" pitchFamily="18" charset="0"/>
+              </a:rPr>
               <a:t>, vol. 10, no. 8, pp. 757–771, Sep. 2016</a:t>
             </a:r>
             <a:r>
-              <a:rPr lang="en-US" sz="1600" dirty="0" smtClean="0"/>
+              <a:rPr lang="en-US" sz="1600" dirty="0" smtClean="0">
+                <a:latin typeface="Times New Roman" panose="02020603050405020304" pitchFamily="18" charset="0"/>
+                <a:cs typeface="Times New Roman" panose="02020603050405020304" pitchFamily="18" charset="0"/>
+              </a:rPr>
               <a:t>.</a:t>
             </a:r>
-            <a:endParaRPr lang="tr-TR" sz="1600" dirty="0" smtClean="0"/>
+            <a:endParaRPr lang="tr-TR" sz="1600" dirty="0" smtClean="0">
+              <a:latin typeface="Times New Roman" panose="02020603050405020304" pitchFamily="18" charset="0"/>
+              <a:cs typeface="Times New Roman" panose="02020603050405020304" pitchFamily="18" charset="0"/>
+            </a:endParaRPr>
           </a:p>
           <a:p>
             <a:pPr marL="514350" indent="-514350" algn="l" defTabSz="4389438">
@@ -12396,37 +15050,61 @@
                 <a:spcPts val="1200"/>
               </a:spcAft>
               <a:buFont typeface="+mj-lt"/>
-              <a:buAutoNum type="arabicPeriod"/>
+              <a:buAutoNum type="romanUcPeriod"/>
             </a:pPr>
             <a:r>
-              <a:rPr lang="en-US" sz="1600" dirty="0" smtClean="0"/>
+              <a:rPr lang="en-US" sz="1600" dirty="0" smtClean="0">
+                <a:latin typeface="Times New Roman" panose="02020603050405020304" pitchFamily="18" charset="0"/>
+                <a:cs typeface="Times New Roman" panose="02020603050405020304" pitchFamily="18" charset="0"/>
+              </a:rPr>
               <a:t>J</a:t>
             </a:r>
             <a:r>
-              <a:rPr lang="en-US" sz="1600" dirty="0"/>
+              <a:rPr lang="en-US" sz="1600" dirty="0">
+                <a:latin typeface="Times New Roman" panose="02020603050405020304" pitchFamily="18" charset="0"/>
+                <a:cs typeface="Times New Roman" panose="02020603050405020304" pitchFamily="18" charset="0"/>
+              </a:rPr>
               <a:t>. Wang, Y. Li, and Y. Han, “</a:t>
             </a:r>
             <a:r>
-              <a:rPr lang="en-US" sz="1600" b="1" dirty="0"/>
+              <a:rPr lang="en-US" sz="1600" b="1" dirty="0">
+                <a:latin typeface="Times New Roman" panose="02020603050405020304" pitchFamily="18" charset="0"/>
+                <a:cs typeface="Times New Roman" panose="02020603050405020304" pitchFamily="18" charset="0"/>
+              </a:rPr>
               <a:t>Integrated Modular Motor Drive Design With GaN Power FETs</a:t>
             </a:r>
             <a:r>
-              <a:rPr lang="en-US" sz="1600" dirty="0"/>
+              <a:rPr lang="en-US" sz="1600" dirty="0">
+                <a:latin typeface="Times New Roman" panose="02020603050405020304" pitchFamily="18" charset="0"/>
+                <a:cs typeface="Times New Roman" panose="02020603050405020304" pitchFamily="18" charset="0"/>
+              </a:rPr>
               <a:t>,” </a:t>
             </a:r>
             <a:r>
-              <a:rPr lang="en-US" sz="1600" i="1" dirty="0"/>
+              <a:rPr lang="en-US" sz="1600" i="1" dirty="0">
+                <a:latin typeface="Times New Roman" panose="02020603050405020304" pitchFamily="18" charset="0"/>
+                <a:cs typeface="Times New Roman" panose="02020603050405020304" pitchFamily="18" charset="0"/>
+              </a:rPr>
               <a:t>IEEE Trans. Ind. Appl.</a:t>
             </a:r>
             <a:r>
-              <a:rPr lang="en-US" sz="1600" dirty="0"/>
+              <a:rPr lang="en-US" sz="1600" dirty="0">
+                <a:latin typeface="Times New Roman" panose="02020603050405020304" pitchFamily="18" charset="0"/>
+                <a:cs typeface="Times New Roman" panose="02020603050405020304" pitchFamily="18" charset="0"/>
+              </a:rPr>
               <a:t>, vol. 51, no. c, pp. 3198–3207, 2015</a:t>
             </a:r>
             <a:r>
-              <a:rPr lang="en-US" sz="1600" dirty="0" smtClean="0"/>
+              <a:rPr lang="en-US" sz="1600" dirty="0" smtClean="0">
+                <a:latin typeface="Times New Roman" panose="02020603050405020304" pitchFamily="18" charset="0"/>
+                <a:cs typeface="Times New Roman" panose="02020603050405020304" pitchFamily="18" charset="0"/>
+              </a:rPr>
               <a:t>.</a:t>
             </a:r>
-            <a:endParaRPr lang="tr-TR" sz="1600" dirty="0" smtClean="0"/>
+            <a:endParaRPr lang="tr-TR" sz="1600" dirty="0" smtClean="0">
+              <a:latin typeface="Times New Roman" panose="02020603050405020304" pitchFamily="18" charset="0"/>
+              <a:cs typeface="Times New Roman" panose="02020603050405020304" pitchFamily="18" charset="0"/>
+            </a:endParaRPr>
           </a:p>
           <a:p>
             <a:pPr marL="514350" indent="-514350" algn="l" defTabSz="4389438">
@@ -12434,77 +15112,131 @@
                 <a:spcPts val="1200"/>
               </a:spcAft>
               <a:buFont typeface="+mj-lt"/>
-              <a:buAutoNum type="arabicPeriod"/>
+              <a:buAutoNum type="romanUcPeriod"/>
             </a:pPr>
             <a:r>
-              <a:rPr lang="en-US" sz="1600" dirty="0" smtClean="0"/>
+              <a:rPr lang="en-US" sz="1600" dirty="0" smtClean="0">
+                <a:latin typeface="Times New Roman" panose="02020603050405020304" pitchFamily="18" charset="0"/>
+                <a:cs typeface="Times New Roman" panose="02020603050405020304" pitchFamily="18" charset="0"/>
+              </a:rPr>
               <a:t>J</a:t>
             </a:r>
             <a:r>
-              <a:rPr lang="en-US" sz="1600" dirty="0"/>
+              <a:rPr lang="en-US" sz="1600" dirty="0">
+                <a:latin typeface="Times New Roman" panose="02020603050405020304" pitchFamily="18" charset="0"/>
+                <a:cs typeface="Times New Roman" panose="02020603050405020304" pitchFamily="18" charset="0"/>
+              </a:rPr>
               <a:t>. J. </a:t>
             </a:r>
             <a:r>
-              <a:rPr lang="en-US" sz="1600" dirty="0" err="1"/>
+              <a:rPr lang="en-US" sz="1600" dirty="0" err="1">
+                <a:latin typeface="Times New Roman" panose="02020603050405020304" pitchFamily="18" charset="0"/>
+                <a:cs typeface="Times New Roman" panose="02020603050405020304" pitchFamily="18" charset="0"/>
+              </a:rPr>
               <a:t>Wolmarans</a:t>
             </a:r>
             <a:r>
-              <a:rPr lang="en-US" sz="1600" dirty="0"/>
+              <a:rPr lang="en-US" sz="1600" dirty="0">
+                <a:latin typeface="Times New Roman" panose="02020603050405020304" pitchFamily="18" charset="0"/>
+                <a:cs typeface="Times New Roman" panose="02020603050405020304" pitchFamily="18" charset="0"/>
+              </a:rPr>
               <a:t>, M. B. Gerber, H. </a:t>
             </a:r>
             <a:r>
-              <a:rPr lang="en-US" sz="1600" dirty="0" err="1"/>
+              <a:rPr lang="en-US" sz="1600" dirty="0" err="1">
+                <a:latin typeface="Times New Roman" panose="02020603050405020304" pitchFamily="18" charset="0"/>
+                <a:cs typeface="Times New Roman" panose="02020603050405020304" pitchFamily="18" charset="0"/>
+              </a:rPr>
               <a:t>Polinder</a:t>
             </a:r>
             <a:r>
-              <a:rPr lang="en-US" sz="1600" dirty="0"/>
+              <a:rPr lang="en-US" sz="1600" dirty="0">
+                <a:latin typeface="Times New Roman" panose="02020603050405020304" pitchFamily="18" charset="0"/>
+                <a:cs typeface="Times New Roman" panose="02020603050405020304" pitchFamily="18" charset="0"/>
+              </a:rPr>
               <a:t>, S. W. H. De </a:t>
             </a:r>
             <a:r>
-              <a:rPr lang="en-US" sz="1600" dirty="0" err="1"/>
+              <a:rPr lang="en-US" sz="1600" dirty="0" err="1">
+                <a:latin typeface="Times New Roman" panose="02020603050405020304" pitchFamily="18" charset="0"/>
+                <a:cs typeface="Times New Roman" panose="02020603050405020304" pitchFamily="18" charset="0"/>
+              </a:rPr>
               <a:t>Haan</a:t>
             </a:r>
             <a:r>
-              <a:rPr lang="en-US" sz="1600" dirty="0"/>
+              <a:rPr lang="en-US" sz="1600" dirty="0">
+                <a:latin typeface="Times New Roman" panose="02020603050405020304" pitchFamily="18" charset="0"/>
+                <a:cs typeface="Times New Roman" panose="02020603050405020304" pitchFamily="18" charset="0"/>
+              </a:rPr>
               <a:t>, J. A. Ferreira, and D. </a:t>
             </a:r>
             <a:r>
-              <a:rPr lang="en-US" sz="1600" dirty="0" err="1"/>
+              <a:rPr lang="en-US" sz="1600" dirty="0" err="1">
+                <a:latin typeface="Times New Roman" panose="02020603050405020304" pitchFamily="18" charset="0"/>
+                <a:cs typeface="Times New Roman" panose="02020603050405020304" pitchFamily="18" charset="0"/>
+              </a:rPr>
               <a:t>Clarenbach</a:t>
             </a:r>
             <a:r>
-              <a:rPr lang="en-US" sz="1600" dirty="0"/>
+              <a:rPr lang="en-US" sz="1600" dirty="0">
+                <a:latin typeface="Times New Roman" panose="02020603050405020304" pitchFamily="18" charset="0"/>
+                <a:cs typeface="Times New Roman" panose="02020603050405020304" pitchFamily="18" charset="0"/>
+              </a:rPr>
               <a:t>, “</a:t>
             </a:r>
             <a:r>
-              <a:rPr lang="en-US" sz="1600" b="1" dirty="0"/>
+              <a:rPr lang="en-US" sz="1600" b="1" dirty="0">
+                <a:latin typeface="Times New Roman" panose="02020603050405020304" pitchFamily="18" charset="0"/>
+                <a:cs typeface="Times New Roman" panose="02020603050405020304" pitchFamily="18" charset="0"/>
+              </a:rPr>
               <a:t>A 50kW integrated fault tolerant permanent magnet machine and motor drive</a:t>
             </a:r>
             <a:r>
-              <a:rPr lang="en-US" sz="1600" dirty="0"/>
+              <a:rPr lang="en-US" sz="1600" dirty="0">
+                <a:latin typeface="Times New Roman" panose="02020603050405020304" pitchFamily="18" charset="0"/>
+                <a:cs typeface="Times New Roman" panose="02020603050405020304" pitchFamily="18" charset="0"/>
+              </a:rPr>
               <a:t>,” </a:t>
             </a:r>
             <a:r>
-              <a:rPr lang="en-US" sz="1600" i="1" dirty="0"/>
+              <a:rPr lang="en-US" sz="1600" i="1" dirty="0">
+                <a:latin typeface="Times New Roman" panose="02020603050405020304" pitchFamily="18" charset="0"/>
+                <a:cs typeface="Times New Roman" panose="02020603050405020304" pitchFamily="18" charset="0"/>
+              </a:rPr>
               <a:t>PESC Rec. - IEEE </a:t>
             </a:r>
             <a:r>
-              <a:rPr lang="en-US" sz="1600" i="1" dirty="0" err="1"/>
+              <a:rPr lang="en-US" sz="1600" i="1" dirty="0" err="1">
+                <a:latin typeface="Times New Roman" panose="02020603050405020304" pitchFamily="18" charset="0"/>
+                <a:cs typeface="Times New Roman" panose="02020603050405020304" pitchFamily="18" charset="0"/>
+              </a:rPr>
               <a:t>Annu</a:t>
             </a:r>
             <a:r>
-              <a:rPr lang="en-US" sz="1600" i="1" dirty="0"/>
+              <a:rPr lang="en-US" sz="1600" i="1" dirty="0">
+                <a:latin typeface="Times New Roman" panose="02020603050405020304" pitchFamily="18" charset="0"/>
+                <a:cs typeface="Times New Roman" panose="02020603050405020304" pitchFamily="18" charset="0"/>
+              </a:rPr>
               <a:t>. Power Electron. Spec. Conf.</a:t>
             </a:r>
             <a:r>
-              <a:rPr lang="en-US" sz="1600" dirty="0"/>
+              <a:rPr lang="en-US" sz="1600" dirty="0">
+                <a:latin typeface="Times New Roman" panose="02020603050405020304" pitchFamily="18" charset="0"/>
+                <a:cs typeface="Times New Roman" panose="02020603050405020304" pitchFamily="18" charset="0"/>
+              </a:rPr>
               <a:t>, pp. 345–351, 2008</a:t>
             </a:r>
             <a:r>
-              <a:rPr lang="en-US" sz="1600" dirty="0" smtClean="0"/>
+              <a:rPr lang="en-US" sz="1600" dirty="0" smtClean="0">
+                <a:latin typeface="Times New Roman" panose="02020603050405020304" pitchFamily="18" charset="0"/>
+                <a:cs typeface="Times New Roman" panose="02020603050405020304" pitchFamily="18" charset="0"/>
+              </a:rPr>
               <a:t>.</a:t>
             </a:r>
-            <a:endParaRPr lang="tr-TR" sz="1600" dirty="0" smtClean="0"/>
+            <a:endParaRPr lang="tr-TR" sz="1600" dirty="0" smtClean="0">
+              <a:latin typeface="Times New Roman" panose="02020603050405020304" pitchFamily="18" charset="0"/>
+              <a:cs typeface="Times New Roman" panose="02020603050405020304" pitchFamily="18" charset="0"/>
+            </a:endParaRPr>
           </a:p>
           <a:p>
             <a:pPr marL="514350" indent="-514350" defTabSz="4389438">
@@ -12512,53 +15244,89 @@
                 <a:spcPts val="1200"/>
               </a:spcAft>
               <a:buFont typeface="+mj-lt"/>
-              <a:buAutoNum type="arabicPeriod"/>
+              <a:buAutoNum type="romanUcPeriod"/>
             </a:pPr>
             <a:r>
-              <a:rPr lang="en-US" sz="1600" dirty="0" smtClean="0"/>
+              <a:rPr lang="en-US" sz="1600" dirty="0" smtClean="0">
+                <a:latin typeface="Times New Roman" panose="02020603050405020304" pitchFamily="18" charset="0"/>
+                <a:cs typeface="Times New Roman" panose="02020603050405020304" pitchFamily="18" charset="0"/>
+              </a:rPr>
               <a:t>N</a:t>
             </a:r>
             <a:r>
-              <a:rPr lang="en-US" sz="1600" dirty="0"/>
+              <a:rPr lang="en-US" sz="1600" dirty="0">
+                <a:latin typeface="Times New Roman" panose="02020603050405020304" pitchFamily="18" charset="0"/>
+                <a:cs typeface="Times New Roman" panose="02020603050405020304" pitchFamily="18" charset="0"/>
+              </a:rPr>
               <a:t>. R. Brown, T. M. </a:t>
             </a:r>
             <a:r>
-              <a:rPr lang="en-US" sz="1600" dirty="0" err="1"/>
+              <a:rPr lang="en-US" sz="1600" dirty="0" err="1">
+                <a:latin typeface="Times New Roman" panose="02020603050405020304" pitchFamily="18" charset="0"/>
+                <a:cs typeface="Times New Roman" panose="02020603050405020304" pitchFamily="18" charset="0"/>
+              </a:rPr>
               <a:t>Jahns</a:t>
             </a:r>
             <a:r>
-              <a:rPr lang="en-US" sz="1600" dirty="0"/>
+              <a:rPr lang="en-US" sz="1600" dirty="0">
+                <a:latin typeface="Times New Roman" panose="02020603050405020304" pitchFamily="18" charset="0"/>
+                <a:cs typeface="Times New Roman" panose="02020603050405020304" pitchFamily="18" charset="0"/>
+              </a:rPr>
               <a:t>, and R. D. Lorenz, “</a:t>
             </a:r>
             <a:r>
-              <a:rPr lang="en-US" sz="1600" b="1" dirty="0"/>
+              <a:rPr lang="en-US" sz="1600" b="1" dirty="0">
+                <a:latin typeface="Times New Roman" panose="02020603050405020304" pitchFamily="18" charset="0"/>
+                <a:cs typeface="Times New Roman" panose="02020603050405020304" pitchFamily="18" charset="0"/>
+              </a:rPr>
               <a:t>Power Converter Design for an Integrated Modular Motor Drive</a:t>
             </a:r>
             <a:r>
-              <a:rPr lang="en-US" sz="1600" dirty="0"/>
+              <a:rPr lang="en-US" sz="1600" dirty="0">
+                <a:latin typeface="Times New Roman" panose="02020603050405020304" pitchFamily="18" charset="0"/>
+                <a:cs typeface="Times New Roman" panose="02020603050405020304" pitchFamily="18" charset="0"/>
+              </a:rPr>
               <a:t>,” </a:t>
             </a:r>
             <a:r>
-              <a:rPr lang="en-US" sz="1600" i="1" dirty="0"/>
+              <a:rPr lang="en-US" sz="1600" i="1" dirty="0">
+                <a:latin typeface="Times New Roman" panose="02020603050405020304" pitchFamily="18" charset="0"/>
+                <a:cs typeface="Times New Roman" panose="02020603050405020304" pitchFamily="18" charset="0"/>
+              </a:rPr>
               <a:t>Ind. Appl. Conf. 2007. 42nd IAS </a:t>
             </a:r>
             <a:r>
-              <a:rPr lang="en-US" sz="1600" i="1" dirty="0" err="1"/>
+              <a:rPr lang="en-US" sz="1600" i="1" dirty="0" err="1">
+                <a:latin typeface="Times New Roman" panose="02020603050405020304" pitchFamily="18" charset="0"/>
+                <a:cs typeface="Times New Roman" panose="02020603050405020304" pitchFamily="18" charset="0"/>
+              </a:rPr>
               <a:t>Annu</a:t>
             </a:r>
             <a:r>
-              <a:rPr lang="en-US" sz="1600" i="1" dirty="0"/>
+              <a:rPr lang="en-US" sz="1600" i="1" dirty="0">
+                <a:latin typeface="Times New Roman" panose="02020603050405020304" pitchFamily="18" charset="0"/>
+                <a:cs typeface="Times New Roman" panose="02020603050405020304" pitchFamily="18" charset="0"/>
+              </a:rPr>
               <a:t>. Meet. Conf. Rec. 2007 IEEE</a:t>
             </a:r>
             <a:r>
-              <a:rPr lang="en-US" sz="1600" dirty="0"/>
+              <a:rPr lang="en-US" sz="1600" dirty="0">
+                <a:latin typeface="Times New Roman" panose="02020603050405020304" pitchFamily="18" charset="0"/>
+                <a:cs typeface="Times New Roman" panose="02020603050405020304" pitchFamily="18" charset="0"/>
+              </a:rPr>
               <a:t>, pp. 1322–1328, 2007</a:t>
             </a:r>
             <a:r>
-              <a:rPr lang="en-US" sz="1600" dirty="0" smtClean="0"/>
+              <a:rPr lang="en-US" sz="1600" dirty="0" smtClean="0">
+                <a:latin typeface="Times New Roman" panose="02020603050405020304" pitchFamily="18" charset="0"/>
+                <a:cs typeface="Times New Roman" panose="02020603050405020304" pitchFamily="18" charset="0"/>
+              </a:rPr>
               <a:t>.</a:t>
             </a:r>
-            <a:endParaRPr lang="tr-TR" sz="1600" dirty="0" smtClean="0"/>
+            <a:endParaRPr lang="tr-TR" sz="1600" dirty="0" smtClean="0">
+              <a:latin typeface="Times New Roman" panose="02020603050405020304" pitchFamily="18" charset="0"/>
+              <a:cs typeface="Times New Roman" panose="02020603050405020304" pitchFamily="18" charset="0"/>
+            </a:endParaRPr>
           </a:p>
           <a:p>
             <a:pPr marL="514350" indent="-514350" defTabSz="4389438">
@@ -12566,77 +15334,131 @@
                 <a:spcPts val="1200"/>
               </a:spcAft>
               <a:buFont typeface="+mj-lt"/>
-              <a:buAutoNum type="arabicPeriod"/>
+              <a:buAutoNum type="romanUcPeriod"/>
             </a:pPr>
             <a:r>
-              <a:rPr lang="en-US" sz="1600" dirty="0" smtClean="0"/>
+              <a:rPr lang="en-US" sz="1600" dirty="0" smtClean="0">
+                <a:latin typeface="Times New Roman" panose="02020603050405020304" pitchFamily="18" charset="0"/>
+                <a:cs typeface="Times New Roman" panose="02020603050405020304" pitchFamily="18" charset="0"/>
+              </a:rPr>
               <a:t>S</a:t>
             </a:r>
             <a:r>
-              <a:rPr lang="en-US" sz="1600" dirty="0"/>
+              <a:rPr lang="en-US" sz="1600" dirty="0">
+                <a:latin typeface="Times New Roman" panose="02020603050405020304" pitchFamily="18" charset="0"/>
+                <a:cs typeface="Times New Roman" panose="02020603050405020304" pitchFamily="18" charset="0"/>
+              </a:rPr>
               <a:t>. M. Lambert, B. C. </a:t>
             </a:r>
             <a:r>
-              <a:rPr lang="en-US" sz="1600" dirty="0" err="1"/>
+              <a:rPr lang="en-US" sz="1600" dirty="0" err="1">
+                <a:latin typeface="Times New Roman" panose="02020603050405020304" pitchFamily="18" charset="0"/>
+                <a:cs typeface="Times New Roman" panose="02020603050405020304" pitchFamily="18" charset="0"/>
+              </a:rPr>
               <a:t>Mecrow</a:t>
             </a:r>
             <a:r>
-              <a:rPr lang="en-US" sz="1600" dirty="0"/>
+              <a:rPr lang="en-US" sz="1600" dirty="0">
+                <a:latin typeface="Times New Roman" panose="02020603050405020304" pitchFamily="18" charset="0"/>
+                <a:cs typeface="Times New Roman" panose="02020603050405020304" pitchFamily="18" charset="0"/>
+              </a:rPr>
               <a:t>, R. </a:t>
             </a:r>
             <a:r>
-              <a:rPr lang="en-US" sz="1600" dirty="0" err="1"/>
+              <a:rPr lang="en-US" sz="1600" dirty="0" err="1">
+                <a:latin typeface="Times New Roman" panose="02020603050405020304" pitchFamily="18" charset="0"/>
+                <a:cs typeface="Times New Roman" panose="02020603050405020304" pitchFamily="18" charset="0"/>
+              </a:rPr>
               <a:t>Abebe</a:t>
             </a:r>
             <a:r>
-              <a:rPr lang="en-US" sz="1600" dirty="0"/>
+              <a:rPr lang="en-US" sz="1600" dirty="0">
+                <a:latin typeface="Times New Roman" panose="02020603050405020304" pitchFamily="18" charset="0"/>
+                <a:cs typeface="Times New Roman" panose="02020603050405020304" pitchFamily="18" charset="0"/>
+              </a:rPr>
               <a:t>, G. </a:t>
             </a:r>
             <a:r>
-              <a:rPr lang="en-US" sz="1600" dirty="0" err="1"/>
+              <a:rPr lang="en-US" sz="1600" dirty="0" err="1">
+                <a:latin typeface="Times New Roman" panose="02020603050405020304" pitchFamily="18" charset="0"/>
+                <a:cs typeface="Times New Roman" panose="02020603050405020304" pitchFamily="18" charset="0"/>
+              </a:rPr>
               <a:t>Vakil</a:t>
             </a:r>
             <a:r>
-              <a:rPr lang="en-US" sz="1600" dirty="0"/>
+              <a:rPr lang="en-US" sz="1600" dirty="0">
+                <a:latin typeface="Times New Roman" panose="02020603050405020304" pitchFamily="18" charset="0"/>
+                <a:cs typeface="Times New Roman" panose="02020603050405020304" pitchFamily="18" charset="0"/>
+              </a:rPr>
               <a:t>, and C. M. Johnson, “</a:t>
             </a:r>
             <a:r>
-              <a:rPr lang="en-US" sz="1600" b="1" dirty="0"/>
+              <a:rPr lang="en-US" sz="1600" b="1" dirty="0">
+                <a:latin typeface="Times New Roman" panose="02020603050405020304" pitchFamily="18" charset="0"/>
+                <a:cs typeface="Times New Roman" panose="02020603050405020304" pitchFamily="18" charset="0"/>
+              </a:rPr>
               <a:t>Integrated Drives for Transport - A Review of the Enabling Electronics Technology</a:t>
             </a:r>
             <a:r>
-              <a:rPr lang="en-US" sz="1600" dirty="0"/>
+              <a:rPr lang="en-US" sz="1600" dirty="0">
+                <a:latin typeface="Times New Roman" panose="02020603050405020304" pitchFamily="18" charset="0"/>
+                <a:cs typeface="Times New Roman" panose="02020603050405020304" pitchFamily="18" charset="0"/>
+              </a:rPr>
               <a:t>,” </a:t>
             </a:r>
             <a:r>
-              <a:rPr lang="en-US" sz="1600" i="1" dirty="0"/>
+              <a:rPr lang="en-US" sz="1600" i="1" dirty="0">
+                <a:latin typeface="Times New Roman" panose="02020603050405020304" pitchFamily="18" charset="0"/>
+                <a:cs typeface="Times New Roman" panose="02020603050405020304" pitchFamily="18" charset="0"/>
+              </a:rPr>
               <a:t>IEEE </a:t>
             </a:r>
             <a:r>
-              <a:rPr lang="en-US" sz="1600" i="1" dirty="0" err="1"/>
+              <a:rPr lang="en-US" sz="1600" i="1" dirty="0" err="1">
+                <a:latin typeface="Times New Roman" panose="02020603050405020304" pitchFamily="18" charset="0"/>
+                <a:cs typeface="Times New Roman" panose="02020603050405020304" pitchFamily="18" charset="0"/>
+              </a:rPr>
               <a:t>Veh</a:t>
             </a:r>
             <a:r>
-              <a:rPr lang="en-US" sz="1600" i="1" dirty="0"/>
+              <a:rPr lang="en-US" sz="1600" i="1" dirty="0">
+                <a:latin typeface="Times New Roman" panose="02020603050405020304" pitchFamily="18" charset="0"/>
+                <a:cs typeface="Times New Roman" panose="02020603050405020304" pitchFamily="18" charset="0"/>
+              </a:rPr>
               <a:t>. Power </a:t>
             </a:r>
             <a:r>
-              <a:rPr lang="en-US" sz="1600" i="1" dirty="0" err="1"/>
+              <a:rPr lang="en-US" sz="1600" i="1" dirty="0" err="1">
+                <a:latin typeface="Times New Roman" panose="02020603050405020304" pitchFamily="18" charset="0"/>
+                <a:cs typeface="Times New Roman" panose="02020603050405020304" pitchFamily="18" charset="0"/>
+              </a:rPr>
               <a:t>Propuls</a:t>
             </a:r>
             <a:r>
-              <a:rPr lang="en-US" sz="1600" i="1" dirty="0"/>
+              <a:rPr lang="en-US" sz="1600" i="1" dirty="0">
+                <a:latin typeface="Times New Roman" panose="02020603050405020304" pitchFamily="18" charset="0"/>
+                <a:cs typeface="Times New Roman" panose="02020603050405020304" pitchFamily="18" charset="0"/>
+              </a:rPr>
               <a:t>. Conf.</a:t>
             </a:r>
             <a:r>
-              <a:rPr lang="en-US" sz="1600" dirty="0"/>
+              <a:rPr lang="en-US" sz="1600" dirty="0">
+                <a:latin typeface="Times New Roman" panose="02020603050405020304" pitchFamily="18" charset="0"/>
+                <a:cs typeface="Times New Roman" panose="02020603050405020304" pitchFamily="18" charset="0"/>
+              </a:rPr>
               <a:t>, pp. 1–6, 2015</a:t>
             </a:r>
             <a:r>
-              <a:rPr lang="en-US" sz="1600" dirty="0" smtClean="0"/>
+              <a:rPr lang="en-US" sz="1600" dirty="0" smtClean="0">
+                <a:latin typeface="Times New Roman" panose="02020603050405020304" pitchFamily="18" charset="0"/>
+                <a:cs typeface="Times New Roman" panose="02020603050405020304" pitchFamily="18" charset="0"/>
+              </a:rPr>
               <a:t>.</a:t>
             </a:r>
-            <a:endParaRPr lang="tr-TR" sz="1600" dirty="0" smtClean="0"/>
+            <a:endParaRPr lang="tr-TR" sz="1600" dirty="0" smtClean="0">
+              <a:latin typeface="Times New Roman" panose="02020603050405020304" pitchFamily="18" charset="0"/>
+              <a:cs typeface="Times New Roman" panose="02020603050405020304" pitchFamily="18" charset="0"/>
+            </a:endParaRPr>
           </a:p>
           <a:p>
             <a:pPr marL="514350" indent="-514350" defTabSz="4389438">
@@ -12644,53 +15466,89 @@
                 <a:spcPts val="1200"/>
               </a:spcAft>
               <a:buFont typeface="+mj-lt"/>
-              <a:buAutoNum type="arabicPeriod"/>
+              <a:buAutoNum type="romanUcPeriod"/>
             </a:pPr>
             <a:r>
-              <a:rPr lang="en-US" sz="1600" dirty="0" smtClean="0"/>
+              <a:rPr lang="en-US" sz="1600" dirty="0" smtClean="0">
+                <a:latin typeface="Times New Roman" panose="02020603050405020304" pitchFamily="18" charset="0"/>
+                <a:cs typeface="Times New Roman" panose="02020603050405020304" pitchFamily="18" charset="0"/>
+              </a:rPr>
               <a:t>A</a:t>
             </a:r>
             <a:r>
-              <a:rPr lang="en-US" sz="1600" dirty="0"/>
+              <a:rPr lang="en-US" sz="1600" dirty="0">
+                <a:latin typeface="Times New Roman" panose="02020603050405020304" pitchFamily="18" charset="0"/>
+                <a:cs typeface="Times New Roman" panose="02020603050405020304" pitchFamily="18" charset="0"/>
+              </a:rPr>
               <a:t>. </a:t>
             </a:r>
             <a:r>
-              <a:rPr lang="en-US" sz="1600" dirty="0" err="1"/>
+              <a:rPr lang="en-US" sz="1600" dirty="0" err="1">
+                <a:latin typeface="Times New Roman" panose="02020603050405020304" pitchFamily="18" charset="0"/>
+                <a:cs typeface="Times New Roman" panose="02020603050405020304" pitchFamily="18" charset="0"/>
+              </a:rPr>
               <a:t>Shea</a:t>
             </a:r>
             <a:r>
-              <a:rPr lang="en-US" sz="1600" dirty="0"/>
+              <a:rPr lang="en-US" sz="1600" dirty="0">
+                <a:latin typeface="Times New Roman" panose="02020603050405020304" pitchFamily="18" charset="0"/>
+                <a:cs typeface="Times New Roman" panose="02020603050405020304" pitchFamily="18" charset="0"/>
+              </a:rPr>
               <a:t> and T. M. </a:t>
             </a:r>
             <a:r>
-              <a:rPr lang="en-US" sz="1600" dirty="0" err="1"/>
+              <a:rPr lang="en-US" sz="1600" dirty="0" err="1">
+                <a:latin typeface="Times New Roman" panose="02020603050405020304" pitchFamily="18" charset="0"/>
+                <a:cs typeface="Times New Roman" panose="02020603050405020304" pitchFamily="18" charset="0"/>
+              </a:rPr>
               <a:t>Jahns</a:t>
             </a:r>
             <a:r>
-              <a:rPr lang="en-US" sz="1600" dirty="0"/>
+              <a:rPr lang="en-US" sz="1600" dirty="0">
+                <a:latin typeface="Times New Roman" panose="02020603050405020304" pitchFamily="18" charset="0"/>
+                <a:cs typeface="Times New Roman" panose="02020603050405020304" pitchFamily="18" charset="0"/>
+              </a:rPr>
               <a:t>, “</a:t>
             </a:r>
             <a:r>
-              <a:rPr lang="en-US" sz="1600" b="1" dirty="0"/>
+              <a:rPr lang="en-US" sz="1600" b="1" dirty="0">
+                <a:latin typeface="Times New Roman" panose="02020603050405020304" pitchFamily="18" charset="0"/>
+                <a:cs typeface="Times New Roman" panose="02020603050405020304" pitchFamily="18" charset="0"/>
+              </a:rPr>
               <a:t>Hardware integration for an integrated modular motor drive including distributed control</a:t>
             </a:r>
             <a:r>
-              <a:rPr lang="en-US" sz="1600" dirty="0"/>
+              <a:rPr lang="en-US" sz="1600" dirty="0">
+                <a:latin typeface="Times New Roman" panose="02020603050405020304" pitchFamily="18" charset="0"/>
+                <a:cs typeface="Times New Roman" panose="02020603050405020304" pitchFamily="18" charset="0"/>
+              </a:rPr>
               <a:t>,” in </a:t>
             </a:r>
             <a:r>
-              <a:rPr lang="en-US" sz="1600" i="1" dirty="0"/>
+              <a:rPr lang="en-US" sz="1600" i="1" dirty="0">
+                <a:latin typeface="Times New Roman" panose="02020603050405020304" pitchFamily="18" charset="0"/>
+                <a:cs typeface="Times New Roman" panose="02020603050405020304" pitchFamily="18" charset="0"/>
+              </a:rPr>
               <a:t>2014 IEEE Energy Conversion Congress and Exposition (ECCE)</a:t>
             </a:r>
             <a:r>
-              <a:rPr lang="en-US" sz="1600" dirty="0"/>
+              <a:rPr lang="en-US" sz="1600" dirty="0">
+                <a:latin typeface="Times New Roman" panose="02020603050405020304" pitchFamily="18" charset="0"/>
+                <a:cs typeface="Times New Roman" panose="02020603050405020304" pitchFamily="18" charset="0"/>
+              </a:rPr>
               <a:t>, 2014, pp. 4881–4887</a:t>
             </a:r>
             <a:r>
-              <a:rPr lang="en-US" sz="1600" dirty="0" smtClean="0"/>
+              <a:rPr lang="en-US" sz="1600" dirty="0" smtClean="0">
+                <a:latin typeface="Times New Roman" panose="02020603050405020304" pitchFamily="18" charset="0"/>
+                <a:cs typeface="Times New Roman" panose="02020603050405020304" pitchFamily="18" charset="0"/>
+              </a:rPr>
               <a:t>.</a:t>
             </a:r>
-            <a:endParaRPr lang="tr-TR" sz="1600" dirty="0" smtClean="0"/>
+            <a:endParaRPr lang="tr-TR" sz="1600" dirty="0" smtClean="0">
+              <a:latin typeface="Times New Roman" panose="02020603050405020304" pitchFamily="18" charset="0"/>
+              <a:cs typeface="Times New Roman" panose="02020603050405020304" pitchFamily="18" charset="0"/>
+            </a:endParaRPr>
           </a:p>
         </p:txBody>
       </p:sp>
@@ -13692,10 +16550,6 @@
               </a:rPr>
               <a:t>Results</a:t>
             </a:r>
-            <a:endParaRPr lang="en-US" sz="2400" dirty="0" smtClean="0">
-              <a:latin typeface="Times New Roman" panose="02020603050405020304" pitchFamily="18" charset="0"/>
-              <a:cs typeface="Times New Roman" panose="02020603050405020304" pitchFamily="18" charset="0"/>
-            </a:endParaRPr>
           </a:p>
           <a:p>
             <a:pPr marL="342900" indent="-342900">
@@ -13728,10 +16582,6 @@
               </a:rPr>
               <a:t>References</a:t>
             </a:r>
-            <a:endParaRPr lang="en-US" sz="2400" dirty="0" smtClean="0">
-              <a:latin typeface="Times New Roman" panose="02020603050405020304" pitchFamily="18" charset="0"/>
-              <a:cs typeface="Times New Roman" panose="02020603050405020304" pitchFamily="18" charset="0"/>
-            </a:endParaRPr>
           </a:p>
         </p:txBody>
       </p:sp>
@@ -14185,14 +17035,7 @@
                 <a:latin typeface="Times New Roman" panose="02020603050405020304" pitchFamily="18" charset="0"/>
                 <a:cs typeface="Times New Roman" panose="02020603050405020304" pitchFamily="18" charset="0"/>
               </a:rPr>
-              <a:t> to the </a:t>
-            </a:r>
-            <a:r>
-              <a:rPr lang="en-US" sz="2000" dirty="0" smtClean="0">
-                <a:latin typeface="Times New Roman" panose="02020603050405020304" pitchFamily="18" charset="0"/>
-                <a:cs typeface="Times New Roman" panose="02020603050405020304" pitchFamily="18" charset="0"/>
-              </a:rPr>
-              <a:t>motor</a:t>
+              <a:t> to the motor</a:t>
             </a:r>
             <a:endParaRPr lang="tr-TR" sz="2000" dirty="0" smtClean="0">
               <a:latin typeface="Times New Roman" panose="02020603050405020304" pitchFamily="18" charset="0"/>
@@ -16588,10 +19431,6 @@
               </a:rPr>
               <a:t>Vibration ?</a:t>
             </a:r>
-            <a:endParaRPr lang="en-US" sz="2600" dirty="0" smtClean="0">
-              <a:latin typeface="Times New Roman" panose="02020603050405020304" pitchFamily="18" charset="0"/>
-              <a:cs typeface="Times New Roman" panose="02020603050405020304" pitchFamily="18" charset="0"/>
-            </a:endParaRPr>
           </a:p>
         </p:txBody>
       </p:sp>
@@ -16826,21 +19665,7 @@
                 <a:latin typeface="Times New Roman" panose="02020603050405020304" pitchFamily="18" charset="0"/>
                 <a:cs typeface="Times New Roman" panose="02020603050405020304" pitchFamily="18" charset="0"/>
               </a:rPr>
-              <a:t>Low </a:t>
-            </a:r>
-            <a:r>
-              <a:rPr lang="en-US" sz="2000" dirty="0" smtClean="0">
-                <a:latin typeface="Times New Roman" panose="02020603050405020304" pitchFamily="18" charset="0"/>
-                <a:cs typeface="Times New Roman" panose="02020603050405020304" pitchFamily="18" charset="0"/>
-              </a:rPr>
-              <a:t>loss</a:t>
-            </a:r>
-            <a:r>
-              <a:rPr lang="en-US" sz="2000" dirty="0" smtClean="0">
-                <a:latin typeface="Times New Roman" panose="02020603050405020304" pitchFamily="18" charset="0"/>
-                <a:cs typeface="Times New Roman" panose="02020603050405020304" pitchFamily="18" charset="0"/>
-              </a:rPr>
-              <a:t>: </a:t>
+              <a:t>Low loss: </a:t>
             </a:r>
             <a:r>
               <a:rPr lang="en-US" sz="2000" b="1" dirty="0" smtClean="0">
@@ -16936,14 +19761,7 @@
                 <a:latin typeface="Times New Roman" panose="02020603050405020304" pitchFamily="18" charset="0"/>
                 <a:cs typeface="Times New Roman" panose="02020603050405020304" pitchFamily="18" charset="0"/>
               </a:rPr>
-              <a:t>Gallium Nitride (GaN</a:t>
-            </a:r>
-            <a:r>
-              <a:rPr lang="en-US" sz="2800" u="sng" dirty="0" smtClean="0">
-                <a:latin typeface="Times New Roman" panose="02020603050405020304" pitchFamily="18" charset="0"/>
-                <a:cs typeface="Times New Roman" panose="02020603050405020304" pitchFamily="18" charset="0"/>
-              </a:rPr>
-              <a:t>)</a:t>
+              <a:t>Gallium Nitride (GaN)</a:t>
             </a:r>
             <a:endParaRPr lang="en-US" sz="2800" u="sng" dirty="0">
               <a:latin typeface="Times New Roman" panose="02020603050405020304" pitchFamily="18" charset="0"/>
@@ -18078,14 +20896,7 @@
                 <a:latin typeface="Times New Roman" panose="02020603050405020304" pitchFamily="18" charset="0"/>
                 <a:cs typeface="Times New Roman" panose="02020603050405020304" pitchFamily="18" charset="0"/>
               </a:rPr>
-              <a:t>RMS </a:t>
-            </a:r>
-            <a:r>
-              <a:rPr lang="en-US" sz="2400" dirty="0" smtClean="0">
-                <a:latin typeface="Times New Roman" panose="02020603050405020304" pitchFamily="18" charset="0"/>
-                <a:cs typeface="Times New Roman" panose="02020603050405020304" pitchFamily="18" charset="0"/>
-              </a:rPr>
-              <a:t>current</a:t>
+              <a:t>RMS current</a:t>
             </a:r>
             <a:endParaRPr lang="tr-TR" sz="2400" dirty="0" smtClean="0">
               <a:latin typeface="Times New Roman" panose="02020603050405020304" pitchFamily="18" charset="0"/>
@@ -18135,14 +20946,7 @@
                 <a:latin typeface="Times New Roman" panose="02020603050405020304" pitchFamily="18" charset="0"/>
                 <a:cs typeface="Times New Roman" panose="02020603050405020304" pitchFamily="18" charset="0"/>
               </a:rPr>
-              <a:t>Reliability </a:t>
-            </a:r>
-            <a:r>
-              <a:rPr lang="en-US" sz="2400" dirty="0" smtClean="0">
-                <a:latin typeface="Times New Roman" panose="02020603050405020304" pitchFamily="18" charset="0"/>
-                <a:cs typeface="Times New Roman" panose="02020603050405020304" pitchFamily="18" charset="0"/>
-              </a:rPr>
-              <a:t>&amp; lifetime</a:t>
+              <a:t>Reliability &amp; lifetime</a:t>
             </a:r>
           </a:p>
           <a:p>
@@ -20028,10 +22832,6 @@
               </a:rPr>
               <a:t>Effect of interleaving</a:t>
             </a:r>
-            <a:endParaRPr lang="en-US" sz="2800" u="sng" dirty="0" smtClean="0">
-              <a:latin typeface="Times New Roman" panose="02020603050405020304" pitchFamily="18" charset="0"/>
-              <a:cs typeface="Times New Roman" panose="02020603050405020304" pitchFamily="18" charset="0"/>
-            </a:endParaRPr>
           </a:p>
         </p:txBody>
       </p:sp>
@@ -20210,8 +23010,8 @@
           </a:prstGeom>
         </p:spPr>
       </p:pic>
-      <mc:AlternateContent xmlns:mc="http://schemas.openxmlformats.org/markup-compatibility/2006">
-        <mc:Choice xmlns:a14="http://schemas.microsoft.com/office/drawing/2010/main" Requires="a14">
+      <mc:AlternateContent xmlns:mc="http://schemas.openxmlformats.org/markup-compatibility/2006" xmlns:a14="http://schemas.microsoft.com/office/drawing/2010/main">
+        <mc:Choice Requires="a14">
           <p:sp>
             <p:nvSpPr>
               <p:cNvPr id="17" name="Text Box 9"/>
@@ -20262,7 +23062,7 @@
                     <m:f>
                       <m:fPr>
                         <m:ctrlPr>
-                          <a:rPr lang="en-US" sz="2000" b="1" smtClean="0">
+                          <a:rPr lang="en-US" sz="2000" b="1" i="1" smtClean="0">
                             <a:latin typeface="Cambria Math" panose="02040503050406030204" pitchFamily="18" charset="0"/>
                             <a:cs typeface="Times New Roman" panose="02020603050405020304" pitchFamily="18" charset="0"/>
                           </a:rPr>
@@ -20295,7 +23095,7 @@
                           <m:fPr>
                             <m:type m:val="skw"/>
                             <m:ctrlPr>
-                              <a:rPr lang="en-US" sz="2000" b="1">
+                              <a:rPr lang="en-US" sz="2000" b="1" i="1">
                                 <a:latin typeface="Cambria Math" panose="02040503050406030204" pitchFamily="18" charset="0"/>
                                 <a:ea typeface="Cambria Math" panose="02040503050406030204" pitchFamily="18" charset="0"/>
                                 <a:cs typeface="Times New Roman" panose="02020603050405020304" pitchFamily="18" charset="0"/>
@@ -20349,10 +23149,6 @@
                   </a:rPr>
                   <a:t>for even number of modules</a:t>
                 </a:r>
-                <a:endParaRPr lang="en-US" sz="2000" dirty="0" smtClean="0">
-                  <a:latin typeface="Times New Roman" panose="02020603050405020304" pitchFamily="18" charset="0"/>
-                  <a:cs typeface="Times New Roman" panose="02020603050405020304" pitchFamily="18" charset="0"/>
-                </a:endParaRPr>
               </a:p>
               <a:p>
                 <a:pPr marL="342900" indent="-342900">
@@ -20482,7 +23278,7 @@
             </p:txBody>
           </p:sp>
         </mc:Choice>
-        <mc:Fallback>
+        <mc:Fallback xmlns="">
           <p:sp>
             <p:nvSpPr>
               <p:cNvPr id="17" name="Text Box 9"/>

</xml_diff>

<commit_message>
Figures for RPG. Only discussion is left.
</commit_message>
<xml_diff>
--- a/ISIE 2017/sunum/ISIE2017_OralPres_Mesut_Uğur.pptx
+++ b/ISIE 2017/sunum/ISIE2017_OralPres_Mesut_Uğur.pptx
@@ -12138,26 +12138,8 @@
                 <a:latin typeface="Times New Roman" panose="02020603050405020304" pitchFamily="18" charset="0"/>
                 <a:cs typeface="Times New Roman" panose="02020603050405020304" pitchFamily="18" charset="0"/>
               </a:rPr>
-              <a:t>1s</a:t>
-            </a:r>
-            <a:r>
-              <a:rPr lang="tr-TR" sz="2000" dirty="0" smtClean="0">
-                <a:latin typeface="Times New Roman" panose="02020603050405020304" pitchFamily="18" charset="0"/>
-                <a:cs typeface="Times New Roman" panose="02020603050405020304" pitchFamily="18" charset="0"/>
-              </a:rPr>
-              <a:t>, </a:t>
-            </a:r>
-            <a:r>
-              <a:rPr lang="tr-TR" sz="2000" dirty="0" smtClean="0">
-                <a:latin typeface="Times New Roman" panose="02020603050405020304" pitchFamily="18" charset="0"/>
-                <a:cs typeface="Times New Roman" panose="02020603050405020304" pitchFamily="18" charset="0"/>
-              </a:rPr>
-              <a:t>4p</a:t>
-            </a:r>
-            <a:endParaRPr lang="tr-TR" sz="2000" dirty="0" smtClean="0">
-              <a:latin typeface="Times New Roman" panose="02020603050405020304" pitchFamily="18" charset="0"/>
-              <a:cs typeface="Times New Roman" panose="02020603050405020304" pitchFamily="18" charset="0"/>
-            </a:endParaRPr>
+              <a:t>1s, 4p</a:t>
+            </a:r>
           </a:p>
         </p:txBody>
       </p:sp>
@@ -19809,6 +19791,32 @@
 <file path=ppt/slides/slide5.xml><?xml version="1.0" encoding="utf-8"?>
 <p:sld xmlns:a="http://schemas.openxmlformats.org/drawingml/2006/main" xmlns:r="http://schemas.openxmlformats.org/officeDocument/2006/relationships" xmlns:p="http://schemas.openxmlformats.org/presentationml/2006/main">
   <p:cSld>
+    <p:bg>
+      <p:bgPr>
+        <a:gradFill flip="none" rotWithShape="1">
+          <a:gsLst>
+            <a:gs pos="11000">
+              <a:schemeClr val="bg1">
+                <a:alpha val="34000"/>
+              </a:schemeClr>
+            </a:gs>
+            <a:gs pos="0">
+              <a:schemeClr val="bg1">
+                <a:lumMod val="95000"/>
+              </a:schemeClr>
+            </a:gs>
+            <a:gs pos="100000">
+              <a:schemeClr val="bg1">
+                <a:lumMod val="95000"/>
+              </a:schemeClr>
+            </a:gs>
+          </a:gsLst>
+          <a:lin ang="5400000" scaled="1"/>
+          <a:tileRect/>
+        </a:gradFill>
+        <a:effectLst/>
+      </p:bgPr>
+    </p:bg>
     <p:spTree>
       <p:nvGrpSpPr>
         <p:cNvPr id="1" name=""/>
@@ -20138,6 +20146,7 @@
           <a:prstGeom prst="rect">
             <a:avLst/>
           </a:prstGeom>
+          <a:noFill/>
         </p:spPr>
       </p:pic>
       <p:pic>

</xml_diff>